<commit_message>
Section Placement Draft 1
</commit_message>
<xml_diff>
--- a/Poster/poster_undergrad_expo_48x36_eecs.pptx
+++ b/Poster/poster_undergrad_expo_48x36_eecs.pptx
@@ -109,7 +109,7 @@
   </p:defaultTextStyle>
   <p:extLst>
     <p:ext uri="{EFAFB233-063F-42B5-8137-9DF3F51BA10A}">
-      <p15:sldGuideLst xmlns:p15="http://schemas.microsoft.com/office/powerpoint/2012/main" xmlns="">
+      <p15:sldGuideLst xmlns:p15="http://schemas.microsoft.com/office/powerpoint/2012/main">
         <p15:guide id="1" orient="horz" pos="19551">
           <p15:clr>
             <a:srgbClr val="A4A3A4"/>
@@ -243,7 +243,7 @@
             <a:fld id="{9CF59EBC-EC05-6B4D-B166-DDFA6A1EDCB6}" type="datetimeFigureOut">
               <a:rPr lang="en-US" smtClean="0"/>
               <a:pPr/>
-              <a:t>9/22/17</a:t>
+              <a:t>2/8/2018</a:t>
             </a:fld>
             <a:endParaRPr lang="en-US" dirty="0"/>
           </a:p>
@@ -307,38 +307,37 @@
           <a:p>
             <a:pPr lvl="0"/>
             <a:r>
-              <a:rPr lang="en-US" dirty="0" smtClean="0"/>
+              <a:rPr lang="en-US" dirty="0"/>
               <a:t>Click to edit Master text styles</a:t>
             </a:r>
           </a:p>
           <a:p>
             <a:pPr lvl="1"/>
             <a:r>
-              <a:rPr lang="en-US" dirty="0" smtClean="0"/>
+              <a:rPr lang="en-US" dirty="0"/>
               <a:t>Second level</a:t>
             </a:r>
           </a:p>
           <a:p>
             <a:pPr lvl="2"/>
             <a:r>
-              <a:rPr lang="en-US" dirty="0" smtClean="0"/>
+              <a:rPr lang="en-US" dirty="0"/>
               <a:t>Third level</a:t>
             </a:r>
           </a:p>
           <a:p>
             <a:pPr lvl="3"/>
             <a:r>
-              <a:rPr lang="en-US" dirty="0" smtClean="0"/>
+              <a:rPr lang="en-US" dirty="0"/>
               <a:t>Fourth level</a:t>
             </a:r>
           </a:p>
           <a:p>
             <a:pPr lvl="4"/>
             <a:r>
-              <a:rPr lang="en-US" dirty="0" smtClean="0"/>
+              <a:rPr lang="en-US" dirty="0"/>
               <a:t>Fifth level</a:t>
             </a:r>
-            <a:endParaRPr lang="en-US" dirty="0"/>
           </a:p>
         </p:txBody>
       </p:sp>
@@ -819,18 +818,13 @@
           </a:lstStyle>
           <a:p>
             <a:r>
-              <a:rPr lang="en-US" sz="5400" cap="none" spc="520" baseline="0" dirty="0" smtClean="0">
+              <a:rPr lang="en-US" sz="5400" cap="none" spc="520" baseline="0" dirty="0">
                 <a:latin typeface="Impact" charset="0"/>
                 <a:ea typeface="Impact" charset="0"/>
                 <a:cs typeface="Impact" charset="0"/>
               </a:rPr>
               <a:t>Electrical Engineering and Computer Science</a:t>
             </a:r>
-            <a:endParaRPr lang="en-US" sz="5400" cap="none" spc="520" baseline="0" dirty="0">
-              <a:latin typeface="Impact" charset="0"/>
-              <a:ea typeface="Impact" charset="0"/>
-              <a:cs typeface="Impact" charset="0"/>
-            </a:endParaRPr>
           </a:p>
         </p:txBody>
       </p:sp>
@@ -991,7 +985,7 @@
           <a:p>
             <a:pPr algn="ctr"/>
             <a:r>
-              <a:rPr lang="en-US" sz="5400" b="0" i="0" cap="none" spc="170" dirty="0" smtClean="0">
+              <a:rPr lang="en-US" sz="5400" b="0" i="0" cap="none" spc="170" dirty="0">
                 <a:solidFill>
                   <a:schemeClr val="tx1"/>
                 </a:solidFill>
@@ -1000,13 +994,6 @@
               </a:rPr>
               <a:t>FOLD</a:t>
             </a:r>
-            <a:endParaRPr lang="en-US" sz="5400" b="0" i="0" cap="none" spc="170" dirty="0">
-              <a:solidFill>
-                <a:schemeClr val="tx1"/>
-              </a:solidFill>
-              <a:latin typeface="Verdana Regular" charset="0"/>
-              <a:cs typeface="Verdana Regular" charset="0"/>
-            </a:endParaRPr>
           </a:p>
         </p:txBody>
       </p:sp>
@@ -1089,7 +1076,7 @@
           <a:p>
             <a:pPr algn="ctr"/>
             <a:r>
-              <a:rPr lang="en-US" sz="5400" b="0" i="0" cap="none" spc="170" dirty="0" smtClean="0">
+              <a:rPr lang="en-US" sz="5400" b="0" i="0" cap="none" spc="170" dirty="0">
                 <a:solidFill>
                   <a:schemeClr val="tx1"/>
                 </a:solidFill>
@@ -1098,13 +1085,6 @@
               </a:rPr>
               <a:t>FOLD</a:t>
             </a:r>
-            <a:endParaRPr lang="en-US" sz="5400" b="0" i="0" cap="none" spc="170" dirty="0">
-              <a:solidFill>
-                <a:schemeClr val="tx1"/>
-              </a:solidFill>
-              <a:latin typeface="Verdana Regular" charset="0"/>
-              <a:cs typeface="Verdana Regular" charset="0"/>
-            </a:endParaRPr>
           </a:p>
         </p:txBody>
       </p:sp>
@@ -1187,7 +1167,7 @@
           <a:p>
             <a:pPr algn="ctr"/>
             <a:r>
-              <a:rPr lang="en-US" sz="5400" b="0" i="0" cap="none" spc="170" dirty="0" smtClean="0">
+              <a:rPr lang="en-US" sz="5400" b="0" i="0" cap="none" spc="170" dirty="0">
                 <a:solidFill>
                   <a:schemeClr val="tx1"/>
                 </a:solidFill>
@@ -1196,13 +1176,6 @@
               </a:rPr>
               <a:t>FOLD</a:t>
             </a:r>
-            <a:endParaRPr lang="en-US" sz="5400" b="0" i="0" cap="none" spc="170" dirty="0">
-              <a:solidFill>
-                <a:schemeClr val="tx1"/>
-              </a:solidFill>
-              <a:latin typeface="Verdana Regular" charset="0"/>
-              <a:cs typeface="Verdana Regular" charset="0"/>
-            </a:endParaRPr>
           </a:p>
         </p:txBody>
       </p:sp>
@@ -1285,7 +1258,7 @@
           <a:p>
             <a:pPr algn="ctr"/>
             <a:r>
-              <a:rPr lang="en-US" sz="5400" b="0" i="0" cap="none" spc="170" dirty="0" smtClean="0">
+              <a:rPr lang="en-US" sz="5400" b="0" i="0" cap="none" spc="170" dirty="0">
                 <a:solidFill>
                   <a:schemeClr val="tx1"/>
                 </a:solidFill>
@@ -1294,13 +1267,6 @@
               </a:rPr>
               <a:t>FOLD</a:t>
             </a:r>
-            <a:endParaRPr lang="en-US" sz="5400" b="0" i="0" cap="none" spc="170" dirty="0">
-              <a:solidFill>
-                <a:schemeClr val="tx1"/>
-              </a:solidFill>
-              <a:latin typeface="Verdana Regular" charset="0"/>
-              <a:cs typeface="Verdana Regular" charset="0"/>
-            </a:endParaRPr>
           </a:p>
         </p:txBody>
       </p:sp>
@@ -1387,7 +1353,7 @@
               </a:lnSpc>
             </a:pPr>
             <a:r>
-              <a:rPr lang="en-US" sz="5400" b="0" i="0" cap="none" spc="170" dirty="0" smtClean="0">
+              <a:rPr lang="en-US" sz="5400" b="0" i="0" cap="none" spc="170" dirty="0">
                 <a:solidFill>
                   <a:schemeClr val="tx1"/>
                 </a:solidFill>
@@ -1397,7 +1363,7 @@
               <a:t>NO</a:t>
             </a:r>
             <a:r>
-              <a:rPr lang="en-US" sz="5400" b="0" i="0" cap="none" spc="170" baseline="0" dirty="0" smtClean="0">
+              <a:rPr lang="en-US" sz="5400" b="0" i="0" cap="none" spc="170" baseline="0" dirty="0">
                 <a:solidFill>
                   <a:schemeClr val="tx1"/>
                 </a:solidFill>
@@ -1414,7 +1380,7 @@
               </a:lnSpc>
             </a:pPr>
             <a:r>
-              <a:rPr lang="en-US" sz="5400" b="0" i="0" cap="none" spc="170" baseline="0" dirty="0" smtClean="0">
+              <a:rPr lang="en-US" sz="5400" b="0" i="0" cap="none" spc="170" baseline="0" dirty="0">
                 <a:solidFill>
                   <a:schemeClr val="tx1"/>
                 </a:solidFill>
@@ -1531,18 +1497,13 @@
               </a:spcBef>
             </a:pPr>
             <a:r>
-              <a:rPr lang="en-US" sz="5400" spc="520" baseline="0" dirty="0" smtClean="0">
+              <a:rPr lang="en-US" sz="5400" spc="520" baseline="0" dirty="0">
                 <a:latin typeface="Impact" charset="0"/>
                 <a:ea typeface="Impact" charset="0"/>
                 <a:cs typeface="Impact" charset="0"/>
               </a:rPr>
               <a:t>COLLEGE OF ENGINEERING</a:t>
             </a:r>
-            <a:endParaRPr lang="en-US" sz="5400" spc="520" baseline="0" dirty="0">
-              <a:latin typeface="Impact" charset="0"/>
-              <a:ea typeface="Impact" charset="0"/>
-              <a:cs typeface="Impact" charset="0"/>
-            </a:endParaRPr>
           </a:p>
         </p:txBody>
       </p:sp>
@@ -2068,47 +2029,14 @@
           </a:lstStyle>
           <a:p>
             <a:r>
-              <a:rPr lang="en-US" dirty="0" smtClean="0">
+              <a:rPr lang="en-US" dirty="0">
                 <a:solidFill>
                   <a:srgbClr val="E05529"/>
                 </a:solidFill>
                 <a:latin typeface="Verdana Regular" charset="0"/>
               </a:rPr>
-              <a:t>Title: </a:t>
-            </a:r>
-            <a:r>
-              <a:rPr lang="en-US" dirty="0" err="1" smtClean="0">
-                <a:solidFill>
-                  <a:srgbClr val="E05529"/>
-                </a:solidFill>
-                <a:latin typeface="Verdana Regular" charset="0"/>
-              </a:rPr>
-              <a:t>lorem</a:t>
-            </a:r>
-            <a:r>
-              <a:rPr lang="en-US" dirty="0" smtClean="0">
-                <a:solidFill>
-                  <a:srgbClr val="E05529"/>
-                </a:solidFill>
-                <a:latin typeface="Verdana Regular" charset="0"/>
-              </a:rPr>
-              <a:t> </a:t>
-            </a:r>
-            <a:r>
-              <a:rPr lang="en-US" dirty="0" err="1" smtClean="0">
-                <a:solidFill>
-                  <a:srgbClr val="E05529"/>
-                </a:solidFill>
-                <a:latin typeface="Verdana Regular" charset="0"/>
-              </a:rPr>
-              <a:t>ipsum</a:t>
-            </a:r>
-            <a:endParaRPr lang="en-US" dirty="0">
-              <a:solidFill>
-                <a:srgbClr val="E05529"/>
-              </a:solidFill>
-              <a:latin typeface="Verdana Regular" charset="0"/>
-            </a:endParaRPr>
+              <a:t>Background</a:t>
+            </a:r>
           </a:p>
         </p:txBody>
       </p:sp>
@@ -2314,34 +2242,28 @@
               <a:t>Body. </a:t>
             </a:r>
             <a:r>
-              <a:rPr lang="en-US" dirty="0" err="1" smtClean="0">
+              <a:rPr lang="en-US" dirty="0" err="1">
                 <a:latin typeface="Verdana Regular" charset="0"/>
               </a:rPr>
               <a:t>Duismolessi</a:t>
             </a:r>
             <a:r>
-              <a:rPr lang="en-US" dirty="0" smtClean="0">
-                <a:latin typeface="Verdana Regular" charset="0"/>
-              </a:rPr>
-              <a:t> </a:t>
-            </a:r>
-            <a:r>
-              <a:rPr lang="en-US" dirty="0" err="1" smtClean="0">
+              <a:rPr lang="en-US" dirty="0">
+                <a:latin typeface="Verdana Regular" charset="0"/>
+              </a:rPr>
+              <a:t> </a:t>
+            </a:r>
+            <a:r>
+              <a:rPr lang="en-US" dirty="0" err="1">
                 <a:latin typeface="Verdana Regular" charset="0"/>
               </a:rPr>
               <a:t>utem</a:t>
             </a:r>
             <a:r>
-              <a:rPr lang="en-US" dirty="0" smtClean="0">
-                <a:latin typeface="Verdana Regular" charset="0"/>
-              </a:rPr>
-              <a:t> </a:t>
-            </a:r>
-            <a:r>
-              <a:rPr lang="en-US" dirty="0">
-                <a:latin typeface="Verdana Regular" charset="0"/>
-              </a:rPr>
-              <a:t>ex et, </a:t>
+              <a:rPr lang="en-US" dirty="0">
+                <a:latin typeface="Verdana Regular" charset="0"/>
+              </a:rPr>
+              <a:t> ex et, </a:t>
             </a:r>
             <a:r>
               <a:rPr lang="en-US" dirty="0" err="1">
@@ -2776,7 +2698,7 @@
               <a:t> </a:t>
             </a:r>
             <a:r>
-              <a:rPr lang="en-US" dirty="0" err="1" smtClean="0">
+              <a:rPr lang="en-US" dirty="0" err="1">
                 <a:latin typeface="Verdana Regular" charset="0"/>
               </a:rPr>
               <a:t>vendaest</a:t>
@@ -2831,13 +2753,13 @@
               <a:t> </a:t>
             </a:r>
             <a:r>
-              <a:rPr lang="en-US" dirty="0" err="1" smtClean="0">
+              <a:rPr lang="en-US" dirty="0" err="1">
                 <a:latin typeface="Verdana Regular" charset="0"/>
               </a:rPr>
               <a:t>corati</a:t>
             </a:r>
             <a:r>
-              <a:rPr lang="en-US" dirty="0" smtClean="0">
+              <a:rPr lang="en-US" dirty="0">
                 <a:latin typeface="Verdana Regular" charset="0"/>
               </a:rPr>
               <a:t> </a:t>
@@ -2855,13 +2777,13 @@
               <a:t> </a:t>
             </a:r>
             <a:r>
-              <a:rPr lang="en-US" dirty="0" err="1" smtClean="0">
+              <a:rPr lang="en-US" dirty="0" err="1">
                 <a:latin typeface="Verdana Regular" charset="0"/>
               </a:rPr>
               <a:t>volorrum</a:t>
             </a:r>
             <a:r>
-              <a:rPr lang="en-US" dirty="0" smtClean="0">
+              <a:rPr lang="en-US" dirty="0">
                 <a:latin typeface="Verdana Regular" charset="0"/>
               </a:rPr>
               <a:t> </a:t>
@@ -2975,7 +2897,7 @@
               <a:t> ex </a:t>
             </a:r>
             <a:r>
-              <a:rPr lang="en-US" dirty="0" err="1" smtClean="0">
+              <a:rPr lang="en-US" dirty="0" err="1">
                 <a:latin typeface="Verdana Regular" charset="0"/>
               </a:rPr>
               <a:t>inctist</a:t>
@@ -3143,7 +3065,7 @@
               <a:t> </a:t>
             </a:r>
             <a:r>
-              <a:rPr lang="en-US" dirty="0" err="1" smtClean="0">
+              <a:rPr lang="en-US" dirty="0" err="1">
                 <a:latin typeface="Verdana Regular" charset="0"/>
               </a:rPr>
               <a:t>rempore</a:t>
@@ -3329,7 +3251,7 @@
               <a:t>il</a:t>
             </a:r>
             <a:r>
-              <a:rPr lang="en-US" dirty="0" smtClean="0">
+              <a:rPr lang="en-US" dirty="0">
                 <a:latin typeface="Verdana Regular" charset="0"/>
               </a:rPr>
               <a:t>.</a:t>
@@ -3524,13 +3446,22 @@
           </a:lstStyle>
           <a:p>
             <a:r>
-              <a:rPr lang="en-US" dirty="0" smtClean="0">
+              <a:rPr lang="en-US" dirty="0">
                 <a:solidFill>
                   <a:srgbClr val="E05529"/>
                 </a:solidFill>
                 <a:latin typeface="Verdana Regular" charset="0"/>
               </a:rPr>
-              <a:t>Title: lorem ipsum</a:t>
+              <a:t>Results </a:t>
+            </a:r>
+            <a:r>
+              <a:rPr lang="en-US">
+                <a:solidFill>
+                  <a:srgbClr val="E05529"/>
+                </a:solidFill>
+                <a:latin typeface="Verdana Regular" charset="0"/>
+              </a:rPr>
+              <a:t>and Conclusion</a:t>
             </a:r>
             <a:endParaRPr lang="en-US" dirty="0">
               <a:solidFill>
@@ -3737,247 +3668,247 @@
               </a:spcAft>
             </a:pPr>
             <a:r>
-              <a:rPr lang="en-US" dirty="0" smtClean="0">
+              <a:rPr lang="en-US" dirty="0">
                 <a:latin typeface="Verdana Regular" charset="0"/>
               </a:rPr>
               <a:t>Bullet. </a:t>
             </a:r>
             <a:r>
-              <a:rPr lang="en-US" dirty="0" err="1" smtClean="0">
+              <a:rPr lang="en-US" dirty="0" err="1">
                 <a:latin typeface="Verdana Regular" charset="0"/>
               </a:rPr>
               <a:t>lum</a:t>
             </a:r>
             <a:r>
-              <a:rPr lang="en-US" dirty="0" smtClean="0">
-                <a:latin typeface="Verdana Regular" charset="0"/>
-              </a:rPr>
-              <a:t> </a:t>
-            </a:r>
-            <a:r>
-              <a:rPr lang="en-US" dirty="0" err="1" smtClean="0">
+              <a:rPr lang="en-US" dirty="0">
+                <a:latin typeface="Verdana Regular" charset="0"/>
+              </a:rPr>
+              <a:t> </a:t>
+            </a:r>
+            <a:r>
+              <a:rPr lang="en-US" dirty="0" err="1">
                 <a:latin typeface="Verdana Regular" charset="0"/>
               </a:rPr>
               <a:t>exer</a:t>
             </a:r>
             <a:r>
-              <a:rPr lang="en-US" dirty="0" smtClean="0">
-                <a:latin typeface="Verdana Regular" charset="0"/>
-              </a:rPr>
-              <a:t> </a:t>
-            </a:r>
-            <a:r>
-              <a:rPr lang="en-US" dirty="0" err="1" smtClean="0">
+              <a:rPr lang="en-US" dirty="0">
+                <a:latin typeface="Verdana Regular" charset="0"/>
+              </a:rPr>
+              <a:t> </a:t>
+            </a:r>
+            <a:r>
+              <a:rPr lang="en-US" dirty="0" err="1">
                 <a:latin typeface="Verdana Regular" charset="0"/>
               </a:rPr>
               <a:t>adipsustrud</a:t>
             </a:r>
             <a:r>
-              <a:rPr lang="en-US" dirty="0" smtClean="0">
-                <a:latin typeface="Verdana Regular" charset="0"/>
-              </a:rPr>
-              <a:t> </a:t>
-            </a:r>
-            <a:r>
-              <a:rPr lang="en-US" dirty="0" err="1" smtClean="0">
+              <a:rPr lang="en-US" dirty="0">
+                <a:latin typeface="Verdana Regular" charset="0"/>
+              </a:rPr>
+              <a:t> </a:t>
+            </a:r>
+            <a:r>
+              <a:rPr lang="en-US" dirty="0" err="1">
                 <a:latin typeface="Verdana Regular" charset="0"/>
               </a:rPr>
               <a:t>doloree</a:t>
             </a:r>
             <a:r>
-              <a:rPr lang="en-US" dirty="0" smtClean="0">
-                <a:latin typeface="Verdana Regular" charset="0"/>
-              </a:rPr>
-              <a:t> </a:t>
-            </a:r>
-            <a:r>
-              <a:rPr lang="en-US" dirty="0" err="1" smtClean="0">
+              <a:rPr lang="en-US" dirty="0">
+                <a:latin typeface="Verdana Regular" charset="0"/>
+              </a:rPr>
+              <a:t> </a:t>
+            </a:r>
+            <a:r>
+              <a:rPr lang="en-US" dirty="0" err="1">
                 <a:latin typeface="Verdana Regular" charset="0"/>
               </a:rPr>
               <a:t>tuerat</a:t>
             </a:r>
             <a:r>
-              <a:rPr lang="en-US" dirty="0" smtClean="0">
-                <a:latin typeface="Verdana Regular" charset="0"/>
-              </a:rPr>
-              <a:t> </a:t>
-            </a:r>
-            <a:r>
-              <a:rPr lang="en-US" dirty="0" err="1" smtClean="0">
+              <a:rPr lang="en-US" dirty="0">
+                <a:latin typeface="Verdana Regular" charset="0"/>
+              </a:rPr>
+              <a:t> </a:t>
+            </a:r>
+            <a:r>
+              <a:rPr lang="en-US" dirty="0" err="1">
                 <a:latin typeface="Verdana Regular" charset="0"/>
               </a:rPr>
               <a:t>lorpera</a:t>
             </a:r>
             <a:r>
-              <a:rPr lang="en-US" dirty="0" smtClean="0">
-                <a:latin typeface="Verdana Regular" charset="0"/>
-              </a:rPr>
-              <a:t> </a:t>
-            </a:r>
-            <a:r>
-              <a:rPr lang="en-US" dirty="0" err="1" smtClean="0">
+              <a:rPr lang="en-US" dirty="0">
+                <a:latin typeface="Verdana Regular" charset="0"/>
+              </a:rPr>
+              <a:t> </a:t>
+            </a:r>
+            <a:r>
+              <a:rPr lang="en-US" dirty="0" err="1">
                 <a:latin typeface="Verdana Regular" charset="0"/>
               </a:rPr>
               <a:t>esenibh</a:t>
             </a:r>
             <a:r>
-              <a:rPr lang="en-US" dirty="0" smtClean="0">
-                <a:latin typeface="Verdana Regular" charset="0"/>
-              </a:rPr>
-              <a:t> </a:t>
-            </a:r>
-            <a:r>
-              <a:rPr lang="en-US" dirty="0" err="1" smtClean="0">
+              <a:rPr lang="en-US" dirty="0">
+                <a:latin typeface="Verdana Regular" charset="0"/>
+              </a:rPr>
+              <a:t> </a:t>
+            </a:r>
+            <a:r>
+              <a:rPr lang="en-US" dirty="0" err="1">
                 <a:latin typeface="Verdana Regular" charset="0"/>
               </a:rPr>
               <a:t>eu</a:t>
             </a:r>
             <a:r>
-              <a:rPr lang="en-US" dirty="0" smtClean="0">
-                <a:latin typeface="Verdana Regular" charset="0"/>
-              </a:rPr>
-              <a:t> </a:t>
-            </a:r>
-            <a:r>
-              <a:rPr lang="en-US" dirty="0" err="1" smtClean="0">
+              <a:rPr lang="en-US" dirty="0">
+                <a:latin typeface="Verdana Regular" charset="0"/>
+              </a:rPr>
+              <a:t> </a:t>
+            </a:r>
+            <a:r>
+              <a:rPr lang="en-US" dirty="0" err="1">
                 <a:latin typeface="Verdana Regular" charset="0"/>
               </a:rPr>
               <a:t>faccum</a:t>
             </a:r>
             <a:r>
-              <a:rPr lang="en-US" dirty="0" smtClean="0">
-                <a:latin typeface="Verdana Regular" charset="0"/>
-              </a:rPr>
-              <a:t> </a:t>
-            </a:r>
-            <a:r>
-              <a:rPr lang="en-US" dirty="0" err="1" smtClean="0">
+              <a:rPr lang="en-US" dirty="0">
+                <a:latin typeface="Verdana Regular" charset="0"/>
+              </a:rPr>
+              <a:t> </a:t>
+            </a:r>
+            <a:r>
+              <a:rPr lang="en-US" dirty="0" err="1">
                 <a:latin typeface="Verdana Regular" charset="0"/>
               </a:rPr>
               <a:t>eum</a:t>
             </a:r>
             <a:r>
-              <a:rPr lang="en-US" dirty="0" smtClean="0">
-                <a:latin typeface="Verdana Regular" charset="0"/>
-              </a:rPr>
-              <a:t> </a:t>
-            </a:r>
-            <a:r>
-              <a:rPr lang="en-US" dirty="0" err="1" smtClean="0">
+              <a:rPr lang="en-US" dirty="0">
+                <a:latin typeface="Verdana Regular" charset="0"/>
+              </a:rPr>
+              <a:t> </a:t>
+            </a:r>
+            <a:r>
+              <a:rPr lang="en-US" dirty="0" err="1">
                 <a:latin typeface="Verdana Regular" charset="0"/>
               </a:rPr>
               <a:t>iuscili</a:t>
             </a:r>
             <a:r>
-              <a:rPr lang="en-US" dirty="0" smtClean="0">
-                <a:latin typeface="Verdana Regular" charset="0"/>
-              </a:rPr>
-              <a:t> </a:t>
-            </a:r>
-            <a:r>
-              <a:rPr lang="en-US" dirty="0" err="1" smtClean="0">
+              <a:rPr lang="en-US" dirty="0">
+                <a:latin typeface="Verdana Regular" charset="0"/>
+              </a:rPr>
+              <a:t> </a:t>
+            </a:r>
+            <a:r>
+              <a:rPr lang="en-US" dirty="0" err="1">
                 <a:latin typeface="Verdana Regular" charset="0"/>
               </a:rPr>
               <a:t>quamcommy</a:t>
             </a:r>
             <a:r>
-              <a:rPr lang="en-US" dirty="0" smtClean="0">
+              <a:rPr lang="en-US" dirty="0">
                 <a:latin typeface="Verdana Regular" charset="0"/>
               </a:rPr>
               <a:t> nit </a:t>
             </a:r>
             <a:r>
-              <a:rPr lang="en-US" dirty="0" err="1" smtClean="0">
+              <a:rPr lang="en-US" dirty="0" err="1">
                 <a:latin typeface="Verdana Regular" charset="0"/>
               </a:rPr>
               <a:t>lorerillut</a:t>
             </a:r>
             <a:r>
-              <a:rPr lang="en-US" dirty="0" smtClean="0">
-                <a:latin typeface="Verdana Regular" charset="0"/>
-              </a:rPr>
-              <a:t> </a:t>
-            </a:r>
-            <a:r>
-              <a:rPr lang="en-US" dirty="0" err="1" smtClean="0">
+              <a:rPr lang="en-US" dirty="0">
+                <a:latin typeface="Verdana Regular" charset="0"/>
+              </a:rPr>
+              <a:t> </a:t>
+            </a:r>
+            <a:r>
+              <a:rPr lang="en-US" dirty="0" err="1">
                 <a:latin typeface="Verdana Regular" charset="0"/>
               </a:rPr>
               <a:t>ullam</a:t>
             </a:r>
             <a:r>
-              <a:rPr lang="en-US" dirty="0" smtClean="0">
-                <a:latin typeface="Verdana Regular" charset="0"/>
-              </a:rPr>
-              <a:t> </a:t>
-            </a:r>
-            <a:r>
-              <a:rPr lang="en-US" dirty="0" err="1" smtClean="0">
+              <a:rPr lang="en-US" dirty="0">
+                <a:latin typeface="Verdana Regular" charset="0"/>
+              </a:rPr>
+              <a:t> </a:t>
+            </a:r>
+            <a:r>
+              <a:rPr lang="en-US" dirty="0" err="1">
                 <a:latin typeface="Verdana Regular" charset="0"/>
               </a:rPr>
               <a:t>quat</a:t>
             </a:r>
             <a:r>
-              <a:rPr lang="en-US" dirty="0" smtClean="0">
+              <a:rPr lang="en-US" dirty="0">
                 <a:latin typeface="Verdana Regular" charset="0"/>
               </a:rPr>
               <a:t> lore </a:t>
             </a:r>
             <a:r>
-              <a:rPr lang="en-US" dirty="0" err="1" smtClean="0">
+              <a:rPr lang="en-US" dirty="0" err="1">
                 <a:latin typeface="Verdana Regular" charset="0"/>
               </a:rPr>
               <a:t>verostrud</a:t>
             </a:r>
             <a:r>
-              <a:rPr lang="en-US" dirty="0" smtClean="0">
-                <a:latin typeface="Verdana Regular" charset="0"/>
-              </a:rPr>
-              <a:t> </a:t>
-            </a:r>
-            <a:r>
-              <a:rPr lang="en-US" dirty="0" err="1" smtClean="0">
+              <a:rPr lang="en-US" dirty="0">
+                <a:latin typeface="Verdana Regular" charset="0"/>
+              </a:rPr>
+              <a:t> </a:t>
+            </a:r>
+            <a:r>
+              <a:rPr lang="en-US" dirty="0" err="1">
                 <a:latin typeface="Verdana Regular" charset="0"/>
               </a:rPr>
               <a:t>ming</a:t>
             </a:r>
             <a:r>
-              <a:rPr lang="en-US" dirty="0" smtClean="0">
-                <a:latin typeface="Verdana Regular" charset="0"/>
-              </a:rPr>
-              <a:t> </a:t>
-            </a:r>
-            <a:r>
-              <a:rPr lang="en-US" dirty="0" err="1" smtClean="0">
+              <a:rPr lang="en-US" dirty="0">
+                <a:latin typeface="Verdana Regular" charset="0"/>
+              </a:rPr>
+              <a:t> </a:t>
+            </a:r>
+            <a:r>
+              <a:rPr lang="en-US" dirty="0" err="1">
                 <a:latin typeface="Verdana Regular" charset="0"/>
               </a:rPr>
               <a:t>faciliquisse</a:t>
             </a:r>
             <a:r>
-              <a:rPr lang="en-US" dirty="0" smtClean="0">
-                <a:latin typeface="Verdana Regular" charset="0"/>
-              </a:rPr>
-              <a:t> </a:t>
-            </a:r>
-            <a:r>
-              <a:rPr lang="en-US" dirty="0" err="1" smtClean="0">
+              <a:rPr lang="en-US" dirty="0">
+                <a:latin typeface="Verdana Regular" charset="0"/>
+              </a:rPr>
+              <a:t> </a:t>
+            </a:r>
+            <a:r>
+              <a:rPr lang="en-US" dirty="0" err="1">
                 <a:latin typeface="Verdana Regular" charset="0"/>
               </a:rPr>
               <a:t>modolortin</a:t>
             </a:r>
             <a:r>
-              <a:rPr lang="en-US" dirty="0" smtClean="0">
-                <a:latin typeface="Verdana Regular" charset="0"/>
-              </a:rPr>
-              <a:t> </a:t>
-            </a:r>
-            <a:r>
-              <a:rPr lang="en-US" dirty="0" err="1" smtClean="0">
+              <a:rPr lang="en-US" dirty="0">
+                <a:latin typeface="Verdana Regular" charset="0"/>
+              </a:rPr>
+              <a:t> </a:t>
+            </a:r>
+            <a:r>
+              <a:rPr lang="en-US" dirty="0" err="1">
                 <a:latin typeface="Verdana Regular" charset="0"/>
               </a:rPr>
               <a:t>volore</a:t>
             </a:r>
             <a:r>
-              <a:rPr lang="en-US" dirty="0" smtClean="0">
+              <a:rPr lang="en-US" dirty="0">
                 <a:latin typeface="Verdana Regular" charset="0"/>
               </a:rPr>
               <a:t> </a:t>
@@ -3990,130 +3921,124 @@
               </a:spcAft>
             </a:pPr>
             <a:r>
-              <a:rPr lang="en-US" dirty="0" err="1" smtClean="0">
+              <a:rPr lang="en-US" dirty="0" err="1">
                 <a:latin typeface="Verdana Regular" charset="0"/>
               </a:rPr>
               <a:t>Vel</a:t>
             </a:r>
             <a:r>
-              <a:rPr lang="en-US" dirty="0" smtClean="0">
+              <a:rPr lang="en-US" dirty="0">
                 <a:latin typeface="Verdana Regular" charset="0"/>
               </a:rPr>
               <a:t> et </a:t>
             </a:r>
             <a:r>
-              <a:rPr lang="en-US" dirty="0" err="1" smtClean="0">
+              <a:rPr lang="en-US" dirty="0" err="1">
                 <a:latin typeface="Verdana Regular" charset="0"/>
               </a:rPr>
               <a:t>vel</a:t>
             </a:r>
             <a:r>
-              <a:rPr lang="en-US" dirty="0" smtClean="0">
-                <a:latin typeface="Verdana Regular" charset="0"/>
-              </a:rPr>
-              <a:t> </a:t>
-            </a:r>
-            <a:r>
-              <a:rPr lang="en-US" dirty="0" err="1" smtClean="0">
+              <a:rPr lang="en-US" dirty="0">
+                <a:latin typeface="Verdana Regular" charset="0"/>
+              </a:rPr>
+              <a:t> </a:t>
+            </a:r>
+            <a:r>
+              <a:rPr lang="en-US" dirty="0" err="1">
                 <a:latin typeface="Verdana Regular" charset="0"/>
               </a:rPr>
               <a:t>dionsenit</a:t>
             </a:r>
             <a:r>
-              <a:rPr lang="en-US" dirty="0" smtClean="0">
-                <a:latin typeface="Verdana Regular" charset="0"/>
-              </a:rPr>
-              <a:t> </a:t>
-            </a:r>
-            <a:r>
-              <a:rPr lang="en-US" dirty="0" err="1" smtClean="0">
+              <a:rPr lang="en-US" dirty="0">
+                <a:latin typeface="Verdana Regular" charset="0"/>
+              </a:rPr>
+              <a:t> </a:t>
+            </a:r>
+            <a:r>
+              <a:rPr lang="en-US" dirty="0" err="1">
                 <a:latin typeface="Verdana Regular" charset="0"/>
               </a:rPr>
               <a:t>adit</a:t>
             </a:r>
             <a:r>
-              <a:rPr lang="en-US" dirty="0" smtClean="0">
+              <a:rPr lang="en-US" dirty="0">
                 <a:latin typeface="Verdana Regular" charset="0"/>
               </a:rPr>
               <a:t>, </a:t>
             </a:r>
             <a:r>
-              <a:rPr lang="en-US" dirty="0" err="1" smtClean="0">
+              <a:rPr lang="en-US" dirty="0" err="1">
                 <a:latin typeface="Verdana Regular" charset="0"/>
               </a:rPr>
               <a:t>consenim</a:t>
             </a:r>
             <a:r>
-              <a:rPr lang="en-US" dirty="0" smtClean="0">
-                <a:latin typeface="Verdana Regular" charset="0"/>
-              </a:rPr>
-              <a:t> </a:t>
-            </a:r>
-            <a:r>
-              <a:rPr lang="en-US" dirty="0" err="1" smtClean="0">
+              <a:rPr lang="en-US" dirty="0">
+                <a:latin typeface="Verdana Regular" charset="0"/>
+              </a:rPr>
+              <a:t> </a:t>
+            </a:r>
+            <a:r>
+              <a:rPr lang="en-US" dirty="0" err="1">
                 <a:latin typeface="Verdana Regular" charset="0"/>
               </a:rPr>
               <a:t>zzrillute</a:t>
             </a:r>
             <a:r>
-              <a:rPr lang="en-US" dirty="0" smtClean="0">
+              <a:rPr lang="en-US" dirty="0">
                 <a:latin typeface="Verdana Regular" charset="0"/>
               </a:rPr>
               <a:t> el </a:t>
             </a:r>
             <a:r>
-              <a:rPr lang="en-US" dirty="0" err="1" smtClean="0">
+              <a:rPr lang="en-US" dirty="0" err="1">
                 <a:latin typeface="Verdana Regular" charset="0"/>
               </a:rPr>
               <a:t>euguerostie</a:t>
             </a:r>
             <a:r>
-              <a:rPr lang="en-US" dirty="0" smtClean="0">
-                <a:latin typeface="Verdana Regular" charset="0"/>
-              </a:rPr>
-              <a:t> </a:t>
-            </a:r>
-            <a:r>
-              <a:rPr lang="en-US" dirty="0" err="1" smtClean="0">
+              <a:rPr lang="en-US" dirty="0">
+                <a:latin typeface="Verdana Regular" charset="0"/>
+              </a:rPr>
+              <a:t> </a:t>
+            </a:r>
+            <a:r>
+              <a:rPr lang="en-US" dirty="0" err="1">
                 <a:latin typeface="Verdana Regular" charset="0"/>
               </a:rPr>
               <a:t>faci</a:t>
             </a:r>
             <a:r>
-              <a:rPr lang="en-US" dirty="0" smtClean="0">
-                <a:latin typeface="Verdana Regular" charset="0"/>
-              </a:rPr>
-              <a:t> </a:t>
-            </a:r>
-            <a:r>
-              <a:rPr lang="en-US" dirty="0" err="1" smtClean="0">
+              <a:rPr lang="en-US" dirty="0">
+                <a:latin typeface="Verdana Regular" charset="0"/>
+              </a:rPr>
+              <a:t> </a:t>
+            </a:r>
+            <a:r>
+              <a:rPr lang="en-US" dirty="0" err="1">
                 <a:latin typeface="Verdana Regular" charset="0"/>
               </a:rPr>
               <a:t>bla</a:t>
             </a:r>
             <a:r>
-              <a:rPr lang="en-US" dirty="0" smtClean="0">
-                <a:latin typeface="Verdana Regular" charset="0"/>
-              </a:rPr>
-              <a:t> </a:t>
-            </a:r>
-            <a:r>
-              <a:rPr lang="en-US" dirty="0" err="1" smtClean="0">
+              <a:rPr lang="en-US" dirty="0">
+                <a:latin typeface="Verdana Regular" charset="0"/>
+              </a:rPr>
+              <a:t> </a:t>
+            </a:r>
+            <a:r>
+              <a:rPr lang="en-US" dirty="0" err="1">
                 <a:latin typeface="Verdana Regular" charset="0"/>
               </a:rPr>
               <a:t>conse</a:t>
             </a:r>
             <a:r>
-              <a:rPr lang="en-US" dirty="0" smtClean="0">
-                <a:latin typeface="Verdana Regular" charset="0"/>
-              </a:rPr>
-              <a:t> </a:t>
-            </a:r>
-            <a:r>
-              <a:rPr lang="en-US" dirty="0">
-                <a:latin typeface="Verdana Regular" charset="0"/>
-              </a:rPr>
-              <a:t>ad </a:t>
+              <a:rPr lang="en-US" dirty="0">
+                <a:latin typeface="Verdana Regular" charset="0"/>
+              </a:rPr>
+              <a:t> ad </a:t>
             </a:r>
             <a:r>
               <a:rPr lang="en-US" dirty="0" err="1">
@@ -4236,7 +4161,7 @@
               <a:t> </a:t>
             </a:r>
             <a:r>
-              <a:rPr lang="en-US" dirty="0" err="1" smtClean="0">
+              <a:rPr lang="en-US" dirty="0" err="1">
                 <a:latin typeface="Verdana Regular" charset="0"/>
               </a:rPr>
               <a:t>conse</a:t>
@@ -4248,49 +4173,49 @@
               <a:t> </a:t>
             </a:r>
             <a:r>
-              <a:rPr lang="en-US" dirty="0" err="1" smtClean="0">
+              <a:rPr lang="en-US" dirty="0" err="1">
                 <a:latin typeface="Verdana Regular" charset="0"/>
               </a:rPr>
               <a:t>dolore</a:t>
             </a:r>
             <a:r>
-              <a:rPr lang="en-US" dirty="0" smtClean="0">
-                <a:latin typeface="Verdana Regular" charset="0"/>
-              </a:rPr>
-              <a:t> </a:t>
-            </a:r>
-            <a:r>
-              <a:rPr lang="en-US" dirty="0" err="1" smtClean="0">
+              <a:rPr lang="en-US" dirty="0">
+                <a:latin typeface="Verdana Regular" charset="0"/>
+              </a:rPr>
+              <a:t> </a:t>
+            </a:r>
+            <a:r>
+              <a:rPr lang="en-US" dirty="0" err="1">
                 <a:latin typeface="Verdana Regular" charset="0"/>
               </a:rPr>
               <a:t>tet</a:t>
             </a:r>
             <a:r>
-              <a:rPr lang="en-US" dirty="0" smtClean="0">
+              <a:rPr lang="en-US" dirty="0">
                 <a:latin typeface="Verdana Regular" charset="0"/>
               </a:rPr>
               <a:t>, </a:t>
             </a:r>
             <a:r>
-              <a:rPr lang="en-US" dirty="0" err="1" smtClean="0">
+              <a:rPr lang="en-US" dirty="0" err="1">
                 <a:latin typeface="Verdana Regular" charset="0"/>
               </a:rPr>
               <a:t>volobor</a:t>
             </a:r>
             <a:r>
-              <a:rPr lang="en-US" dirty="0" smtClean="0">
-                <a:latin typeface="Verdana Regular" charset="0"/>
-              </a:rPr>
-              <a:t> </a:t>
-            </a:r>
-            <a:r>
-              <a:rPr lang="en-US" dirty="0" err="1" smtClean="0">
+              <a:rPr lang="en-US" dirty="0">
+                <a:latin typeface="Verdana Regular" charset="0"/>
+              </a:rPr>
+              <a:t> </a:t>
+            </a:r>
+            <a:r>
+              <a:rPr lang="en-US" dirty="0" err="1">
                 <a:latin typeface="Verdana Regular" charset="0"/>
               </a:rPr>
               <a:t>si</a:t>
             </a:r>
             <a:r>
-              <a:rPr lang="en-US" dirty="0" smtClean="0">
+              <a:rPr lang="en-US" dirty="0">
                 <a:latin typeface="Verdana Regular" charset="0"/>
               </a:rPr>
               <a:t>.</a:t>
@@ -4303,151 +4228,151 @@
               </a:spcAft>
             </a:pPr>
             <a:r>
-              <a:rPr lang="en-US" dirty="0" smtClean="0">
+              <a:rPr lang="en-US" dirty="0">
                 <a:latin typeface="Verdana Regular" charset="0"/>
               </a:rPr>
               <a:t>Lore del </a:t>
             </a:r>
             <a:r>
-              <a:rPr lang="en-US" dirty="0" err="1" smtClean="0">
+              <a:rPr lang="en-US" dirty="0" err="1">
                 <a:latin typeface="Verdana Regular" charset="0"/>
               </a:rPr>
               <a:t>utatis</a:t>
             </a:r>
             <a:r>
-              <a:rPr lang="en-US" dirty="0" smtClean="0">
-                <a:latin typeface="Verdana Regular" charset="0"/>
-              </a:rPr>
-              <a:t> </a:t>
-            </a:r>
-            <a:r>
-              <a:rPr lang="en-US" dirty="0" err="1" smtClean="0">
+              <a:rPr lang="en-US" dirty="0">
+                <a:latin typeface="Verdana Regular" charset="0"/>
+              </a:rPr>
+              <a:t> </a:t>
+            </a:r>
+            <a:r>
+              <a:rPr lang="en-US" dirty="0" err="1">
                 <a:latin typeface="Verdana Regular" charset="0"/>
               </a:rPr>
               <a:t>amcorpercin</a:t>
             </a:r>
             <a:r>
-              <a:rPr lang="en-US" dirty="0" smtClean="0">
-                <a:latin typeface="Verdana Regular" charset="0"/>
-              </a:rPr>
-              <a:t> </a:t>
-            </a:r>
-            <a:r>
-              <a:rPr lang="en-US" dirty="0" err="1" smtClean="0">
+              <a:rPr lang="en-US" dirty="0">
+                <a:latin typeface="Verdana Regular" charset="0"/>
+              </a:rPr>
+              <a:t> </a:t>
+            </a:r>
+            <a:r>
+              <a:rPr lang="en-US" dirty="0" err="1">
                 <a:latin typeface="Verdana Regular" charset="0"/>
               </a:rPr>
               <a:t>henim</a:t>
             </a:r>
             <a:r>
-              <a:rPr lang="en-US" dirty="0" smtClean="0">
-                <a:latin typeface="Verdana Regular" charset="0"/>
-              </a:rPr>
-              <a:t> </a:t>
-            </a:r>
-            <a:r>
-              <a:rPr lang="en-US" dirty="0" err="1" smtClean="0">
+              <a:rPr lang="en-US" dirty="0">
+                <a:latin typeface="Verdana Regular" charset="0"/>
+              </a:rPr>
+              <a:t> </a:t>
+            </a:r>
+            <a:r>
+              <a:rPr lang="en-US" dirty="0" err="1">
                 <a:latin typeface="Verdana Regular" charset="0"/>
               </a:rPr>
               <a:t>riliq</a:t>
             </a:r>
             <a:r>
-              <a:rPr lang="en-US" dirty="0" smtClean="0">
-                <a:latin typeface="Verdana Regular" charset="0"/>
-              </a:rPr>
-              <a:t> </a:t>
-            </a:r>
-            <a:r>
-              <a:rPr lang="en-US" dirty="0" err="1" smtClean="0">
+              <a:rPr lang="en-US" dirty="0">
+                <a:latin typeface="Verdana Regular" charset="0"/>
+              </a:rPr>
+              <a:t> </a:t>
+            </a:r>
+            <a:r>
+              <a:rPr lang="en-US" dirty="0" err="1">
                 <a:latin typeface="Verdana Regular" charset="0"/>
               </a:rPr>
               <a:t>uismodo</a:t>
             </a:r>
             <a:r>
-              <a:rPr lang="en-US" dirty="0" smtClean="0">
-                <a:latin typeface="Verdana Regular" charset="0"/>
-              </a:rPr>
-              <a:t> </a:t>
-            </a:r>
-            <a:r>
-              <a:rPr lang="en-US" dirty="0" err="1" smtClean="0">
+              <a:rPr lang="en-US" dirty="0">
+                <a:latin typeface="Verdana Regular" charset="0"/>
+              </a:rPr>
+              <a:t> </a:t>
+            </a:r>
+            <a:r>
+              <a:rPr lang="en-US" dirty="0" err="1">
                 <a:latin typeface="Verdana Regular" charset="0"/>
               </a:rPr>
               <a:t>leniat</a:t>
             </a:r>
             <a:r>
-              <a:rPr lang="en-US" dirty="0" smtClean="0">
-                <a:latin typeface="Verdana Regular" charset="0"/>
-              </a:rPr>
-              <a:t> </a:t>
-            </a:r>
-            <a:r>
-              <a:rPr lang="en-US" dirty="0" err="1" smtClean="0">
+              <a:rPr lang="en-US" dirty="0">
+                <a:latin typeface="Verdana Regular" charset="0"/>
+              </a:rPr>
+              <a:t> </a:t>
+            </a:r>
+            <a:r>
+              <a:rPr lang="en-US" dirty="0" err="1">
                 <a:latin typeface="Verdana Regular" charset="0"/>
               </a:rPr>
               <a:t>aciduisl</a:t>
             </a:r>
             <a:r>
-              <a:rPr lang="en-US" dirty="0" smtClean="0">
-                <a:latin typeface="Verdana Regular" charset="0"/>
-              </a:rPr>
-              <a:t> </a:t>
-            </a:r>
-            <a:r>
-              <a:rPr lang="en-US" dirty="0" err="1" smtClean="0">
+              <a:rPr lang="en-US" dirty="0">
+                <a:latin typeface="Verdana Regular" charset="0"/>
+              </a:rPr>
+              <a:t> </a:t>
+            </a:r>
+            <a:r>
+              <a:rPr lang="en-US" dirty="0" err="1">
                 <a:latin typeface="Verdana Regular" charset="0"/>
               </a:rPr>
               <a:t>il</a:t>
             </a:r>
             <a:r>
-              <a:rPr lang="en-US" dirty="0" smtClean="0">
-                <a:latin typeface="Verdana Regular" charset="0"/>
-              </a:rPr>
-              <a:t> </a:t>
-            </a:r>
-            <a:r>
-              <a:rPr lang="en-US" dirty="0" err="1" smtClean="0">
+              <a:rPr lang="en-US" dirty="0">
+                <a:latin typeface="Verdana Regular" charset="0"/>
+              </a:rPr>
+              <a:t> </a:t>
+            </a:r>
+            <a:r>
+              <a:rPr lang="en-US" dirty="0" err="1">
                 <a:latin typeface="Verdana Regular" charset="0"/>
               </a:rPr>
               <a:t>eugait</a:t>
             </a:r>
             <a:r>
-              <a:rPr lang="en-US" dirty="0" smtClean="0">
-                <a:latin typeface="Verdana Regular" charset="0"/>
-              </a:rPr>
-              <a:t> </a:t>
-            </a:r>
-            <a:r>
-              <a:rPr lang="en-US" dirty="0" err="1" smtClean="0">
+              <a:rPr lang="en-US" dirty="0">
+                <a:latin typeface="Verdana Regular" charset="0"/>
+              </a:rPr>
+              <a:t> </a:t>
+            </a:r>
+            <a:r>
+              <a:rPr lang="en-US" dirty="0" err="1">
                 <a:latin typeface="Verdana Regular" charset="0"/>
               </a:rPr>
               <a:t>velis</a:t>
             </a:r>
             <a:r>
-              <a:rPr lang="en-US" dirty="0" smtClean="0">
-                <a:latin typeface="Verdana Regular" charset="0"/>
-              </a:rPr>
-              <a:t> </a:t>
-            </a:r>
-            <a:r>
-              <a:rPr lang="en-US" dirty="0" err="1" smtClean="0">
+              <a:rPr lang="en-US" dirty="0">
+                <a:latin typeface="Verdana Regular" charset="0"/>
+              </a:rPr>
+              <a:t> </a:t>
+            </a:r>
+            <a:r>
+              <a:rPr lang="en-US" dirty="0" err="1">
                 <a:latin typeface="Verdana Regular" charset="0"/>
               </a:rPr>
               <a:t>nos</a:t>
             </a:r>
             <a:r>
-              <a:rPr lang="en-US" dirty="0" smtClean="0">
+              <a:rPr lang="en-US" dirty="0">
                 <a:latin typeface="Verdana Regular" charset="0"/>
               </a:rPr>
               <a:t> alit prat ad </a:t>
             </a:r>
             <a:r>
-              <a:rPr lang="en-US" dirty="0" err="1" smtClean="0">
+              <a:rPr lang="en-US" dirty="0" err="1">
                 <a:latin typeface="Verdana Regular" charset="0"/>
               </a:rPr>
               <a:t>tions</a:t>
             </a:r>
             <a:r>
-              <a:rPr lang="en-US" dirty="0" smtClean="0">
+              <a:rPr lang="en-US" dirty="0">
                 <a:latin typeface="Verdana Regular" charset="0"/>
               </a:rPr>
               <a:t> et </a:t>
@@ -4465,25 +4390,25 @@
               <a:t> </a:t>
             </a:r>
             <a:r>
-              <a:rPr lang="en-US" dirty="0" err="1" smtClean="0">
+              <a:rPr lang="en-US" dirty="0" err="1">
                 <a:latin typeface="Verdana Regular" charset="0"/>
               </a:rPr>
               <a:t>euguerostie</a:t>
             </a:r>
             <a:r>
-              <a:rPr lang="en-US" dirty="0" smtClean="0">
-                <a:latin typeface="Verdana Regular" charset="0"/>
-              </a:rPr>
-              <a:t> </a:t>
-            </a:r>
-            <a:r>
-              <a:rPr lang="en-US" dirty="0" err="1" smtClean="0">
+              <a:rPr lang="en-US" dirty="0">
+                <a:latin typeface="Verdana Regular" charset="0"/>
+              </a:rPr>
+              <a:t> </a:t>
+            </a:r>
+            <a:r>
+              <a:rPr lang="en-US" dirty="0" err="1">
                 <a:latin typeface="Verdana Regular" charset="0"/>
               </a:rPr>
               <a:t>dolore</a:t>
             </a:r>
             <a:r>
-              <a:rPr lang="en-US" dirty="0" smtClean="0">
+              <a:rPr lang="en-US" dirty="0">
                 <a:latin typeface="Verdana Regular" charset="0"/>
               </a:rPr>
               <a:t> </a:t>
@@ -4532,16 +4457,10 @@
               </a:spcAft>
             </a:pPr>
             <a:r>
-              <a:rPr lang="en-US" dirty="0" smtClean="0">
-                <a:latin typeface="Verdana Regular" charset="0"/>
-              </a:rPr>
-              <a:t>Sim </a:t>
-            </a:r>
-            <a:r>
-              <a:rPr lang="en-US" dirty="0">
-                <a:latin typeface="Verdana Regular" charset="0"/>
-              </a:rPr>
-              <a:t>ipsum </a:t>
+              <a:rPr lang="en-US" dirty="0">
+                <a:latin typeface="Verdana Regular" charset="0"/>
+              </a:rPr>
+              <a:t>Sim ipsum </a:t>
             </a:r>
             <a:r>
               <a:rPr lang="en-US" dirty="0" err="1">
@@ -4712,7 +4631,7 @@
               <a:t> </a:t>
             </a:r>
             <a:r>
-              <a:rPr lang="en-US" dirty="0" err="1" smtClean="0">
+              <a:rPr lang="en-US" dirty="0" err="1">
                 <a:latin typeface="Verdana Regular" charset="0"/>
               </a:rPr>
               <a:t>eu</a:t>
@@ -4724,7 +4643,7 @@
               <a:t> </a:t>
             </a:r>
             <a:r>
-              <a:rPr lang="en-US" dirty="0" err="1" smtClean="0">
+              <a:rPr lang="en-US" dirty="0" err="1">
                 <a:latin typeface="Verdana Regular" charset="0"/>
               </a:rPr>
               <a:t>amconsequat</a:t>
@@ -4772,7 +4691,7 @@
         <p:spPr>
           <a:xfrm>
             <a:off x="1931989" y="5503233"/>
-            <a:ext cx="8158690" cy="677108"/>
+            <a:ext cx="8158690" cy="664797"/>
           </a:xfrm>
           <a:prstGeom prst="rect">
             <a:avLst/>
@@ -4948,47 +4867,14 @@
           </a:lstStyle>
           <a:p>
             <a:r>
-              <a:rPr lang="en-US" dirty="0" smtClean="0">
+              <a:rPr lang="en-US" dirty="0">
                 <a:solidFill>
                   <a:srgbClr val="FFFFFF"/>
                 </a:solidFill>
                 <a:latin typeface="Verdana Regular" charset="0"/>
               </a:rPr>
-              <a:t>Title: </a:t>
-            </a:r>
-            <a:r>
-              <a:rPr lang="en-US" dirty="0" err="1" smtClean="0">
-                <a:solidFill>
-                  <a:srgbClr val="FFFFFF"/>
-                </a:solidFill>
-                <a:latin typeface="Verdana Regular" charset="0"/>
-              </a:rPr>
-              <a:t>lorem</a:t>
-            </a:r>
-            <a:r>
-              <a:rPr lang="en-US" dirty="0" smtClean="0">
-                <a:solidFill>
-                  <a:srgbClr val="FFFFFF"/>
-                </a:solidFill>
-                <a:latin typeface="Verdana Regular" charset="0"/>
-              </a:rPr>
-              <a:t> </a:t>
-            </a:r>
-            <a:r>
-              <a:rPr lang="en-US" dirty="0" err="1" smtClean="0">
-                <a:solidFill>
-                  <a:srgbClr val="FFFFFF"/>
-                </a:solidFill>
-                <a:latin typeface="Verdana Regular" charset="0"/>
-              </a:rPr>
-              <a:t>ipsum</a:t>
-            </a:r>
-            <a:endParaRPr lang="en-US" dirty="0">
-              <a:solidFill>
-                <a:srgbClr val="FFFFFF"/>
-              </a:solidFill>
-              <a:latin typeface="Verdana Regular" charset="0"/>
-            </a:endParaRPr>
+              <a:t>Description</a:t>
+            </a:r>
           </a:p>
         </p:txBody>
       </p:sp>
@@ -8086,7 +7972,7 @@
           </a:lstStyle>
           <a:p>
             <a:r>
-              <a:rPr lang="en-US" spc="100">
+              <a:rPr lang="en-US" spc="100" dirty="0" err="1">
                 <a:solidFill>
                   <a:srgbClr val="E05529"/>
                 </a:solidFill>
@@ -8094,16 +7980,19 @@
                 <a:ea typeface="Impact" charset="0"/>
                 <a:cs typeface="Impact" charset="0"/>
               </a:rPr>
-              <a:t>Headline: lorem ipsum</a:t>
-            </a:r>
-            <a:endParaRPr lang="en-US" spc="100" dirty="0">
-              <a:solidFill>
-                <a:srgbClr val="E05529"/>
-              </a:solidFill>
-              <a:latin typeface="Impact" charset="0"/>
-              <a:ea typeface="Impact" charset="0"/>
-              <a:cs typeface="Impact" charset="0"/>
-            </a:endParaRPr>
+              <a:t>Aerolyzer</a:t>
+            </a:r>
+            <a:r>
+              <a:rPr lang="en-US" spc="100" dirty="0">
+                <a:solidFill>
+                  <a:srgbClr val="E05529"/>
+                </a:solidFill>
+                <a:latin typeface="Impact" charset="0"/>
+                <a:ea typeface="Impact" charset="0"/>
+                <a:cs typeface="Impact" charset="0"/>
+              </a:rPr>
+              <a:t> </a:t>
+            </a:r>
           </a:p>
         </p:txBody>
       </p:sp>
@@ -8297,229 +8186,8 @@
                 <a:ea typeface="Georgia" charset="0"/>
                 <a:cs typeface="Georgia" charset="0"/>
               </a:rPr>
-              <a:t>Subhead: </a:t>
-            </a:r>
-            <a:r>
-              <a:rPr lang="en-US" dirty="0" err="1">
-                <a:latin typeface="Georgia" charset="0"/>
-                <a:ea typeface="Georgia" charset="0"/>
-                <a:cs typeface="Georgia" charset="0"/>
-              </a:rPr>
-              <a:t>Uditincil</a:t>
-            </a:r>
-            <a:r>
-              <a:rPr lang="en-US" dirty="0">
-                <a:latin typeface="Georgia" charset="0"/>
-                <a:ea typeface="Georgia" charset="0"/>
-                <a:cs typeface="Georgia" charset="0"/>
-              </a:rPr>
-              <a:t> </a:t>
-            </a:r>
-            <a:r>
-              <a:rPr lang="en-US" dirty="0" err="1">
-                <a:latin typeface="Georgia" charset="0"/>
-                <a:ea typeface="Georgia" charset="0"/>
-                <a:cs typeface="Georgia" charset="0"/>
-              </a:rPr>
-              <a:t>endaeri</a:t>
-            </a:r>
-            <a:r>
-              <a:rPr lang="en-US" dirty="0">
-                <a:latin typeface="Georgia" charset="0"/>
-                <a:ea typeface="Georgia" charset="0"/>
-                <a:cs typeface="Georgia" charset="0"/>
-              </a:rPr>
-              <a:t> </a:t>
-            </a:r>
-            <a:r>
-              <a:rPr lang="en-US" dirty="0" err="1">
-                <a:latin typeface="Georgia" charset="0"/>
-                <a:ea typeface="Georgia" charset="0"/>
-                <a:cs typeface="Georgia" charset="0"/>
-              </a:rPr>
-              <a:t>sus</a:t>
-            </a:r>
-            <a:r>
-              <a:rPr lang="en-US" dirty="0">
-                <a:latin typeface="Georgia" charset="0"/>
-                <a:ea typeface="Georgia" charset="0"/>
-                <a:cs typeface="Georgia" charset="0"/>
-              </a:rPr>
-              <a:t> </a:t>
-            </a:r>
-            <a:r>
-              <a:rPr lang="en-US" dirty="0" err="1">
-                <a:latin typeface="Georgia" charset="0"/>
-                <a:ea typeface="Georgia" charset="0"/>
-                <a:cs typeface="Georgia" charset="0"/>
-              </a:rPr>
-              <a:t>sectur</a:t>
-            </a:r>
-            <a:r>
-              <a:rPr lang="en-US" dirty="0">
-                <a:latin typeface="Georgia" charset="0"/>
-                <a:ea typeface="Georgia" charset="0"/>
-                <a:cs typeface="Georgia" charset="0"/>
-              </a:rPr>
-              <a:t> </a:t>
-            </a:r>
-            <a:r>
-              <a:rPr lang="en-US" dirty="0" err="1">
-                <a:latin typeface="Georgia" charset="0"/>
-                <a:ea typeface="Georgia" charset="0"/>
-                <a:cs typeface="Georgia" charset="0"/>
-              </a:rPr>
-              <a:t>sam</a:t>
-            </a:r>
-            <a:r>
-              <a:rPr lang="en-US" dirty="0">
-                <a:latin typeface="Georgia" charset="0"/>
-                <a:ea typeface="Georgia" charset="0"/>
-                <a:cs typeface="Georgia" charset="0"/>
-              </a:rPr>
-              <a:t> </a:t>
-            </a:r>
-            <a:r>
-              <a:rPr lang="en-US" dirty="0" err="1">
-                <a:latin typeface="Georgia" charset="0"/>
-                <a:ea typeface="Georgia" charset="0"/>
-                <a:cs typeface="Georgia" charset="0"/>
-              </a:rPr>
-              <a:t>fuga</a:t>
-            </a:r>
-            <a:r>
-              <a:rPr lang="en-US" dirty="0">
-                <a:latin typeface="Georgia" charset="0"/>
-                <a:ea typeface="Georgia" charset="0"/>
-                <a:cs typeface="Georgia" charset="0"/>
-              </a:rPr>
-              <a:t> </a:t>
-            </a:r>
-            <a:r>
-              <a:rPr lang="en-US" dirty="0" err="1">
-                <a:latin typeface="Georgia" charset="0"/>
-                <a:ea typeface="Georgia" charset="0"/>
-                <a:cs typeface="Georgia" charset="0"/>
-              </a:rPr>
-              <a:t>nequo</a:t>
-            </a:r>
-            <a:r>
-              <a:rPr lang="en-US" dirty="0">
-                <a:latin typeface="Georgia" charset="0"/>
-                <a:ea typeface="Georgia" charset="0"/>
-                <a:cs typeface="Georgia" charset="0"/>
-              </a:rPr>
-              <a:t> que </a:t>
-            </a:r>
-            <a:r>
-              <a:rPr lang="en-US" dirty="0" err="1">
-                <a:latin typeface="Georgia" charset="0"/>
-                <a:ea typeface="Georgia" charset="0"/>
-                <a:cs typeface="Georgia" charset="0"/>
-              </a:rPr>
-              <a:t>consequi</a:t>
-            </a:r>
-            <a:r>
-              <a:rPr lang="en-US" dirty="0">
-                <a:latin typeface="Georgia" charset="0"/>
-                <a:ea typeface="Georgia" charset="0"/>
-                <a:cs typeface="Georgia" charset="0"/>
-              </a:rPr>
-              <a:t> </a:t>
-            </a:r>
-            <a:r>
-              <a:rPr lang="en-US" dirty="0" err="1">
-                <a:latin typeface="Georgia" charset="0"/>
-                <a:ea typeface="Georgia" charset="0"/>
-                <a:cs typeface="Georgia" charset="0"/>
-              </a:rPr>
-              <a:t>autendi</a:t>
-            </a:r>
-            <a:r>
-              <a:rPr lang="en-US" dirty="0">
-                <a:latin typeface="Georgia" charset="0"/>
-                <a:ea typeface="Georgia" charset="0"/>
-                <a:cs typeface="Georgia" charset="0"/>
-              </a:rPr>
-              <a:t> con </a:t>
-            </a:r>
-            <a:r>
-              <a:rPr lang="en-US" dirty="0" err="1">
-                <a:latin typeface="Georgia" charset="0"/>
-                <a:ea typeface="Georgia" charset="0"/>
-                <a:cs typeface="Georgia" charset="0"/>
-              </a:rPr>
-              <a:t>expelen</a:t>
-            </a:r>
-            <a:r>
-              <a:rPr lang="en-US" dirty="0">
-                <a:latin typeface="Georgia" charset="0"/>
-                <a:ea typeface="Georgia" charset="0"/>
-                <a:cs typeface="Georgia" charset="0"/>
-              </a:rPr>
-              <a:t> </a:t>
-            </a:r>
-            <a:r>
-              <a:rPr lang="en-US" dirty="0" err="1">
-                <a:latin typeface="Georgia" charset="0"/>
-                <a:ea typeface="Georgia" charset="0"/>
-                <a:cs typeface="Georgia" charset="0"/>
-              </a:rPr>
-              <a:t>ihicturibus</a:t>
-            </a:r>
-            <a:r>
-              <a:rPr lang="en-US" dirty="0">
-                <a:latin typeface="Georgia" charset="0"/>
-                <a:ea typeface="Georgia" charset="0"/>
-                <a:cs typeface="Georgia" charset="0"/>
-              </a:rPr>
-              <a:t> </a:t>
-            </a:r>
-            <a:r>
-              <a:rPr lang="en-US" dirty="0" err="1">
-                <a:latin typeface="Georgia" charset="0"/>
-                <a:ea typeface="Georgia" charset="0"/>
-                <a:cs typeface="Georgia" charset="0"/>
-              </a:rPr>
-              <a:t>duntio</a:t>
-            </a:r>
-            <a:r>
-              <a:rPr lang="en-US" dirty="0">
-                <a:latin typeface="Georgia" charset="0"/>
-                <a:ea typeface="Georgia" charset="0"/>
-                <a:cs typeface="Georgia" charset="0"/>
-              </a:rPr>
-              <a:t> </a:t>
-            </a:r>
-            <a:r>
-              <a:rPr lang="en-US" dirty="0" err="1">
-                <a:latin typeface="Georgia" charset="0"/>
-                <a:ea typeface="Georgia" charset="0"/>
-                <a:cs typeface="Georgia" charset="0"/>
-              </a:rPr>
-              <a:t>dest</a:t>
-            </a:r>
-            <a:r>
-              <a:rPr lang="en-US" dirty="0">
-                <a:latin typeface="Georgia" charset="0"/>
-                <a:ea typeface="Georgia" charset="0"/>
-                <a:cs typeface="Georgia" charset="0"/>
-              </a:rPr>
-              <a:t> </a:t>
-            </a:r>
-            <a:r>
-              <a:rPr lang="en-US" dirty="0" err="1">
-                <a:latin typeface="Georgia" charset="0"/>
-                <a:ea typeface="Georgia" charset="0"/>
-                <a:cs typeface="Georgia" charset="0"/>
-              </a:rPr>
-              <a:t>quibusam</a:t>
-            </a:r>
-            <a:endParaRPr lang="en-US" dirty="0">
-              <a:latin typeface="Georgia" charset="0"/>
-              <a:ea typeface="Georgia" charset="0"/>
-              <a:cs typeface="Georgia" charset="0"/>
-            </a:endParaRPr>
+              <a:t>In the air we breathe there’s more than just O2, the particles we TAGLINE GOES HERE</a:t>
+            </a:r>
           </a:p>
         </p:txBody>
       </p:sp>
@@ -8710,47 +8378,14 @@
           </a:lstStyle>
           <a:p>
             <a:r>
-              <a:rPr lang="en-US" dirty="0" smtClean="0">
+              <a:rPr lang="en-US" dirty="0">
                 <a:solidFill>
                   <a:srgbClr val="FFFFFF"/>
                 </a:solidFill>
                 <a:latin typeface="Verdana Regular" charset="0"/>
               </a:rPr>
-              <a:t>Title: </a:t>
-            </a:r>
-            <a:r>
-              <a:rPr lang="en-US" dirty="0" err="1" smtClean="0">
-                <a:solidFill>
-                  <a:srgbClr val="FFFFFF"/>
-                </a:solidFill>
-                <a:latin typeface="Verdana Regular" charset="0"/>
-              </a:rPr>
-              <a:t>lorem</a:t>
-            </a:r>
-            <a:r>
-              <a:rPr lang="en-US" dirty="0" smtClean="0">
-                <a:solidFill>
-                  <a:srgbClr val="FFFFFF"/>
-                </a:solidFill>
-                <a:latin typeface="Verdana Regular" charset="0"/>
-              </a:rPr>
-              <a:t> </a:t>
-            </a:r>
-            <a:r>
-              <a:rPr lang="en-US" dirty="0" err="1" smtClean="0">
-                <a:solidFill>
-                  <a:srgbClr val="FFFFFF"/>
-                </a:solidFill>
-                <a:latin typeface="Verdana Regular" charset="0"/>
-              </a:rPr>
-              <a:t>ipsum</a:t>
-            </a:r>
-            <a:endParaRPr lang="en-US" dirty="0">
-              <a:solidFill>
-                <a:srgbClr val="FFFFFF"/>
-              </a:solidFill>
-              <a:latin typeface="Verdana Regular" charset="0"/>
-            </a:endParaRPr>
+              <a:t>Client and Team</a:t>
+            </a:r>
           </a:p>
         </p:txBody>
       </p:sp>
@@ -9013,13 +8648,13 @@
               <a:t> </a:t>
             </a:r>
             <a:r>
-              <a:rPr lang="en-US" dirty="0" err="1" smtClean="0">
+              <a:rPr lang="en-US" dirty="0" err="1">
                 <a:latin typeface="Verdana Regular" charset="0"/>
               </a:rPr>
               <a:t>volore</a:t>
             </a:r>
             <a:r>
-              <a:rPr lang="en-US" dirty="0" smtClean="0">
+              <a:rPr lang="en-US" dirty="0">
                 <a:latin typeface="Verdana Regular" charset="0"/>
               </a:rPr>
               <a:t> </a:t>
@@ -9104,7 +8739,7 @@
               <a:t> et </a:t>
             </a:r>
             <a:r>
-              <a:rPr lang="en-US" dirty="0" err="1" smtClean="0">
+              <a:rPr lang="en-US" dirty="0" err="1">
                 <a:latin typeface="Verdana Regular" charset="0"/>
               </a:rPr>
               <a:t>audae</a:t>
@@ -9116,13 +8751,13 @@
               <a:t> </a:t>
             </a:r>
             <a:r>
-              <a:rPr lang="en-US" dirty="0" err="1" smtClean="0">
+              <a:rPr lang="en-US" dirty="0" err="1">
                 <a:latin typeface="Verdana Regular" charset="0"/>
               </a:rPr>
               <a:t>usted</a:t>
             </a:r>
             <a:r>
-              <a:rPr lang="en-US" dirty="0" smtClean="0">
+              <a:rPr lang="en-US" dirty="0">
                 <a:latin typeface="Verdana Regular" charset="0"/>
               </a:rPr>
               <a:t> </a:t>
@@ -9176,25 +8811,25 @@
               <a:t> </a:t>
             </a:r>
             <a:r>
-              <a:rPr lang="en-US" dirty="0" err="1" smtClean="0">
+              <a:rPr lang="en-US" dirty="0" err="1">
                 <a:latin typeface="Verdana Regular" charset="0"/>
               </a:rPr>
               <a:t>volumpt</a:t>
             </a:r>
             <a:r>
-              <a:rPr lang="en-US" dirty="0" smtClean="0">
-                <a:latin typeface="Verdana Regular" charset="0"/>
-              </a:rPr>
-              <a:t> </a:t>
-            </a:r>
-            <a:r>
-              <a:rPr lang="en-US" dirty="0" err="1" smtClean="0">
+              <a:rPr lang="en-US" dirty="0">
+                <a:latin typeface="Verdana Regular" charset="0"/>
+              </a:rPr>
+              <a:t> </a:t>
+            </a:r>
+            <a:r>
+              <a:rPr lang="en-US" dirty="0" err="1">
                 <a:latin typeface="Verdana Regular" charset="0"/>
               </a:rPr>
               <a:t>molorestio</a:t>
             </a:r>
             <a:r>
-              <a:rPr lang="en-US" dirty="0" smtClean="0">
+              <a:rPr lang="en-US" dirty="0">
                 <a:latin typeface="Verdana Regular" charset="0"/>
               </a:rPr>
               <a:t> </a:t>
@@ -9368,31 +9003,31 @@
               <a:t>, que </a:t>
             </a:r>
             <a:r>
-              <a:rPr lang="en-US" dirty="0" err="1" smtClean="0">
+              <a:rPr lang="en-US" dirty="0" err="1">
                 <a:latin typeface="Verdana Regular" charset="0"/>
               </a:rPr>
               <a:t>nimi</a:t>
             </a:r>
             <a:r>
-              <a:rPr lang="en-US" dirty="0" smtClean="0">
-                <a:latin typeface="Verdana Regular" charset="0"/>
-              </a:rPr>
-              <a:t> </a:t>
-            </a:r>
-            <a:r>
-              <a:rPr lang="en-US" dirty="0" err="1" smtClean="0">
+              <a:rPr lang="en-US" dirty="0">
+                <a:latin typeface="Verdana Regular" charset="0"/>
+              </a:rPr>
+              <a:t> </a:t>
+            </a:r>
+            <a:r>
+              <a:rPr lang="en-US" dirty="0" err="1">
                 <a:latin typeface="Verdana Regular" charset="0"/>
               </a:rPr>
               <a:t>ncima</a:t>
             </a:r>
             <a:r>
-              <a:rPr lang="en-US" dirty="0" smtClean="0">
-                <a:latin typeface="Verdana Regular" charset="0"/>
-              </a:rPr>
-              <a:t> </a:t>
-            </a:r>
-            <a:r>
-              <a:rPr lang="en-US" dirty="0" err="1" smtClean="0">
+              <a:rPr lang="en-US" dirty="0">
+                <a:latin typeface="Verdana Regular" charset="0"/>
+              </a:rPr>
+              <a:t> </a:t>
+            </a:r>
+            <a:r>
+              <a:rPr lang="en-US" dirty="0" err="1">
                 <a:latin typeface="Verdana Regular" charset="0"/>
               </a:rPr>
               <a:t>nimus</a:t>
@@ -9404,13 +9039,13 @@
               <a:t> </a:t>
             </a:r>
             <a:r>
-              <a:rPr lang="en-US" dirty="0" err="1" smtClean="0">
+              <a:rPr lang="en-US" dirty="0" err="1">
                 <a:latin typeface="Verdana Regular" charset="0"/>
               </a:rPr>
               <a:t>est</a:t>
             </a:r>
             <a:r>
-              <a:rPr lang="en-US" dirty="0" smtClean="0">
+              <a:rPr lang="en-US" dirty="0">
                 <a:latin typeface="Verdana Regular" charset="0"/>
               </a:rPr>
               <a:t> </a:t>
@@ -9497,22 +9132,16 @@
               <a:rPr lang="en-US" dirty="0">
                 <a:latin typeface="Verdana Regular" charset="0"/>
               </a:rPr>
-              <a:t> dis </a:t>
-            </a:r>
-            <a:r>
-              <a:rPr lang="en-US" dirty="0" smtClean="0">
-                <a:latin typeface="Verdana Regular" charset="0"/>
-              </a:rPr>
-              <a:t>non </a:t>
-            </a:r>
-            <a:r>
-              <a:rPr lang="en-US" dirty="0" err="1" smtClean="0">
+              <a:t> dis non </a:t>
+            </a:r>
+            <a:r>
+              <a:rPr lang="en-US" dirty="0" err="1">
                 <a:latin typeface="Verdana Regular" charset="0"/>
               </a:rPr>
               <a:t>sequi</a:t>
             </a:r>
             <a:r>
-              <a:rPr lang="en-US" dirty="0" smtClean="0">
+              <a:rPr lang="en-US" dirty="0">
                 <a:latin typeface="Verdana Regular" charset="0"/>
               </a:rPr>
               <a:t> </a:t>
@@ -9849,22 +9478,16 @@
               <a:t>, </a:t>
             </a:r>
             <a:r>
-              <a:rPr lang="en-US" dirty="0" err="1" smtClean="0">
+              <a:rPr lang="en-US" dirty="0" err="1">
                 <a:latin typeface="Verdana Regular" charset="0"/>
               </a:rPr>
               <a:t>omniaed</a:t>
             </a:r>
             <a:r>
-              <a:rPr lang="en-US" dirty="0" smtClean="0">
-                <a:latin typeface="Verdana Regular" charset="0"/>
-              </a:rPr>
-              <a:t> </a:t>
-            </a:r>
-            <a:r>
-              <a:rPr lang="en-US" dirty="0">
-                <a:latin typeface="Verdana Regular" charset="0"/>
-              </a:rPr>
-              <a:t>et </a:t>
+              <a:rPr lang="en-US" dirty="0">
+                <a:latin typeface="Verdana Regular" charset="0"/>
+              </a:rPr>
+              <a:t> et </a:t>
             </a:r>
             <a:r>
               <a:rPr lang="en-US" dirty="0" err="1">
@@ -10521,13 +10144,7 @@
               <a:rPr lang="en-US" dirty="0">
                 <a:latin typeface="Verdana Regular" charset="0"/>
               </a:rPr>
-              <a:t> est</a:t>
-            </a:r>
-            <a:r>
-              <a:rPr lang="en-US" dirty="0" smtClean="0">
-                <a:latin typeface="Verdana Regular" charset="0"/>
-              </a:rPr>
-              <a:t>.</a:t>
+              <a:t> est.</a:t>
             </a:r>
           </a:p>
         </p:txBody>
@@ -10579,18 +10196,13 @@
               </a:spcBef>
             </a:pPr>
             <a:r>
-              <a:rPr lang="en-US" sz="5400" spc="520" baseline="0" dirty="0" smtClean="0">
+              <a:rPr lang="en-US" sz="5400" spc="520" baseline="0" dirty="0">
                 <a:latin typeface="Impact" charset="0"/>
                 <a:ea typeface="Impact" charset="0"/>
                 <a:cs typeface="Impact" charset="0"/>
               </a:rPr>
               <a:t>###</a:t>
             </a:r>
-            <a:endParaRPr lang="en-US" sz="5400" spc="520" baseline="0" dirty="0">
-              <a:latin typeface="Impact" charset="0"/>
-              <a:ea typeface="Impact" charset="0"/>
-              <a:cs typeface="Impact" charset="0"/>
-            </a:endParaRPr>
           </a:p>
         </p:txBody>
       </p:sp>
@@ -10862,7 +10474,7 @@
   <a:extraClrSchemeLst/>
   <a:extLst>
     <a:ext uri="{05A4C25C-085E-4340-85A3-A5531E510DB2}">
-      <thm15:themeFamily xmlns:thm15="http://schemas.microsoft.com/office/thememl/2012/main" xmlns="" name="research_poster_template-48x36" id="{0FFAA6C9-1816-164A-913C-442D436FEA80}" vid="{D21D638B-596F-CB49-840C-9C72AB38A70B}"/>
+      <thm15:themeFamily xmlns:thm15="http://schemas.microsoft.com/office/thememl/2012/main" name="research_poster_template-48x36" id="{0FFAA6C9-1816-164A-913C-442D436FEA80}" vid="{D21D638B-596F-CB49-840C-9C72AB38A70B}"/>
     </a:ext>
   </a:extLst>
 </a:theme>
@@ -11123,7 +10735,7 @@
   <a:extraClrSchemeLst/>
   <a:extLst>
     <a:ext uri="{05A4C25C-085E-4340-85A3-A5531E510DB2}">
-      <thm15:themeFamily xmlns:thm15="http://schemas.microsoft.com/office/thememl/2012/main" xmlns="" name="Office Theme" id="{62F939B6-93AF-4DB8-9C6B-D6C7DFDC589F}" vid="{4A3C46E8-61CC-4603-A589-7422A47A8E4A}"/>
+      <thm15:themeFamily xmlns:thm15="http://schemas.microsoft.com/office/thememl/2012/main" name="Office Theme" id="{62F939B6-93AF-4DB8-9C6B-D6C7DFDC589F}" vid="{4A3C46E8-61CC-4603-A589-7422A47A8E4A}"/>
     </a:ext>
   </a:extLst>
 </a:theme>

</xml_diff>

<commit_message>
Moved Conclusion to its own section
</commit_message>
<xml_diff>
--- a/Poster/poster_undergrad_expo_48x36_eecs.pptx
+++ b/Poster/poster_undergrad_expo_48x36_eecs.pptx
@@ -1828,7 +1828,12 @@
             <p:ph type="pic" sz="quarter" idx="10"/>
           </p:nvPr>
         </p:nvSpPr>
-        <p:spPr/>
+        <p:spPr>
+          <a:xfrm>
+            <a:off x="12304713" y="9976466"/>
+            <a:ext cx="19243675" cy="12045642"/>
+          </a:xfrm>
+        </p:spPr>
       </p:sp>
       <p:sp>
         <p:nvSpPr>
@@ -2492,7 +2497,7 @@
                 </a:solidFill>
                 <a:latin typeface="Verdana Regular" charset="0"/>
               </a:rPr>
-              <a:t>Results and Conclusion</a:t>
+              <a:t>Results</a:t>
             </a:r>
           </a:p>
         </p:txBody>
@@ -4798,7 +4803,7 @@
         <p:spPr>
           <a:xfrm>
             <a:off x="33716912" y="14141317"/>
-            <a:ext cx="8126412" cy="14311610"/>
+            <a:ext cx="8126412" cy="5129609"/>
           </a:xfrm>
           <a:prstGeom prst="rect">
             <a:avLst/>
@@ -5603,946 +5608,6 @@
                 <a:latin typeface="Verdana Regular" charset="0"/>
               </a:rPr>
               <a:t>.</a:t>
-            </a:r>
-          </a:p>
-          <a:p>
-            <a:pPr>
-              <a:spcAft>
-                <a:spcPts val="2600"/>
-              </a:spcAft>
-            </a:pPr>
-            <a:r>
-              <a:rPr lang="en-US" dirty="0" err="1">
-                <a:latin typeface="Verdana Regular" charset="0"/>
-              </a:rPr>
-              <a:t>Ut</a:t>
-            </a:r>
-            <a:r>
-              <a:rPr lang="en-US" dirty="0">
-                <a:latin typeface="Verdana Regular" charset="0"/>
-              </a:rPr>
-              <a:t> </a:t>
-            </a:r>
-            <a:r>
-              <a:rPr lang="en-US" dirty="0" err="1">
-                <a:latin typeface="Verdana Regular" charset="0"/>
-              </a:rPr>
-              <a:t>volore</a:t>
-            </a:r>
-            <a:r>
-              <a:rPr lang="en-US" dirty="0">
-                <a:latin typeface="Verdana Regular" charset="0"/>
-              </a:rPr>
-              <a:t> </a:t>
-            </a:r>
-            <a:r>
-              <a:rPr lang="en-US" dirty="0" err="1">
-                <a:latin typeface="Verdana Regular" charset="0"/>
-              </a:rPr>
-              <a:t>secuptio</a:t>
-            </a:r>
-            <a:r>
-              <a:rPr lang="en-US" dirty="0">
-                <a:latin typeface="Verdana Regular" charset="0"/>
-              </a:rPr>
-              <a:t> </a:t>
-            </a:r>
-            <a:r>
-              <a:rPr lang="en-US" dirty="0" err="1">
-                <a:latin typeface="Verdana Regular" charset="0"/>
-              </a:rPr>
-              <a:t>es</a:t>
-            </a:r>
-            <a:r>
-              <a:rPr lang="en-US" dirty="0">
-                <a:latin typeface="Verdana Regular" charset="0"/>
-              </a:rPr>
-              <a:t> rem </a:t>
-            </a:r>
-            <a:r>
-              <a:rPr lang="en-US" dirty="0" err="1">
-                <a:latin typeface="Verdana Regular" charset="0"/>
-              </a:rPr>
-              <a:t>rerati</a:t>
-            </a:r>
-            <a:r>
-              <a:rPr lang="en-US" dirty="0">
-                <a:latin typeface="Verdana Regular" charset="0"/>
-              </a:rPr>
-              <a:t> </a:t>
-            </a:r>
-            <a:r>
-              <a:rPr lang="en-US" dirty="0" err="1">
-                <a:latin typeface="Verdana Regular" charset="0"/>
-              </a:rPr>
-              <a:t>volor</a:t>
-            </a:r>
-            <a:r>
-              <a:rPr lang="en-US" dirty="0">
-                <a:latin typeface="Verdana Regular" charset="0"/>
-              </a:rPr>
-              <a:t> </a:t>
-            </a:r>
-            <a:r>
-              <a:rPr lang="en-US" dirty="0" err="1">
-                <a:latin typeface="Verdana Regular" charset="0"/>
-              </a:rPr>
-              <a:t>atem</a:t>
-            </a:r>
-            <a:r>
-              <a:rPr lang="en-US" dirty="0">
-                <a:latin typeface="Verdana Regular" charset="0"/>
-              </a:rPr>
-              <a:t> </a:t>
-            </a:r>
-            <a:r>
-              <a:rPr lang="en-US" dirty="0" err="1">
-                <a:latin typeface="Verdana Regular" charset="0"/>
-              </a:rPr>
-              <a:t>lic</a:t>
-            </a:r>
-            <a:r>
-              <a:rPr lang="en-US" dirty="0">
-                <a:latin typeface="Verdana Regular" charset="0"/>
-              </a:rPr>
-              <a:t> </a:t>
-            </a:r>
-            <a:r>
-              <a:rPr lang="en-US" dirty="0" err="1">
-                <a:latin typeface="Verdana Regular" charset="0"/>
-              </a:rPr>
-              <a:t>te</a:t>
-            </a:r>
-            <a:r>
-              <a:rPr lang="en-US" dirty="0">
-                <a:latin typeface="Verdana Regular" charset="0"/>
-              </a:rPr>
-              <a:t> </a:t>
-            </a:r>
-            <a:r>
-              <a:rPr lang="en-US" dirty="0" err="1">
-                <a:latin typeface="Verdana Regular" charset="0"/>
-              </a:rPr>
-              <a:t>voloria</a:t>
-            </a:r>
-            <a:r>
-              <a:rPr lang="en-US" dirty="0">
-                <a:latin typeface="Verdana Regular" charset="0"/>
-              </a:rPr>
-              <a:t> qui </a:t>
-            </a:r>
-            <a:r>
-              <a:rPr lang="en-US" dirty="0" err="1">
-                <a:latin typeface="Verdana Regular" charset="0"/>
-              </a:rPr>
-              <a:t>simporest</a:t>
-            </a:r>
-            <a:r>
-              <a:rPr lang="en-US" dirty="0">
-                <a:latin typeface="Verdana Regular" charset="0"/>
-              </a:rPr>
-              <a:t> </a:t>
-            </a:r>
-            <a:r>
-              <a:rPr lang="en-US" dirty="0" err="1">
-                <a:latin typeface="Verdana Regular" charset="0"/>
-              </a:rPr>
-              <a:t>doluptat</a:t>
-            </a:r>
-            <a:r>
-              <a:rPr lang="en-US" dirty="0">
-                <a:latin typeface="Verdana Regular" charset="0"/>
-              </a:rPr>
-              <a:t> </a:t>
-            </a:r>
-            <a:r>
-              <a:rPr lang="en-US" dirty="0" err="1">
-                <a:latin typeface="Verdana Regular" charset="0"/>
-              </a:rPr>
-              <a:t>etur</a:t>
-            </a:r>
-            <a:r>
-              <a:rPr lang="en-US" dirty="0">
-                <a:latin typeface="Verdana Regular" charset="0"/>
-              </a:rPr>
-              <a:t>? </a:t>
-            </a:r>
-            <a:r>
-              <a:rPr lang="en-US" dirty="0" err="1">
-                <a:latin typeface="Verdana Regular" charset="0"/>
-              </a:rPr>
-              <a:t>Alignit</a:t>
-            </a:r>
-            <a:r>
-              <a:rPr lang="en-US" dirty="0">
-                <a:latin typeface="Verdana Regular" charset="0"/>
-              </a:rPr>
-              <a:t> </a:t>
-            </a:r>
-            <a:r>
-              <a:rPr lang="en-US" dirty="0" err="1">
-                <a:latin typeface="Verdana Regular" charset="0"/>
-              </a:rPr>
-              <a:t>volorae</a:t>
-            </a:r>
-            <a:r>
-              <a:rPr lang="en-US" dirty="0">
-                <a:latin typeface="Verdana Regular" charset="0"/>
-              </a:rPr>
-              <a:t> </a:t>
-            </a:r>
-            <a:r>
-              <a:rPr lang="en-US" dirty="0" err="1">
-                <a:latin typeface="Verdana Regular" charset="0"/>
-              </a:rPr>
-              <a:t>venimai</a:t>
-            </a:r>
-            <a:r>
-              <a:rPr lang="en-US" dirty="0">
-                <a:latin typeface="Verdana Regular" charset="0"/>
-              </a:rPr>
-              <a:t> </a:t>
-            </a:r>
-            <a:r>
-              <a:rPr lang="en-US" dirty="0" err="1">
-                <a:latin typeface="Verdana Regular" charset="0"/>
-              </a:rPr>
-              <a:t>onsequame</a:t>
-            </a:r>
-            <a:r>
-              <a:rPr lang="en-US" dirty="0">
-                <a:latin typeface="Verdana Regular" charset="0"/>
-              </a:rPr>
-              <a:t> </a:t>
-            </a:r>
-            <a:r>
-              <a:rPr lang="en-US" dirty="0" err="1">
-                <a:latin typeface="Verdana Regular" charset="0"/>
-              </a:rPr>
-              <a:t>odipitatur</a:t>
-            </a:r>
-            <a:r>
-              <a:rPr lang="en-US" dirty="0">
-                <a:latin typeface="Verdana Regular" charset="0"/>
-              </a:rPr>
-              <a:t> </a:t>
-            </a:r>
-            <a:r>
-              <a:rPr lang="en-US" dirty="0" err="1">
-                <a:latin typeface="Verdana Regular" charset="0"/>
-              </a:rPr>
-              <a:t>sequosa</a:t>
-            </a:r>
-            <a:r>
-              <a:rPr lang="en-US" dirty="0">
-                <a:latin typeface="Verdana Regular" charset="0"/>
-              </a:rPr>
-              <a:t> </a:t>
-            </a:r>
-            <a:r>
-              <a:rPr lang="en-US" dirty="0" err="1">
-                <a:latin typeface="Verdana Regular" charset="0"/>
-              </a:rPr>
-              <a:t>ntiste</a:t>
-            </a:r>
-            <a:r>
-              <a:rPr lang="en-US" dirty="0">
-                <a:latin typeface="Verdana Regular" charset="0"/>
-              </a:rPr>
-              <a:t> </a:t>
-            </a:r>
-            <a:r>
-              <a:rPr lang="en-US" dirty="0" err="1">
-                <a:latin typeface="Verdana Regular" charset="0"/>
-              </a:rPr>
-              <a:t>ea</a:t>
-            </a:r>
-            <a:r>
-              <a:rPr lang="en-US" dirty="0">
-                <a:latin typeface="Verdana Regular" charset="0"/>
-              </a:rPr>
-              <a:t> id que </a:t>
-            </a:r>
-            <a:r>
-              <a:rPr lang="en-US" dirty="0" err="1">
-                <a:latin typeface="Verdana Regular" charset="0"/>
-              </a:rPr>
-              <a:t>ipsam</a:t>
-            </a:r>
-            <a:r>
-              <a:rPr lang="en-US" dirty="0">
-                <a:latin typeface="Verdana Regular" charset="0"/>
-              </a:rPr>
-              <a:t>, </a:t>
-            </a:r>
-            <a:r>
-              <a:rPr lang="en-US" dirty="0" err="1">
-                <a:latin typeface="Verdana Regular" charset="0"/>
-              </a:rPr>
-              <a:t>omniaed</a:t>
-            </a:r>
-            <a:r>
-              <a:rPr lang="en-US" dirty="0">
-                <a:latin typeface="Verdana Regular" charset="0"/>
-              </a:rPr>
-              <a:t> et </a:t>
-            </a:r>
-            <a:r>
-              <a:rPr lang="en-US" dirty="0" err="1">
-                <a:latin typeface="Verdana Regular" charset="0"/>
-              </a:rPr>
-              <a:t>offictus</a:t>
-            </a:r>
-            <a:r>
-              <a:rPr lang="en-US" dirty="0">
-                <a:latin typeface="Verdana Regular" charset="0"/>
-              </a:rPr>
-              <a:t> </a:t>
-            </a:r>
-            <a:r>
-              <a:rPr lang="en-US" dirty="0" err="1">
-                <a:latin typeface="Verdana Regular" charset="0"/>
-              </a:rPr>
-              <a:t>moluptiis</a:t>
-            </a:r>
-            <a:r>
-              <a:rPr lang="en-US" dirty="0">
-                <a:latin typeface="Verdana Regular" charset="0"/>
-              </a:rPr>
-              <a:t> et </a:t>
-            </a:r>
-            <a:r>
-              <a:rPr lang="en-US" dirty="0" err="1">
-                <a:latin typeface="Verdana Regular" charset="0"/>
-              </a:rPr>
-              <a:t>ius</a:t>
-            </a:r>
-            <a:r>
-              <a:rPr lang="en-US" dirty="0">
-                <a:latin typeface="Verdana Regular" charset="0"/>
-              </a:rPr>
-              <a:t>.</a:t>
-            </a:r>
-          </a:p>
-          <a:p>
-            <a:pPr>
-              <a:spcAft>
-                <a:spcPts val="2600"/>
-              </a:spcAft>
-            </a:pPr>
-            <a:r>
-              <a:rPr lang="en-US" dirty="0">
-                <a:latin typeface="Verdana Regular" charset="0"/>
-              </a:rPr>
-              <a:t>Qui </a:t>
-            </a:r>
-            <a:r>
-              <a:rPr lang="en-US" dirty="0" err="1">
-                <a:latin typeface="Verdana Regular" charset="0"/>
-              </a:rPr>
-              <a:t>archili</a:t>
-            </a:r>
-            <a:r>
-              <a:rPr lang="en-US" dirty="0">
-                <a:latin typeface="Verdana Regular" charset="0"/>
-              </a:rPr>
-              <a:t> </a:t>
-            </a:r>
-            <a:r>
-              <a:rPr lang="en-US" dirty="0" err="1">
-                <a:latin typeface="Verdana Regular" charset="0"/>
-              </a:rPr>
-              <a:t>busdae</a:t>
-            </a:r>
-            <a:r>
-              <a:rPr lang="en-US" dirty="0">
-                <a:latin typeface="Verdana Regular" charset="0"/>
-              </a:rPr>
-              <a:t> </a:t>
-            </a:r>
-            <a:r>
-              <a:rPr lang="en-US" dirty="0" err="1">
-                <a:latin typeface="Verdana Regular" charset="0"/>
-              </a:rPr>
-              <a:t>exere</a:t>
-            </a:r>
-            <a:r>
-              <a:rPr lang="en-US" dirty="0">
-                <a:latin typeface="Verdana Regular" charset="0"/>
-              </a:rPr>
-              <a:t> </a:t>
-            </a:r>
-            <a:r>
-              <a:rPr lang="en-US" dirty="0" err="1">
-                <a:latin typeface="Verdana Regular" charset="0"/>
-              </a:rPr>
-              <a:t>quias</a:t>
-            </a:r>
-            <a:r>
-              <a:rPr lang="en-US" dirty="0">
-                <a:latin typeface="Verdana Regular" charset="0"/>
-              </a:rPr>
-              <a:t> </a:t>
-            </a:r>
-            <a:r>
-              <a:rPr lang="en-US" dirty="0" err="1">
-                <a:latin typeface="Verdana Regular" charset="0"/>
-              </a:rPr>
-              <a:t>essum</a:t>
-            </a:r>
-            <a:r>
-              <a:rPr lang="en-US" dirty="0">
-                <a:latin typeface="Verdana Regular" charset="0"/>
-              </a:rPr>
-              <a:t> </a:t>
-            </a:r>
-            <a:r>
-              <a:rPr lang="en-US" dirty="0" err="1">
-                <a:latin typeface="Verdana Regular" charset="0"/>
-              </a:rPr>
-              <a:t>fugiand</a:t>
-            </a:r>
-            <a:r>
-              <a:rPr lang="en-US" dirty="0">
-                <a:latin typeface="Verdana Regular" charset="0"/>
-              </a:rPr>
-              <a:t> </a:t>
-            </a:r>
-            <a:r>
-              <a:rPr lang="en-US" dirty="0" err="1">
-                <a:latin typeface="Verdana Regular" charset="0"/>
-              </a:rPr>
-              <a:t>itisquo</a:t>
-            </a:r>
-            <a:r>
-              <a:rPr lang="en-US" dirty="0">
-                <a:latin typeface="Verdana Regular" charset="0"/>
-              </a:rPr>
-              <a:t> </a:t>
-            </a:r>
-            <a:r>
-              <a:rPr lang="en-US" dirty="0" err="1">
-                <a:latin typeface="Verdana Regular" charset="0"/>
-              </a:rPr>
-              <a:t>occulla</a:t>
-            </a:r>
-            <a:r>
-              <a:rPr lang="en-US" dirty="0">
-                <a:latin typeface="Verdana Regular" charset="0"/>
-              </a:rPr>
-              <a:t> </a:t>
-            </a:r>
-            <a:r>
-              <a:rPr lang="en-US" dirty="0" err="1">
-                <a:latin typeface="Verdana Regular" charset="0"/>
-              </a:rPr>
-              <a:t>utendi</a:t>
-            </a:r>
-            <a:r>
-              <a:rPr lang="en-US" dirty="0">
-                <a:latin typeface="Verdana Regular" charset="0"/>
-              </a:rPr>
-              <a:t> </a:t>
-            </a:r>
-            <a:r>
-              <a:rPr lang="en-US" dirty="0" err="1">
-                <a:latin typeface="Verdana Regular" charset="0"/>
-              </a:rPr>
-              <a:t>autaquo</a:t>
-            </a:r>
-            <a:r>
-              <a:rPr lang="en-US" dirty="0">
-                <a:latin typeface="Verdana Regular" charset="0"/>
-              </a:rPr>
-              <a:t> </a:t>
-            </a:r>
-            <a:r>
-              <a:rPr lang="en-US" dirty="0" err="1">
-                <a:latin typeface="Verdana Regular" charset="0"/>
-              </a:rPr>
-              <a:t>doluptu</a:t>
-            </a:r>
-            <a:r>
-              <a:rPr lang="en-US" dirty="0">
-                <a:latin typeface="Verdana Regular" charset="0"/>
-              </a:rPr>
-              <a:t> </a:t>
-            </a:r>
-            <a:r>
-              <a:rPr lang="en-US" dirty="0" err="1">
-                <a:latin typeface="Verdana Regular" charset="0"/>
-              </a:rPr>
-              <a:t>stotate</a:t>
-            </a:r>
-            <a:r>
-              <a:rPr lang="en-US" dirty="0">
-                <a:latin typeface="Verdana Regular" charset="0"/>
-              </a:rPr>
-              <a:t> pre </a:t>
-            </a:r>
-            <a:r>
-              <a:rPr lang="en-US" dirty="0" err="1">
-                <a:latin typeface="Verdana Regular" charset="0"/>
-              </a:rPr>
-              <a:t>poris</a:t>
-            </a:r>
-            <a:r>
-              <a:rPr lang="en-US" dirty="0">
-                <a:latin typeface="Verdana Regular" charset="0"/>
-              </a:rPr>
-              <a:t> </a:t>
-            </a:r>
-            <a:r>
-              <a:rPr lang="en-US" dirty="0" err="1">
-                <a:latin typeface="Verdana Regular" charset="0"/>
-              </a:rPr>
-              <a:t>diciumqui</a:t>
-            </a:r>
-            <a:r>
-              <a:rPr lang="en-US" dirty="0">
-                <a:latin typeface="Verdana Regular" charset="0"/>
-              </a:rPr>
-              <a:t> </a:t>
-            </a:r>
-            <a:r>
-              <a:rPr lang="en-US" dirty="0" err="1">
-                <a:latin typeface="Verdana Regular" charset="0"/>
-              </a:rPr>
-              <a:t>officipsapic</a:t>
-            </a:r>
-            <a:r>
-              <a:rPr lang="en-US" dirty="0">
-                <a:latin typeface="Verdana Regular" charset="0"/>
-              </a:rPr>
-              <a:t> to </a:t>
-            </a:r>
-            <a:r>
-              <a:rPr lang="en-US" dirty="0" err="1">
-                <a:latin typeface="Verdana Regular" charset="0"/>
-              </a:rPr>
-              <a:t>modi</a:t>
-            </a:r>
-            <a:r>
-              <a:rPr lang="en-US" dirty="0">
-                <a:latin typeface="Verdana Regular" charset="0"/>
-              </a:rPr>
-              <a:t> quos </a:t>
-            </a:r>
-            <a:r>
-              <a:rPr lang="en-US" dirty="0" err="1">
-                <a:latin typeface="Verdana Regular" charset="0"/>
-              </a:rPr>
-              <a:t>eum</a:t>
-            </a:r>
-            <a:r>
-              <a:rPr lang="en-US" dirty="0">
-                <a:latin typeface="Verdana Regular" charset="0"/>
-              </a:rPr>
-              <a:t> rem sit </a:t>
-            </a:r>
-            <a:r>
-              <a:rPr lang="en-US" dirty="0" err="1">
-                <a:latin typeface="Verdana Regular" charset="0"/>
-              </a:rPr>
-              <a:t>quasse</a:t>
-            </a:r>
-            <a:r>
-              <a:rPr lang="en-US" dirty="0">
-                <a:latin typeface="Verdana Regular" charset="0"/>
-              </a:rPr>
-              <a:t> </a:t>
-            </a:r>
-            <a:r>
-              <a:rPr lang="en-US" dirty="0" err="1">
-                <a:latin typeface="Verdana Regular" charset="0"/>
-              </a:rPr>
-              <a:t>accatur</a:t>
-            </a:r>
-            <a:r>
-              <a:rPr lang="en-US" dirty="0">
-                <a:latin typeface="Verdana Regular" charset="0"/>
-              </a:rPr>
-              <a:t>?</a:t>
-            </a:r>
-          </a:p>
-          <a:p>
-            <a:pPr>
-              <a:spcAft>
-                <a:spcPts val="2600"/>
-              </a:spcAft>
-            </a:pPr>
-            <a:r>
-              <a:rPr lang="en-US" dirty="0">
-                <a:latin typeface="Verdana Regular" charset="0"/>
-              </a:rPr>
-              <a:t>Obis </a:t>
-            </a:r>
-            <a:r>
-              <a:rPr lang="en-US" dirty="0" err="1">
-                <a:latin typeface="Verdana Regular" charset="0"/>
-              </a:rPr>
-              <a:t>erit</a:t>
-            </a:r>
-            <a:r>
-              <a:rPr lang="en-US" dirty="0">
-                <a:latin typeface="Verdana Regular" charset="0"/>
-              </a:rPr>
-              <a:t> </a:t>
-            </a:r>
-            <a:r>
-              <a:rPr lang="en-US" dirty="0" err="1">
-                <a:latin typeface="Verdana Regular" charset="0"/>
-              </a:rPr>
-              <a:t>erianti</a:t>
-            </a:r>
-            <a:r>
-              <a:rPr lang="en-US" dirty="0">
-                <a:latin typeface="Verdana Regular" charset="0"/>
-              </a:rPr>
-              <a:t> debit, </a:t>
-            </a:r>
-            <a:r>
-              <a:rPr lang="en-US" dirty="0" err="1">
-                <a:latin typeface="Verdana Regular" charset="0"/>
-              </a:rPr>
-              <a:t>odi</a:t>
-            </a:r>
-            <a:r>
-              <a:rPr lang="en-US" dirty="0">
-                <a:latin typeface="Verdana Regular" charset="0"/>
-              </a:rPr>
-              <a:t> </a:t>
-            </a:r>
-            <a:r>
-              <a:rPr lang="en-US" dirty="0" err="1">
-                <a:latin typeface="Verdana Regular" charset="0"/>
-              </a:rPr>
-              <a:t>consequate</a:t>
-            </a:r>
-            <a:r>
-              <a:rPr lang="en-US" dirty="0">
-                <a:latin typeface="Verdana Regular" charset="0"/>
-              </a:rPr>
-              <a:t> </a:t>
-            </a:r>
-            <a:r>
-              <a:rPr lang="en-US" dirty="0" err="1">
-                <a:latin typeface="Verdana Regular" charset="0"/>
-              </a:rPr>
-              <a:t>dolupta</a:t>
-            </a:r>
-            <a:r>
-              <a:rPr lang="en-US" dirty="0">
-                <a:latin typeface="Verdana Regular" charset="0"/>
-              </a:rPr>
-              <a:t> </a:t>
-            </a:r>
-            <a:r>
-              <a:rPr lang="en-US" dirty="0" err="1">
-                <a:latin typeface="Verdana Regular" charset="0"/>
-              </a:rPr>
-              <a:t>epudit</a:t>
-            </a:r>
-            <a:r>
-              <a:rPr lang="en-US" dirty="0">
-                <a:latin typeface="Verdana Regular" charset="0"/>
-              </a:rPr>
-              <a:t> et </a:t>
-            </a:r>
-            <a:r>
-              <a:rPr lang="en-US" dirty="0" err="1">
-                <a:latin typeface="Verdana Regular" charset="0"/>
-              </a:rPr>
-              <a:t>etur</a:t>
-            </a:r>
-            <a:r>
-              <a:rPr lang="en-US" dirty="0">
-                <a:latin typeface="Verdana Regular" charset="0"/>
-              </a:rPr>
-              <a:t> </a:t>
-            </a:r>
-            <a:r>
-              <a:rPr lang="en-US" dirty="0" err="1">
-                <a:latin typeface="Verdana Regular" charset="0"/>
-              </a:rPr>
-              <a:t>rempore</a:t>
-            </a:r>
-            <a:r>
-              <a:rPr lang="en-US" dirty="0">
-                <a:latin typeface="Verdana Regular" charset="0"/>
-              </a:rPr>
-              <a:t>. Lam </a:t>
-            </a:r>
-            <a:r>
-              <a:rPr lang="en-US" dirty="0" err="1">
-                <a:latin typeface="Verdana Regular" charset="0"/>
-              </a:rPr>
-              <a:t>ariae</a:t>
-            </a:r>
-            <a:r>
-              <a:rPr lang="en-US" dirty="0">
-                <a:latin typeface="Verdana Regular" charset="0"/>
-              </a:rPr>
-              <a:t> </a:t>
-            </a:r>
-            <a:r>
-              <a:rPr lang="en-US" dirty="0" err="1">
-                <a:latin typeface="Verdana Regular" charset="0"/>
-              </a:rPr>
-              <a:t>aperit</a:t>
-            </a:r>
-            <a:r>
-              <a:rPr lang="en-US" dirty="0">
-                <a:latin typeface="Verdana Regular" charset="0"/>
-              </a:rPr>
-              <a:t>, </a:t>
-            </a:r>
-            <a:r>
-              <a:rPr lang="en-US" dirty="0" err="1">
-                <a:latin typeface="Verdana Regular" charset="0"/>
-              </a:rPr>
-              <a:t>officatio</a:t>
-            </a:r>
-            <a:r>
-              <a:rPr lang="en-US" dirty="0">
-                <a:latin typeface="Verdana Regular" charset="0"/>
-              </a:rPr>
-              <a:t> </a:t>
-            </a:r>
-            <a:r>
-              <a:rPr lang="en-US" dirty="0" err="1">
-                <a:latin typeface="Verdana Regular" charset="0"/>
-              </a:rPr>
-              <a:t>eos</a:t>
-            </a:r>
-            <a:r>
-              <a:rPr lang="en-US" dirty="0">
-                <a:latin typeface="Verdana Regular" charset="0"/>
-              </a:rPr>
-              <a:t> </a:t>
-            </a:r>
-            <a:r>
-              <a:rPr lang="en-US" dirty="0" err="1">
-                <a:latin typeface="Verdana Regular" charset="0"/>
-              </a:rPr>
-              <a:t>quia</a:t>
-            </a:r>
-            <a:r>
-              <a:rPr lang="en-US" dirty="0">
-                <a:latin typeface="Verdana Regular" charset="0"/>
-              </a:rPr>
-              <a:t> </a:t>
-            </a:r>
-            <a:r>
-              <a:rPr lang="en-US" dirty="0" err="1">
-                <a:latin typeface="Verdana Regular" charset="0"/>
-              </a:rPr>
-              <a:t>sandaectae</a:t>
-            </a:r>
-            <a:r>
-              <a:rPr lang="en-US" dirty="0">
-                <a:latin typeface="Verdana Regular" charset="0"/>
-              </a:rPr>
-              <a:t>. </a:t>
-            </a:r>
-            <a:r>
-              <a:rPr lang="en-US" dirty="0" err="1">
-                <a:latin typeface="Verdana Regular" charset="0"/>
-              </a:rPr>
-              <a:t>Ut</a:t>
-            </a:r>
-            <a:r>
-              <a:rPr lang="en-US" dirty="0">
-                <a:latin typeface="Verdana Regular" charset="0"/>
-              </a:rPr>
-              <a:t> </a:t>
-            </a:r>
-            <a:r>
-              <a:rPr lang="en-US" dirty="0" err="1">
-                <a:latin typeface="Verdana Regular" charset="0"/>
-              </a:rPr>
-              <a:t>aribuscimpor</a:t>
-            </a:r>
-            <a:r>
-              <a:rPr lang="en-US" dirty="0">
-                <a:latin typeface="Verdana Regular" charset="0"/>
-              </a:rPr>
-              <a:t> </a:t>
-            </a:r>
-            <a:r>
-              <a:rPr lang="en-US" dirty="0" err="1">
-                <a:latin typeface="Verdana Regular" charset="0"/>
-              </a:rPr>
-              <a:t>moloris</a:t>
-            </a:r>
-            <a:r>
-              <a:rPr lang="en-US" dirty="0">
-                <a:latin typeface="Verdana Regular" charset="0"/>
-              </a:rPr>
-              <a:t> non.. </a:t>
-            </a:r>
-          </a:p>
-          <a:p>
-            <a:pPr>
-              <a:spcAft>
-                <a:spcPts val="2600"/>
-              </a:spcAft>
-            </a:pPr>
-            <a:r>
-              <a:rPr lang="en-US" dirty="0" err="1">
-                <a:latin typeface="Verdana Regular" charset="0"/>
-              </a:rPr>
-              <a:t>odipsae</a:t>
-            </a:r>
-            <a:r>
-              <a:rPr lang="en-US" dirty="0">
-                <a:latin typeface="Verdana Regular" charset="0"/>
-              </a:rPr>
-              <a:t> id </a:t>
-            </a:r>
-            <a:r>
-              <a:rPr lang="en-US" dirty="0" err="1">
-                <a:latin typeface="Verdana Regular" charset="0"/>
-              </a:rPr>
-              <a:t>quaepe</a:t>
-            </a:r>
-            <a:r>
-              <a:rPr lang="en-US" dirty="0">
-                <a:latin typeface="Verdana Regular" charset="0"/>
-              </a:rPr>
-              <a:t> que </a:t>
-            </a:r>
-            <a:r>
-              <a:rPr lang="en-US" dirty="0" err="1">
-                <a:latin typeface="Verdana Regular" charset="0"/>
-              </a:rPr>
-              <a:t>doluptas</a:t>
-            </a:r>
-            <a:r>
-              <a:rPr lang="en-US" dirty="0">
-                <a:latin typeface="Verdana Regular" charset="0"/>
-              </a:rPr>
-              <a:t> et </a:t>
-            </a:r>
-            <a:r>
-              <a:rPr lang="en-US" dirty="0" err="1">
-                <a:latin typeface="Verdana Regular" charset="0"/>
-              </a:rPr>
-              <a:t>placcullias</a:t>
-            </a:r>
-            <a:r>
-              <a:rPr lang="en-US" dirty="0">
-                <a:latin typeface="Verdana Regular" charset="0"/>
-              </a:rPr>
-              <a:t> </a:t>
-            </a:r>
-            <a:r>
-              <a:rPr lang="en-US" dirty="0" err="1">
-                <a:latin typeface="Verdana Regular" charset="0"/>
-              </a:rPr>
-              <a:t>peditaturis</a:t>
-            </a:r>
-            <a:r>
-              <a:rPr lang="en-US" dirty="0">
-                <a:latin typeface="Verdana Regular" charset="0"/>
-              </a:rPr>
-              <a:t> </a:t>
-            </a:r>
-            <a:r>
-              <a:rPr lang="en-US" dirty="0" err="1">
-                <a:latin typeface="Verdana Regular" charset="0"/>
-              </a:rPr>
-              <a:t>dolorem</a:t>
-            </a:r>
-            <a:r>
-              <a:rPr lang="en-US" dirty="0">
-                <a:latin typeface="Verdana Regular" charset="0"/>
-              </a:rPr>
-              <a:t> et </a:t>
-            </a:r>
-            <a:r>
-              <a:rPr lang="en-US" dirty="0" err="1">
-                <a:latin typeface="Verdana Regular" charset="0"/>
-              </a:rPr>
-              <a:t>recusda</a:t>
-            </a:r>
-            <a:r>
-              <a:rPr lang="en-US" dirty="0">
-                <a:latin typeface="Verdana Regular" charset="0"/>
-              </a:rPr>
-              <a:t> </a:t>
-            </a:r>
-            <a:r>
-              <a:rPr lang="en-US" dirty="0" err="1">
-                <a:latin typeface="Verdana Regular" charset="0"/>
-              </a:rPr>
-              <a:t>ntiberum</a:t>
-            </a:r>
-            <a:r>
-              <a:rPr lang="en-US" dirty="0">
-                <a:latin typeface="Verdana Regular" charset="0"/>
-              </a:rPr>
-              <a:t> </a:t>
-            </a:r>
-            <a:r>
-              <a:rPr lang="en-US" dirty="0" err="1">
-                <a:latin typeface="Verdana Regular" charset="0"/>
-              </a:rPr>
-              <a:t>eos</a:t>
-            </a:r>
-            <a:r>
-              <a:rPr lang="en-US" dirty="0">
-                <a:latin typeface="Verdana Regular" charset="0"/>
-              </a:rPr>
-              <a:t> </a:t>
-            </a:r>
-            <a:r>
-              <a:rPr lang="en-US" dirty="0" err="1">
-                <a:latin typeface="Verdana Regular" charset="0"/>
-              </a:rPr>
-              <a:t>imi</a:t>
-            </a:r>
-            <a:r>
-              <a:rPr lang="en-US" dirty="0">
-                <a:latin typeface="Verdana Regular" charset="0"/>
-              </a:rPr>
-              <a:t> </a:t>
-            </a:r>
-            <a:r>
-              <a:rPr lang="en-US" dirty="0" err="1">
-                <a:latin typeface="Verdana Regular" charset="0"/>
-              </a:rPr>
-              <a:t>quaeperro</a:t>
-            </a:r>
-            <a:r>
-              <a:rPr lang="en-US" dirty="0">
-                <a:latin typeface="Verdana Regular" charset="0"/>
-              </a:rPr>
-              <a:t> </a:t>
-            </a:r>
-            <a:r>
-              <a:rPr lang="en-US" dirty="0" err="1">
-                <a:latin typeface="Verdana Regular" charset="0"/>
-              </a:rPr>
-              <a:t>ea</a:t>
-            </a:r>
-            <a:r>
-              <a:rPr lang="en-US" dirty="0">
-                <a:latin typeface="Verdana Regular" charset="0"/>
-              </a:rPr>
-              <a:t> </a:t>
-            </a:r>
-            <a:r>
-              <a:rPr lang="en-US" dirty="0" err="1">
-                <a:latin typeface="Verdana Regular" charset="0"/>
-              </a:rPr>
-              <a:t>ipiet</a:t>
-            </a:r>
-            <a:r>
-              <a:rPr lang="en-US" dirty="0">
-                <a:latin typeface="Verdana Regular" charset="0"/>
-              </a:rPr>
-              <a:t> est.</a:t>
             </a:r>
           </a:p>
         </p:txBody>
@@ -6600,6 +5665,1466 @@
                 <a:cs typeface="Impact" charset="0"/>
               </a:rPr>
               <a:t>###</a:t>
+            </a:r>
+          </a:p>
+        </p:txBody>
+      </p:sp>
+      <p:sp>
+        <p:nvSpPr>
+          <p:cNvPr id="4" name="TextBox 3">
+            <a:extLst>
+              <a:ext uri="{FF2B5EF4-FFF2-40B4-BE49-F238E27FC236}">
+                <a16:creationId xmlns:a16="http://schemas.microsoft.com/office/drawing/2014/main" id="{47C7D8C3-99A1-4A76-BEDA-30852CE9155D}"/>
+              </a:ext>
+            </a:extLst>
+          </p:cNvPr>
+          <p:cNvSpPr txBox="1"/>
+          <p:nvPr/>
+        </p:nvSpPr>
+        <p:spPr>
+          <a:xfrm>
+            <a:off x="33952922" y="20785368"/>
+            <a:ext cx="8158690" cy="9182001"/>
+          </a:xfrm>
+          <a:prstGeom prst="rect">
+            <a:avLst/>
+          </a:prstGeom>
+          <a:noFill/>
+        </p:spPr>
+        <p:txBody>
+          <a:bodyPr wrap="square" rtlCol="0">
+            <a:spAutoFit/>
+          </a:bodyPr>
+          <a:lstStyle/>
+          <a:p>
+            <a:pPr>
+              <a:spcAft>
+                <a:spcPts val="2600"/>
+              </a:spcAft>
+            </a:pPr>
+            <a:r>
+              <a:rPr lang="en-US" sz="2800" dirty="0">
+                <a:latin typeface="Verdana" panose="020B0604030504040204" pitchFamily="34" charset="0"/>
+                <a:ea typeface="Verdana" panose="020B0604030504040204" pitchFamily="34" charset="0"/>
+                <a:cs typeface="Verdana" panose="020B0604030504040204" pitchFamily="34" charset="0"/>
+              </a:rPr>
+              <a:t>Ut </a:t>
+            </a:r>
+            <a:r>
+              <a:rPr lang="en-US" sz="2800" dirty="0" err="1">
+                <a:latin typeface="Verdana" panose="020B0604030504040204" pitchFamily="34" charset="0"/>
+                <a:ea typeface="Verdana" panose="020B0604030504040204" pitchFamily="34" charset="0"/>
+                <a:cs typeface="Verdana" panose="020B0604030504040204" pitchFamily="34" charset="0"/>
+              </a:rPr>
+              <a:t>volore</a:t>
+            </a:r>
+            <a:r>
+              <a:rPr lang="en-US" sz="2800" dirty="0">
+                <a:latin typeface="Verdana" panose="020B0604030504040204" pitchFamily="34" charset="0"/>
+                <a:ea typeface="Verdana" panose="020B0604030504040204" pitchFamily="34" charset="0"/>
+                <a:cs typeface="Verdana" panose="020B0604030504040204" pitchFamily="34" charset="0"/>
+              </a:rPr>
+              <a:t> </a:t>
+            </a:r>
+            <a:r>
+              <a:rPr lang="en-US" sz="2800" dirty="0" err="1">
+                <a:latin typeface="Verdana" panose="020B0604030504040204" pitchFamily="34" charset="0"/>
+                <a:ea typeface="Verdana" panose="020B0604030504040204" pitchFamily="34" charset="0"/>
+                <a:cs typeface="Verdana" panose="020B0604030504040204" pitchFamily="34" charset="0"/>
+              </a:rPr>
+              <a:t>secuptio</a:t>
+            </a:r>
+            <a:r>
+              <a:rPr lang="en-US" sz="2800" dirty="0">
+                <a:latin typeface="Verdana" panose="020B0604030504040204" pitchFamily="34" charset="0"/>
+                <a:ea typeface="Verdana" panose="020B0604030504040204" pitchFamily="34" charset="0"/>
+                <a:cs typeface="Verdana" panose="020B0604030504040204" pitchFamily="34" charset="0"/>
+              </a:rPr>
+              <a:t> </a:t>
+            </a:r>
+            <a:r>
+              <a:rPr lang="en-US" sz="2800" dirty="0" err="1">
+                <a:latin typeface="Verdana" panose="020B0604030504040204" pitchFamily="34" charset="0"/>
+                <a:ea typeface="Verdana" panose="020B0604030504040204" pitchFamily="34" charset="0"/>
+                <a:cs typeface="Verdana" panose="020B0604030504040204" pitchFamily="34" charset="0"/>
+              </a:rPr>
+              <a:t>es</a:t>
+            </a:r>
+            <a:r>
+              <a:rPr lang="en-US" sz="2800" dirty="0">
+                <a:latin typeface="Verdana" panose="020B0604030504040204" pitchFamily="34" charset="0"/>
+                <a:ea typeface="Verdana" panose="020B0604030504040204" pitchFamily="34" charset="0"/>
+                <a:cs typeface="Verdana" panose="020B0604030504040204" pitchFamily="34" charset="0"/>
+              </a:rPr>
+              <a:t> rem </a:t>
+            </a:r>
+            <a:r>
+              <a:rPr lang="en-US" sz="2800" dirty="0" err="1">
+                <a:latin typeface="Verdana" panose="020B0604030504040204" pitchFamily="34" charset="0"/>
+                <a:ea typeface="Verdana" panose="020B0604030504040204" pitchFamily="34" charset="0"/>
+                <a:cs typeface="Verdana" panose="020B0604030504040204" pitchFamily="34" charset="0"/>
+              </a:rPr>
+              <a:t>rerati</a:t>
+            </a:r>
+            <a:r>
+              <a:rPr lang="en-US" sz="2800" dirty="0">
+                <a:latin typeface="Verdana" panose="020B0604030504040204" pitchFamily="34" charset="0"/>
+                <a:ea typeface="Verdana" panose="020B0604030504040204" pitchFamily="34" charset="0"/>
+                <a:cs typeface="Verdana" panose="020B0604030504040204" pitchFamily="34" charset="0"/>
+              </a:rPr>
+              <a:t> </a:t>
+            </a:r>
+            <a:r>
+              <a:rPr lang="en-US" sz="2800" dirty="0" err="1">
+                <a:latin typeface="Verdana" panose="020B0604030504040204" pitchFamily="34" charset="0"/>
+                <a:ea typeface="Verdana" panose="020B0604030504040204" pitchFamily="34" charset="0"/>
+                <a:cs typeface="Verdana" panose="020B0604030504040204" pitchFamily="34" charset="0"/>
+              </a:rPr>
+              <a:t>volor</a:t>
+            </a:r>
+            <a:r>
+              <a:rPr lang="en-US" sz="2800" dirty="0">
+                <a:latin typeface="Verdana" panose="020B0604030504040204" pitchFamily="34" charset="0"/>
+                <a:ea typeface="Verdana" panose="020B0604030504040204" pitchFamily="34" charset="0"/>
+                <a:cs typeface="Verdana" panose="020B0604030504040204" pitchFamily="34" charset="0"/>
+              </a:rPr>
+              <a:t> </a:t>
+            </a:r>
+            <a:r>
+              <a:rPr lang="en-US" sz="2800" dirty="0" err="1">
+                <a:latin typeface="Verdana" panose="020B0604030504040204" pitchFamily="34" charset="0"/>
+                <a:ea typeface="Verdana" panose="020B0604030504040204" pitchFamily="34" charset="0"/>
+                <a:cs typeface="Verdana" panose="020B0604030504040204" pitchFamily="34" charset="0"/>
+              </a:rPr>
+              <a:t>atem</a:t>
+            </a:r>
+            <a:r>
+              <a:rPr lang="en-US" sz="2800" dirty="0">
+                <a:latin typeface="Verdana" panose="020B0604030504040204" pitchFamily="34" charset="0"/>
+                <a:ea typeface="Verdana" panose="020B0604030504040204" pitchFamily="34" charset="0"/>
+                <a:cs typeface="Verdana" panose="020B0604030504040204" pitchFamily="34" charset="0"/>
+              </a:rPr>
+              <a:t> </a:t>
+            </a:r>
+            <a:r>
+              <a:rPr lang="en-US" sz="2800" dirty="0" err="1">
+                <a:latin typeface="Verdana" panose="020B0604030504040204" pitchFamily="34" charset="0"/>
+                <a:ea typeface="Verdana" panose="020B0604030504040204" pitchFamily="34" charset="0"/>
+                <a:cs typeface="Verdana" panose="020B0604030504040204" pitchFamily="34" charset="0"/>
+              </a:rPr>
+              <a:t>lic</a:t>
+            </a:r>
+            <a:r>
+              <a:rPr lang="en-US" sz="2800" dirty="0">
+                <a:latin typeface="Verdana" panose="020B0604030504040204" pitchFamily="34" charset="0"/>
+                <a:ea typeface="Verdana" panose="020B0604030504040204" pitchFamily="34" charset="0"/>
+                <a:cs typeface="Verdana" panose="020B0604030504040204" pitchFamily="34" charset="0"/>
+              </a:rPr>
+              <a:t> </a:t>
+            </a:r>
+            <a:r>
+              <a:rPr lang="en-US" sz="2800" dirty="0" err="1">
+                <a:latin typeface="Verdana" panose="020B0604030504040204" pitchFamily="34" charset="0"/>
+                <a:ea typeface="Verdana" panose="020B0604030504040204" pitchFamily="34" charset="0"/>
+                <a:cs typeface="Verdana" panose="020B0604030504040204" pitchFamily="34" charset="0"/>
+              </a:rPr>
+              <a:t>te</a:t>
+            </a:r>
+            <a:r>
+              <a:rPr lang="en-US" sz="2800" dirty="0">
+                <a:latin typeface="Verdana" panose="020B0604030504040204" pitchFamily="34" charset="0"/>
+                <a:ea typeface="Verdana" panose="020B0604030504040204" pitchFamily="34" charset="0"/>
+                <a:cs typeface="Verdana" panose="020B0604030504040204" pitchFamily="34" charset="0"/>
+              </a:rPr>
+              <a:t> </a:t>
+            </a:r>
+            <a:r>
+              <a:rPr lang="en-US" sz="2800" dirty="0" err="1">
+                <a:latin typeface="Verdana" panose="020B0604030504040204" pitchFamily="34" charset="0"/>
+                <a:ea typeface="Verdana" panose="020B0604030504040204" pitchFamily="34" charset="0"/>
+                <a:cs typeface="Verdana" panose="020B0604030504040204" pitchFamily="34" charset="0"/>
+              </a:rPr>
+              <a:t>voloria</a:t>
+            </a:r>
+            <a:r>
+              <a:rPr lang="en-US" sz="2800" dirty="0">
+                <a:latin typeface="Verdana" panose="020B0604030504040204" pitchFamily="34" charset="0"/>
+                <a:ea typeface="Verdana" panose="020B0604030504040204" pitchFamily="34" charset="0"/>
+                <a:cs typeface="Verdana" panose="020B0604030504040204" pitchFamily="34" charset="0"/>
+              </a:rPr>
+              <a:t> qui </a:t>
+            </a:r>
+            <a:r>
+              <a:rPr lang="en-US" sz="2800" dirty="0" err="1">
+                <a:latin typeface="Verdana" panose="020B0604030504040204" pitchFamily="34" charset="0"/>
+                <a:ea typeface="Verdana" panose="020B0604030504040204" pitchFamily="34" charset="0"/>
+                <a:cs typeface="Verdana" panose="020B0604030504040204" pitchFamily="34" charset="0"/>
+              </a:rPr>
+              <a:t>simporest</a:t>
+            </a:r>
+            <a:r>
+              <a:rPr lang="en-US" sz="2800" dirty="0">
+                <a:latin typeface="Verdana" panose="020B0604030504040204" pitchFamily="34" charset="0"/>
+                <a:ea typeface="Verdana" panose="020B0604030504040204" pitchFamily="34" charset="0"/>
+                <a:cs typeface="Verdana" panose="020B0604030504040204" pitchFamily="34" charset="0"/>
+              </a:rPr>
+              <a:t> </a:t>
+            </a:r>
+            <a:r>
+              <a:rPr lang="en-US" sz="2800" dirty="0" err="1">
+                <a:latin typeface="Verdana" panose="020B0604030504040204" pitchFamily="34" charset="0"/>
+                <a:ea typeface="Verdana" panose="020B0604030504040204" pitchFamily="34" charset="0"/>
+                <a:cs typeface="Verdana" panose="020B0604030504040204" pitchFamily="34" charset="0"/>
+              </a:rPr>
+              <a:t>doluptat</a:t>
+            </a:r>
+            <a:r>
+              <a:rPr lang="en-US" sz="2800" dirty="0">
+                <a:latin typeface="Verdana" panose="020B0604030504040204" pitchFamily="34" charset="0"/>
+                <a:ea typeface="Verdana" panose="020B0604030504040204" pitchFamily="34" charset="0"/>
+                <a:cs typeface="Verdana" panose="020B0604030504040204" pitchFamily="34" charset="0"/>
+              </a:rPr>
+              <a:t> </a:t>
+            </a:r>
+            <a:r>
+              <a:rPr lang="en-US" sz="2800" dirty="0" err="1">
+                <a:latin typeface="Verdana" panose="020B0604030504040204" pitchFamily="34" charset="0"/>
+                <a:ea typeface="Verdana" panose="020B0604030504040204" pitchFamily="34" charset="0"/>
+                <a:cs typeface="Verdana" panose="020B0604030504040204" pitchFamily="34" charset="0"/>
+              </a:rPr>
+              <a:t>etur</a:t>
+            </a:r>
+            <a:r>
+              <a:rPr lang="en-US" sz="2800" dirty="0">
+                <a:latin typeface="Verdana" panose="020B0604030504040204" pitchFamily="34" charset="0"/>
+                <a:ea typeface="Verdana" panose="020B0604030504040204" pitchFamily="34" charset="0"/>
+                <a:cs typeface="Verdana" panose="020B0604030504040204" pitchFamily="34" charset="0"/>
+              </a:rPr>
+              <a:t>? </a:t>
+            </a:r>
+            <a:r>
+              <a:rPr lang="en-US" sz="2800" dirty="0" err="1">
+                <a:latin typeface="Verdana" panose="020B0604030504040204" pitchFamily="34" charset="0"/>
+                <a:ea typeface="Verdana" panose="020B0604030504040204" pitchFamily="34" charset="0"/>
+                <a:cs typeface="Verdana" panose="020B0604030504040204" pitchFamily="34" charset="0"/>
+              </a:rPr>
+              <a:t>Alignit</a:t>
+            </a:r>
+            <a:r>
+              <a:rPr lang="en-US" sz="2800" dirty="0">
+                <a:latin typeface="Verdana" panose="020B0604030504040204" pitchFamily="34" charset="0"/>
+                <a:ea typeface="Verdana" panose="020B0604030504040204" pitchFamily="34" charset="0"/>
+                <a:cs typeface="Verdana" panose="020B0604030504040204" pitchFamily="34" charset="0"/>
+              </a:rPr>
+              <a:t> </a:t>
+            </a:r>
+            <a:r>
+              <a:rPr lang="en-US" sz="2800" dirty="0" err="1">
+                <a:latin typeface="Verdana" panose="020B0604030504040204" pitchFamily="34" charset="0"/>
+                <a:ea typeface="Verdana" panose="020B0604030504040204" pitchFamily="34" charset="0"/>
+                <a:cs typeface="Verdana" panose="020B0604030504040204" pitchFamily="34" charset="0"/>
+              </a:rPr>
+              <a:t>volorae</a:t>
+            </a:r>
+            <a:r>
+              <a:rPr lang="en-US" sz="2800" dirty="0">
+                <a:latin typeface="Verdana" panose="020B0604030504040204" pitchFamily="34" charset="0"/>
+                <a:ea typeface="Verdana" panose="020B0604030504040204" pitchFamily="34" charset="0"/>
+                <a:cs typeface="Verdana" panose="020B0604030504040204" pitchFamily="34" charset="0"/>
+              </a:rPr>
+              <a:t> </a:t>
+            </a:r>
+            <a:r>
+              <a:rPr lang="en-US" sz="2800" dirty="0" err="1">
+                <a:latin typeface="Verdana" panose="020B0604030504040204" pitchFamily="34" charset="0"/>
+                <a:ea typeface="Verdana" panose="020B0604030504040204" pitchFamily="34" charset="0"/>
+                <a:cs typeface="Verdana" panose="020B0604030504040204" pitchFamily="34" charset="0"/>
+              </a:rPr>
+              <a:t>venimai</a:t>
+            </a:r>
+            <a:r>
+              <a:rPr lang="en-US" sz="2800" dirty="0">
+                <a:latin typeface="Verdana" panose="020B0604030504040204" pitchFamily="34" charset="0"/>
+                <a:ea typeface="Verdana" panose="020B0604030504040204" pitchFamily="34" charset="0"/>
+                <a:cs typeface="Verdana" panose="020B0604030504040204" pitchFamily="34" charset="0"/>
+              </a:rPr>
+              <a:t> </a:t>
+            </a:r>
+            <a:r>
+              <a:rPr lang="en-US" sz="2800" dirty="0" err="1">
+                <a:latin typeface="Verdana" panose="020B0604030504040204" pitchFamily="34" charset="0"/>
+                <a:ea typeface="Verdana" panose="020B0604030504040204" pitchFamily="34" charset="0"/>
+                <a:cs typeface="Verdana" panose="020B0604030504040204" pitchFamily="34" charset="0"/>
+              </a:rPr>
+              <a:t>onsequame</a:t>
+            </a:r>
+            <a:r>
+              <a:rPr lang="en-US" sz="2800" dirty="0">
+                <a:latin typeface="Verdana" panose="020B0604030504040204" pitchFamily="34" charset="0"/>
+                <a:ea typeface="Verdana" panose="020B0604030504040204" pitchFamily="34" charset="0"/>
+                <a:cs typeface="Verdana" panose="020B0604030504040204" pitchFamily="34" charset="0"/>
+              </a:rPr>
+              <a:t> </a:t>
+            </a:r>
+            <a:r>
+              <a:rPr lang="en-US" sz="2800" dirty="0" err="1">
+                <a:latin typeface="Verdana" panose="020B0604030504040204" pitchFamily="34" charset="0"/>
+                <a:ea typeface="Verdana" panose="020B0604030504040204" pitchFamily="34" charset="0"/>
+                <a:cs typeface="Verdana" panose="020B0604030504040204" pitchFamily="34" charset="0"/>
+              </a:rPr>
+              <a:t>odipitatur</a:t>
+            </a:r>
+            <a:r>
+              <a:rPr lang="en-US" sz="2800" dirty="0">
+                <a:latin typeface="Verdana" panose="020B0604030504040204" pitchFamily="34" charset="0"/>
+                <a:ea typeface="Verdana" panose="020B0604030504040204" pitchFamily="34" charset="0"/>
+                <a:cs typeface="Verdana" panose="020B0604030504040204" pitchFamily="34" charset="0"/>
+              </a:rPr>
+              <a:t> </a:t>
+            </a:r>
+            <a:r>
+              <a:rPr lang="en-US" sz="2800" dirty="0" err="1">
+                <a:latin typeface="Verdana" panose="020B0604030504040204" pitchFamily="34" charset="0"/>
+                <a:ea typeface="Verdana" panose="020B0604030504040204" pitchFamily="34" charset="0"/>
+                <a:cs typeface="Verdana" panose="020B0604030504040204" pitchFamily="34" charset="0"/>
+              </a:rPr>
+              <a:t>sequosa</a:t>
+            </a:r>
+            <a:r>
+              <a:rPr lang="en-US" sz="2800" dirty="0">
+                <a:latin typeface="Verdana" panose="020B0604030504040204" pitchFamily="34" charset="0"/>
+                <a:ea typeface="Verdana" panose="020B0604030504040204" pitchFamily="34" charset="0"/>
+                <a:cs typeface="Verdana" panose="020B0604030504040204" pitchFamily="34" charset="0"/>
+              </a:rPr>
+              <a:t> </a:t>
+            </a:r>
+            <a:r>
+              <a:rPr lang="en-US" sz="2800" dirty="0" err="1">
+                <a:latin typeface="Verdana" panose="020B0604030504040204" pitchFamily="34" charset="0"/>
+                <a:ea typeface="Verdana" panose="020B0604030504040204" pitchFamily="34" charset="0"/>
+                <a:cs typeface="Verdana" panose="020B0604030504040204" pitchFamily="34" charset="0"/>
+              </a:rPr>
+              <a:t>ntiste</a:t>
+            </a:r>
+            <a:r>
+              <a:rPr lang="en-US" sz="2800" dirty="0">
+                <a:latin typeface="Verdana" panose="020B0604030504040204" pitchFamily="34" charset="0"/>
+                <a:ea typeface="Verdana" panose="020B0604030504040204" pitchFamily="34" charset="0"/>
+                <a:cs typeface="Verdana" panose="020B0604030504040204" pitchFamily="34" charset="0"/>
+              </a:rPr>
+              <a:t> </a:t>
+            </a:r>
+            <a:r>
+              <a:rPr lang="en-US" sz="2800" dirty="0" err="1">
+                <a:latin typeface="Verdana" panose="020B0604030504040204" pitchFamily="34" charset="0"/>
+                <a:ea typeface="Verdana" panose="020B0604030504040204" pitchFamily="34" charset="0"/>
+                <a:cs typeface="Verdana" panose="020B0604030504040204" pitchFamily="34" charset="0"/>
+              </a:rPr>
+              <a:t>ea</a:t>
+            </a:r>
+            <a:r>
+              <a:rPr lang="en-US" sz="2800" dirty="0">
+                <a:latin typeface="Verdana" panose="020B0604030504040204" pitchFamily="34" charset="0"/>
+                <a:ea typeface="Verdana" panose="020B0604030504040204" pitchFamily="34" charset="0"/>
+                <a:cs typeface="Verdana" panose="020B0604030504040204" pitchFamily="34" charset="0"/>
+              </a:rPr>
+              <a:t> id que </a:t>
+            </a:r>
+            <a:r>
+              <a:rPr lang="en-US" sz="2800" dirty="0" err="1">
+                <a:latin typeface="Verdana" panose="020B0604030504040204" pitchFamily="34" charset="0"/>
+                <a:ea typeface="Verdana" panose="020B0604030504040204" pitchFamily="34" charset="0"/>
+                <a:cs typeface="Verdana" panose="020B0604030504040204" pitchFamily="34" charset="0"/>
+              </a:rPr>
+              <a:t>ipsam</a:t>
+            </a:r>
+            <a:r>
+              <a:rPr lang="en-US" sz="2800" dirty="0">
+                <a:latin typeface="Verdana" panose="020B0604030504040204" pitchFamily="34" charset="0"/>
+                <a:ea typeface="Verdana" panose="020B0604030504040204" pitchFamily="34" charset="0"/>
+                <a:cs typeface="Verdana" panose="020B0604030504040204" pitchFamily="34" charset="0"/>
+              </a:rPr>
+              <a:t>, </a:t>
+            </a:r>
+            <a:r>
+              <a:rPr lang="en-US" sz="2800" dirty="0" err="1">
+                <a:latin typeface="Verdana" panose="020B0604030504040204" pitchFamily="34" charset="0"/>
+                <a:ea typeface="Verdana" panose="020B0604030504040204" pitchFamily="34" charset="0"/>
+                <a:cs typeface="Verdana" panose="020B0604030504040204" pitchFamily="34" charset="0"/>
+              </a:rPr>
+              <a:t>omniaed</a:t>
+            </a:r>
+            <a:r>
+              <a:rPr lang="en-US" sz="2800" dirty="0">
+                <a:latin typeface="Verdana" panose="020B0604030504040204" pitchFamily="34" charset="0"/>
+                <a:ea typeface="Verdana" panose="020B0604030504040204" pitchFamily="34" charset="0"/>
+                <a:cs typeface="Verdana" panose="020B0604030504040204" pitchFamily="34" charset="0"/>
+              </a:rPr>
+              <a:t> et </a:t>
+            </a:r>
+            <a:r>
+              <a:rPr lang="en-US" sz="2800" dirty="0" err="1">
+                <a:latin typeface="Verdana" panose="020B0604030504040204" pitchFamily="34" charset="0"/>
+                <a:ea typeface="Verdana" panose="020B0604030504040204" pitchFamily="34" charset="0"/>
+                <a:cs typeface="Verdana" panose="020B0604030504040204" pitchFamily="34" charset="0"/>
+              </a:rPr>
+              <a:t>offictus</a:t>
+            </a:r>
+            <a:r>
+              <a:rPr lang="en-US" sz="2800" dirty="0">
+                <a:latin typeface="Verdana" panose="020B0604030504040204" pitchFamily="34" charset="0"/>
+                <a:ea typeface="Verdana" panose="020B0604030504040204" pitchFamily="34" charset="0"/>
+                <a:cs typeface="Verdana" panose="020B0604030504040204" pitchFamily="34" charset="0"/>
+              </a:rPr>
+              <a:t> </a:t>
+            </a:r>
+            <a:r>
+              <a:rPr lang="en-US" sz="2800" dirty="0" err="1">
+                <a:latin typeface="Verdana" panose="020B0604030504040204" pitchFamily="34" charset="0"/>
+                <a:ea typeface="Verdana" panose="020B0604030504040204" pitchFamily="34" charset="0"/>
+                <a:cs typeface="Verdana" panose="020B0604030504040204" pitchFamily="34" charset="0"/>
+              </a:rPr>
+              <a:t>moluptiis</a:t>
+            </a:r>
+            <a:r>
+              <a:rPr lang="en-US" sz="2800" dirty="0">
+                <a:latin typeface="Verdana" panose="020B0604030504040204" pitchFamily="34" charset="0"/>
+                <a:ea typeface="Verdana" panose="020B0604030504040204" pitchFamily="34" charset="0"/>
+                <a:cs typeface="Verdana" panose="020B0604030504040204" pitchFamily="34" charset="0"/>
+              </a:rPr>
+              <a:t> et </a:t>
+            </a:r>
+            <a:r>
+              <a:rPr lang="en-US" sz="2800" dirty="0" err="1">
+                <a:latin typeface="Verdana" panose="020B0604030504040204" pitchFamily="34" charset="0"/>
+                <a:ea typeface="Verdana" panose="020B0604030504040204" pitchFamily="34" charset="0"/>
+                <a:cs typeface="Verdana" panose="020B0604030504040204" pitchFamily="34" charset="0"/>
+              </a:rPr>
+              <a:t>ius</a:t>
+            </a:r>
+            <a:r>
+              <a:rPr lang="en-US" sz="2800" dirty="0">
+                <a:latin typeface="Verdana" panose="020B0604030504040204" pitchFamily="34" charset="0"/>
+                <a:ea typeface="Verdana" panose="020B0604030504040204" pitchFamily="34" charset="0"/>
+                <a:cs typeface="Verdana" panose="020B0604030504040204" pitchFamily="34" charset="0"/>
+              </a:rPr>
+              <a:t>.</a:t>
+            </a:r>
+          </a:p>
+          <a:p>
+            <a:pPr>
+              <a:spcAft>
+                <a:spcPts val="2600"/>
+              </a:spcAft>
+            </a:pPr>
+            <a:r>
+              <a:rPr lang="en-US" sz="2800" dirty="0">
+                <a:latin typeface="Verdana" panose="020B0604030504040204" pitchFamily="34" charset="0"/>
+                <a:ea typeface="Verdana" panose="020B0604030504040204" pitchFamily="34" charset="0"/>
+                <a:cs typeface="Verdana" panose="020B0604030504040204" pitchFamily="34" charset="0"/>
+              </a:rPr>
+              <a:t>Qui </a:t>
+            </a:r>
+            <a:r>
+              <a:rPr lang="en-US" sz="2800" dirty="0" err="1">
+                <a:latin typeface="Verdana" panose="020B0604030504040204" pitchFamily="34" charset="0"/>
+                <a:ea typeface="Verdana" panose="020B0604030504040204" pitchFamily="34" charset="0"/>
+                <a:cs typeface="Verdana" panose="020B0604030504040204" pitchFamily="34" charset="0"/>
+              </a:rPr>
+              <a:t>archili</a:t>
+            </a:r>
+            <a:r>
+              <a:rPr lang="en-US" sz="2800" dirty="0">
+                <a:latin typeface="Verdana" panose="020B0604030504040204" pitchFamily="34" charset="0"/>
+                <a:ea typeface="Verdana" panose="020B0604030504040204" pitchFamily="34" charset="0"/>
+                <a:cs typeface="Verdana" panose="020B0604030504040204" pitchFamily="34" charset="0"/>
+              </a:rPr>
+              <a:t> </a:t>
+            </a:r>
+            <a:r>
+              <a:rPr lang="en-US" sz="2800" dirty="0" err="1">
+                <a:latin typeface="Verdana" panose="020B0604030504040204" pitchFamily="34" charset="0"/>
+                <a:ea typeface="Verdana" panose="020B0604030504040204" pitchFamily="34" charset="0"/>
+                <a:cs typeface="Verdana" panose="020B0604030504040204" pitchFamily="34" charset="0"/>
+              </a:rPr>
+              <a:t>busdae</a:t>
+            </a:r>
+            <a:r>
+              <a:rPr lang="en-US" sz="2800" dirty="0">
+                <a:latin typeface="Verdana" panose="020B0604030504040204" pitchFamily="34" charset="0"/>
+                <a:ea typeface="Verdana" panose="020B0604030504040204" pitchFamily="34" charset="0"/>
+                <a:cs typeface="Verdana" panose="020B0604030504040204" pitchFamily="34" charset="0"/>
+              </a:rPr>
+              <a:t> </a:t>
+            </a:r>
+            <a:r>
+              <a:rPr lang="en-US" sz="2800" dirty="0" err="1">
+                <a:latin typeface="Verdana" panose="020B0604030504040204" pitchFamily="34" charset="0"/>
+                <a:ea typeface="Verdana" panose="020B0604030504040204" pitchFamily="34" charset="0"/>
+                <a:cs typeface="Verdana" panose="020B0604030504040204" pitchFamily="34" charset="0"/>
+              </a:rPr>
+              <a:t>exere</a:t>
+            </a:r>
+            <a:r>
+              <a:rPr lang="en-US" sz="2800" dirty="0">
+                <a:latin typeface="Verdana" panose="020B0604030504040204" pitchFamily="34" charset="0"/>
+                <a:ea typeface="Verdana" panose="020B0604030504040204" pitchFamily="34" charset="0"/>
+                <a:cs typeface="Verdana" panose="020B0604030504040204" pitchFamily="34" charset="0"/>
+              </a:rPr>
+              <a:t> </a:t>
+            </a:r>
+            <a:r>
+              <a:rPr lang="en-US" sz="2800" dirty="0" err="1">
+                <a:latin typeface="Verdana" panose="020B0604030504040204" pitchFamily="34" charset="0"/>
+                <a:ea typeface="Verdana" panose="020B0604030504040204" pitchFamily="34" charset="0"/>
+                <a:cs typeface="Verdana" panose="020B0604030504040204" pitchFamily="34" charset="0"/>
+              </a:rPr>
+              <a:t>quias</a:t>
+            </a:r>
+            <a:r>
+              <a:rPr lang="en-US" sz="2800" dirty="0">
+                <a:latin typeface="Verdana" panose="020B0604030504040204" pitchFamily="34" charset="0"/>
+                <a:ea typeface="Verdana" panose="020B0604030504040204" pitchFamily="34" charset="0"/>
+                <a:cs typeface="Verdana" panose="020B0604030504040204" pitchFamily="34" charset="0"/>
+              </a:rPr>
+              <a:t> </a:t>
+            </a:r>
+            <a:r>
+              <a:rPr lang="en-US" sz="2800" dirty="0" err="1">
+                <a:latin typeface="Verdana" panose="020B0604030504040204" pitchFamily="34" charset="0"/>
+                <a:ea typeface="Verdana" panose="020B0604030504040204" pitchFamily="34" charset="0"/>
+                <a:cs typeface="Verdana" panose="020B0604030504040204" pitchFamily="34" charset="0"/>
+              </a:rPr>
+              <a:t>essum</a:t>
+            </a:r>
+            <a:r>
+              <a:rPr lang="en-US" sz="2800" dirty="0">
+                <a:latin typeface="Verdana" panose="020B0604030504040204" pitchFamily="34" charset="0"/>
+                <a:ea typeface="Verdana" panose="020B0604030504040204" pitchFamily="34" charset="0"/>
+                <a:cs typeface="Verdana" panose="020B0604030504040204" pitchFamily="34" charset="0"/>
+              </a:rPr>
+              <a:t> </a:t>
+            </a:r>
+            <a:r>
+              <a:rPr lang="en-US" sz="2800" dirty="0" err="1">
+                <a:latin typeface="Verdana" panose="020B0604030504040204" pitchFamily="34" charset="0"/>
+                <a:ea typeface="Verdana" panose="020B0604030504040204" pitchFamily="34" charset="0"/>
+                <a:cs typeface="Verdana" panose="020B0604030504040204" pitchFamily="34" charset="0"/>
+              </a:rPr>
+              <a:t>fugiand</a:t>
+            </a:r>
+            <a:r>
+              <a:rPr lang="en-US" sz="2800" dirty="0">
+                <a:latin typeface="Verdana" panose="020B0604030504040204" pitchFamily="34" charset="0"/>
+                <a:ea typeface="Verdana" panose="020B0604030504040204" pitchFamily="34" charset="0"/>
+                <a:cs typeface="Verdana" panose="020B0604030504040204" pitchFamily="34" charset="0"/>
+              </a:rPr>
+              <a:t> </a:t>
+            </a:r>
+            <a:r>
+              <a:rPr lang="en-US" sz="2800" dirty="0" err="1">
+                <a:latin typeface="Verdana" panose="020B0604030504040204" pitchFamily="34" charset="0"/>
+                <a:ea typeface="Verdana" panose="020B0604030504040204" pitchFamily="34" charset="0"/>
+                <a:cs typeface="Verdana" panose="020B0604030504040204" pitchFamily="34" charset="0"/>
+              </a:rPr>
+              <a:t>itisquo</a:t>
+            </a:r>
+            <a:r>
+              <a:rPr lang="en-US" sz="2800" dirty="0">
+                <a:latin typeface="Verdana" panose="020B0604030504040204" pitchFamily="34" charset="0"/>
+                <a:ea typeface="Verdana" panose="020B0604030504040204" pitchFamily="34" charset="0"/>
+                <a:cs typeface="Verdana" panose="020B0604030504040204" pitchFamily="34" charset="0"/>
+              </a:rPr>
+              <a:t> </a:t>
+            </a:r>
+            <a:r>
+              <a:rPr lang="en-US" sz="2800" dirty="0" err="1">
+                <a:latin typeface="Verdana" panose="020B0604030504040204" pitchFamily="34" charset="0"/>
+                <a:ea typeface="Verdana" panose="020B0604030504040204" pitchFamily="34" charset="0"/>
+                <a:cs typeface="Verdana" panose="020B0604030504040204" pitchFamily="34" charset="0"/>
+              </a:rPr>
+              <a:t>occulla</a:t>
+            </a:r>
+            <a:r>
+              <a:rPr lang="en-US" sz="2800" dirty="0">
+                <a:latin typeface="Verdana" panose="020B0604030504040204" pitchFamily="34" charset="0"/>
+                <a:ea typeface="Verdana" panose="020B0604030504040204" pitchFamily="34" charset="0"/>
+                <a:cs typeface="Verdana" panose="020B0604030504040204" pitchFamily="34" charset="0"/>
+              </a:rPr>
+              <a:t> </a:t>
+            </a:r>
+            <a:r>
+              <a:rPr lang="en-US" sz="2800" dirty="0" err="1">
+                <a:latin typeface="Verdana" panose="020B0604030504040204" pitchFamily="34" charset="0"/>
+                <a:ea typeface="Verdana" panose="020B0604030504040204" pitchFamily="34" charset="0"/>
+                <a:cs typeface="Verdana" panose="020B0604030504040204" pitchFamily="34" charset="0"/>
+              </a:rPr>
+              <a:t>utendi</a:t>
+            </a:r>
+            <a:r>
+              <a:rPr lang="en-US" sz="2800" dirty="0">
+                <a:latin typeface="Verdana" panose="020B0604030504040204" pitchFamily="34" charset="0"/>
+                <a:ea typeface="Verdana" panose="020B0604030504040204" pitchFamily="34" charset="0"/>
+                <a:cs typeface="Verdana" panose="020B0604030504040204" pitchFamily="34" charset="0"/>
+              </a:rPr>
+              <a:t> </a:t>
+            </a:r>
+            <a:r>
+              <a:rPr lang="en-US" sz="2800" dirty="0" err="1">
+                <a:latin typeface="Verdana" panose="020B0604030504040204" pitchFamily="34" charset="0"/>
+                <a:ea typeface="Verdana" panose="020B0604030504040204" pitchFamily="34" charset="0"/>
+                <a:cs typeface="Verdana" panose="020B0604030504040204" pitchFamily="34" charset="0"/>
+              </a:rPr>
+              <a:t>autaquo</a:t>
+            </a:r>
+            <a:r>
+              <a:rPr lang="en-US" sz="2800" dirty="0">
+                <a:latin typeface="Verdana" panose="020B0604030504040204" pitchFamily="34" charset="0"/>
+                <a:ea typeface="Verdana" panose="020B0604030504040204" pitchFamily="34" charset="0"/>
+                <a:cs typeface="Verdana" panose="020B0604030504040204" pitchFamily="34" charset="0"/>
+              </a:rPr>
+              <a:t> </a:t>
+            </a:r>
+            <a:r>
+              <a:rPr lang="en-US" sz="2800" dirty="0" err="1">
+                <a:latin typeface="Verdana" panose="020B0604030504040204" pitchFamily="34" charset="0"/>
+                <a:ea typeface="Verdana" panose="020B0604030504040204" pitchFamily="34" charset="0"/>
+                <a:cs typeface="Verdana" panose="020B0604030504040204" pitchFamily="34" charset="0"/>
+              </a:rPr>
+              <a:t>doluptu</a:t>
+            </a:r>
+            <a:r>
+              <a:rPr lang="en-US" sz="2800" dirty="0">
+                <a:latin typeface="Verdana" panose="020B0604030504040204" pitchFamily="34" charset="0"/>
+                <a:ea typeface="Verdana" panose="020B0604030504040204" pitchFamily="34" charset="0"/>
+                <a:cs typeface="Verdana" panose="020B0604030504040204" pitchFamily="34" charset="0"/>
+              </a:rPr>
+              <a:t> </a:t>
+            </a:r>
+            <a:r>
+              <a:rPr lang="en-US" sz="2800" dirty="0" err="1">
+                <a:latin typeface="Verdana" panose="020B0604030504040204" pitchFamily="34" charset="0"/>
+                <a:ea typeface="Verdana" panose="020B0604030504040204" pitchFamily="34" charset="0"/>
+                <a:cs typeface="Verdana" panose="020B0604030504040204" pitchFamily="34" charset="0"/>
+              </a:rPr>
+              <a:t>stotate</a:t>
+            </a:r>
+            <a:r>
+              <a:rPr lang="en-US" sz="2800" dirty="0">
+                <a:latin typeface="Verdana" panose="020B0604030504040204" pitchFamily="34" charset="0"/>
+                <a:ea typeface="Verdana" panose="020B0604030504040204" pitchFamily="34" charset="0"/>
+                <a:cs typeface="Verdana" panose="020B0604030504040204" pitchFamily="34" charset="0"/>
+              </a:rPr>
+              <a:t> pre </a:t>
+            </a:r>
+            <a:r>
+              <a:rPr lang="en-US" sz="2800" dirty="0" err="1">
+                <a:latin typeface="Verdana" panose="020B0604030504040204" pitchFamily="34" charset="0"/>
+                <a:ea typeface="Verdana" panose="020B0604030504040204" pitchFamily="34" charset="0"/>
+                <a:cs typeface="Verdana" panose="020B0604030504040204" pitchFamily="34" charset="0"/>
+              </a:rPr>
+              <a:t>poris</a:t>
+            </a:r>
+            <a:r>
+              <a:rPr lang="en-US" sz="2800" dirty="0">
+                <a:latin typeface="Verdana" panose="020B0604030504040204" pitchFamily="34" charset="0"/>
+                <a:ea typeface="Verdana" panose="020B0604030504040204" pitchFamily="34" charset="0"/>
+                <a:cs typeface="Verdana" panose="020B0604030504040204" pitchFamily="34" charset="0"/>
+              </a:rPr>
+              <a:t> </a:t>
+            </a:r>
+            <a:r>
+              <a:rPr lang="en-US" sz="2800" dirty="0" err="1">
+                <a:latin typeface="Verdana" panose="020B0604030504040204" pitchFamily="34" charset="0"/>
+                <a:ea typeface="Verdana" panose="020B0604030504040204" pitchFamily="34" charset="0"/>
+                <a:cs typeface="Verdana" panose="020B0604030504040204" pitchFamily="34" charset="0"/>
+              </a:rPr>
+              <a:t>diciumqui</a:t>
+            </a:r>
+            <a:r>
+              <a:rPr lang="en-US" sz="2800" dirty="0">
+                <a:latin typeface="Verdana" panose="020B0604030504040204" pitchFamily="34" charset="0"/>
+                <a:ea typeface="Verdana" panose="020B0604030504040204" pitchFamily="34" charset="0"/>
+                <a:cs typeface="Verdana" panose="020B0604030504040204" pitchFamily="34" charset="0"/>
+              </a:rPr>
+              <a:t> </a:t>
+            </a:r>
+            <a:r>
+              <a:rPr lang="en-US" sz="2800" dirty="0" err="1">
+                <a:latin typeface="Verdana" panose="020B0604030504040204" pitchFamily="34" charset="0"/>
+                <a:ea typeface="Verdana" panose="020B0604030504040204" pitchFamily="34" charset="0"/>
+                <a:cs typeface="Verdana" panose="020B0604030504040204" pitchFamily="34" charset="0"/>
+              </a:rPr>
+              <a:t>officipsapic</a:t>
+            </a:r>
+            <a:r>
+              <a:rPr lang="en-US" sz="2800" dirty="0">
+                <a:latin typeface="Verdana" panose="020B0604030504040204" pitchFamily="34" charset="0"/>
+                <a:ea typeface="Verdana" panose="020B0604030504040204" pitchFamily="34" charset="0"/>
+                <a:cs typeface="Verdana" panose="020B0604030504040204" pitchFamily="34" charset="0"/>
+              </a:rPr>
+              <a:t> to </a:t>
+            </a:r>
+            <a:r>
+              <a:rPr lang="en-US" sz="2800" dirty="0" err="1">
+                <a:latin typeface="Verdana" panose="020B0604030504040204" pitchFamily="34" charset="0"/>
+                <a:ea typeface="Verdana" panose="020B0604030504040204" pitchFamily="34" charset="0"/>
+                <a:cs typeface="Verdana" panose="020B0604030504040204" pitchFamily="34" charset="0"/>
+              </a:rPr>
+              <a:t>modi</a:t>
+            </a:r>
+            <a:r>
+              <a:rPr lang="en-US" sz="2800" dirty="0">
+                <a:latin typeface="Verdana" panose="020B0604030504040204" pitchFamily="34" charset="0"/>
+                <a:ea typeface="Verdana" panose="020B0604030504040204" pitchFamily="34" charset="0"/>
+                <a:cs typeface="Verdana" panose="020B0604030504040204" pitchFamily="34" charset="0"/>
+              </a:rPr>
+              <a:t> quos </a:t>
+            </a:r>
+            <a:r>
+              <a:rPr lang="en-US" sz="2800" dirty="0" err="1">
+                <a:latin typeface="Verdana" panose="020B0604030504040204" pitchFamily="34" charset="0"/>
+                <a:ea typeface="Verdana" panose="020B0604030504040204" pitchFamily="34" charset="0"/>
+                <a:cs typeface="Verdana" panose="020B0604030504040204" pitchFamily="34" charset="0"/>
+              </a:rPr>
+              <a:t>eum</a:t>
+            </a:r>
+            <a:r>
+              <a:rPr lang="en-US" sz="2800" dirty="0">
+                <a:latin typeface="Verdana" panose="020B0604030504040204" pitchFamily="34" charset="0"/>
+                <a:ea typeface="Verdana" panose="020B0604030504040204" pitchFamily="34" charset="0"/>
+                <a:cs typeface="Verdana" panose="020B0604030504040204" pitchFamily="34" charset="0"/>
+              </a:rPr>
+              <a:t> rem sit </a:t>
+            </a:r>
+            <a:r>
+              <a:rPr lang="en-US" sz="2800" dirty="0" err="1">
+                <a:latin typeface="Verdana" panose="020B0604030504040204" pitchFamily="34" charset="0"/>
+                <a:ea typeface="Verdana" panose="020B0604030504040204" pitchFamily="34" charset="0"/>
+                <a:cs typeface="Verdana" panose="020B0604030504040204" pitchFamily="34" charset="0"/>
+              </a:rPr>
+              <a:t>quasse</a:t>
+            </a:r>
+            <a:r>
+              <a:rPr lang="en-US" sz="2800" dirty="0">
+                <a:latin typeface="Verdana" panose="020B0604030504040204" pitchFamily="34" charset="0"/>
+                <a:ea typeface="Verdana" panose="020B0604030504040204" pitchFamily="34" charset="0"/>
+                <a:cs typeface="Verdana" panose="020B0604030504040204" pitchFamily="34" charset="0"/>
+              </a:rPr>
+              <a:t> </a:t>
+            </a:r>
+            <a:r>
+              <a:rPr lang="en-US" sz="2800" dirty="0" err="1">
+                <a:latin typeface="Verdana" panose="020B0604030504040204" pitchFamily="34" charset="0"/>
+                <a:ea typeface="Verdana" panose="020B0604030504040204" pitchFamily="34" charset="0"/>
+                <a:cs typeface="Verdana" panose="020B0604030504040204" pitchFamily="34" charset="0"/>
+              </a:rPr>
+              <a:t>accatur</a:t>
+            </a:r>
+            <a:r>
+              <a:rPr lang="en-US" sz="2800" dirty="0">
+                <a:latin typeface="Verdana" panose="020B0604030504040204" pitchFamily="34" charset="0"/>
+                <a:ea typeface="Verdana" panose="020B0604030504040204" pitchFamily="34" charset="0"/>
+                <a:cs typeface="Verdana" panose="020B0604030504040204" pitchFamily="34" charset="0"/>
+              </a:rPr>
+              <a:t>?</a:t>
+            </a:r>
+          </a:p>
+          <a:p>
+            <a:pPr>
+              <a:spcAft>
+                <a:spcPts val="2600"/>
+              </a:spcAft>
+            </a:pPr>
+            <a:r>
+              <a:rPr lang="en-US" sz="2800" dirty="0">
+                <a:latin typeface="Verdana" panose="020B0604030504040204" pitchFamily="34" charset="0"/>
+                <a:ea typeface="Verdana" panose="020B0604030504040204" pitchFamily="34" charset="0"/>
+                <a:cs typeface="Verdana" panose="020B0604030504040204" pitchFamily="34" charset="0"/>
+              </a:rPr>
+              <a:t>Obis </a:t>
+            </a:r>
+            <a:r>
+              <a:rPr lang="en-US" sz="2800" dirty="0" err="1">
+                <a:latin typeface="Verdana" panose="020B0604030504040204" pitchFamily="34" charset="0"/>
+                <a:ea typeface="Verdana" panose="020B0604030504040204" pitchFamily="34" charset="0"/>
+                <a:cs typeface="Verdana" panose="020B0604030504040204" pitchFamily="34" charset="0"/>
+              </a:rPr>
+              <a:t>erit</a:t>
+            </a:r>
+            <a:r>
+              <a:rPr lang="en-US" sz="2800" dirty="0">
+                <a:latin typeface="Verdana" panose="020B0604030504040204" pitchFamily="34" charset="0"/>
+                <a:ea typeface="Verdana" panose="020B0604030504040204" pitchFamily="34" charset="0"/>
+                <a:cs typeface="Verdana" panose="020B0604030504040204" pitchFamily="34" charset="0"/>
+              </a:rPr>
+              <a:t> </a:t>
+            </a:r>
+            <a:r>
+              <a:rPr lang="en-US" sz="2800" dirty="0" err="1">
+                <a:latin typeface="Verdana" panose="020B0604030504040204" pitchFamily="34" charset="0"/>
+                <a:ea typeface="Verdana" panose="020B0604030504040204" pitchFamily="34" charset="0"/>
+                <a:cs typeface="Verdana" panose="020B0604030504040204" pitchFamily="34" charset="0"/>
+              </a:rPr>
+              <a:t>erianti</a:t>
+            </a:r>
+            <a:r>
+              <a:rPr lang="en-US" sz="2800" dirty="0">
+                <a:latin typeface="Verdana" panose="020B0604030504040204" pitchFamily="34" charset="0"/>
+                <a:ea typeface="Verdana" panose="020B0604030504040204" pitchFamily="34" charset="0"/>
+                <a:cs typeface="Verdana" panose="020B0604030504040204" pitchFamily="34" charset="0"/>
+              </a:rPr>
+              <a:t> debit, </a:t>
+            </a:r>
+            <a:r>
+              <a:rPr lang="en-US" sz="2800" dirty="0" err="1">
+                <a:latin typeface="Verdana" panose="020B0604030504040204" pitchFamily="34" charset="0"/>
+                <a:ea typeface="Verdana" panose="020B0604030504040204" pitchFamily="34" charset="0"/>
+                <a:cs typeface="Verdana" panose="020B0604030504040204" pitchFamily="34" charset="0"/>
+              </a:rPr>
+              <a:t>odi</a:t>
+            </a:r>
+            <a:r>
+              <a:rPr lang="en-US" sz="2800" dirty="0">
+                <a:latin typeface="Verdana" panose="020B0604030504040204" pitchFamily="34" charset="0"/>
+                <a:ea typeface="Verdana" panose="020B0604030504040204" pitchFamily="34" charset="0"/>
+                <a:cs typeface="Verdana" panose="020B0604030504040204" pitchFamily="34" charset="0"/>
+              </a:rPr>
+              <a:t> </a:t>
+            </a:r>
+            <a:r>
+              <a:rPr lang="en-US" sz="2800" dirty="0" err="1">
+                <a:latin typeface="Verdana" panose="020B0604030504040204" pitchFamily="34" charset="0"/>
+                <a:ea typeface="Verdana" panose="020B0604030504040204" pitchFamily="34" charset="0"/>
+                <a:cs typeface="Verdana" panose="020B0604030504040204" pitchFamily="34" charset="0"/>
+              </a:rPr>
+              <a:t>consequate</a:t>
+            </a:r>
+            <a:r>
+              <a:rPr lang="en-US" sz="2800" dirty="0">
+                <a:latin typeface="Verdana" panose="020B0604030504040204" pitchFamily="34" charset="0"/>
+                <a:ea typeface="Verdana" panose="020B0604030504040204" pitchFamily="34" charset="0"/>
+                <a:cs typeface="Verdana" panose="020B0604030504040204" pitchFamily="34" charset="0"/>
+              </a:rPr>
+              <a:t> </a:t>
+            </a:r>
+            <a:r>
+              <a:rPr lang="en-US" sz="2800" dirty="0" err="1">
+                <a:latin typeface="Verdana" panose="020B0604030504040204" pitchFamily="34" charset="0"/>
+                <a:ea typeface="Verdana" panose="020B0604030504040204" pitchFamily="34" charset="0"/>
+                <a:cs typeface="Verdana" panose="020B0604030504040204" pitchFamily="34" charset="0"/>
+              </a:rPr>
+              <a:t>dolupta</a:t>
+            </a:r>
+            <a:r>
+              <a:rPr lang="en-US" sz="2800" dirty="0">
+                <a:latin typeface="Verdana" panose="020B0604030504040204" pitchFamily="34" charset="0"/>
+                <a:ea typeface="Verdana" panose="020B0604030504040204" pitchFamily="34" charset="0"/>
+                <a:cs typeface="Verdana" panose="020B0604030504040204" pitchFamily="34" charset="0"/>
+              </a:rPr>
+              <a:t> </a:t>
+            </a:r>
+            <a:r>
+              <a:rPr lang="en-US" sz="2800" dirty="0" err="1">
+                <a:latin typeface="Verdana" panose="020B0604030504040204" pitchFamily="34" charset="0"/>
+                <a:ea typeface="Verdana" panose="020B0604030504040204" pitchFamily="34" charset="0"/>
+                <a:cs typeface="Verdana" panose="020B0604030504040204" pitchFamily="34" charset="0"/>
+              </a:rPr>
+              <a:t>epudit</a:t>
+            </a:r>
+            <a:r>
+              <a:rPr lang="en-US" sz="2800" dirty="0">
+                <a:latin typeface="Verdana" panose="020B0604030504040204" pitchFamily="34" charset="0"/>
+                <a:ea typeface="Verdana" panose="020B0604030504040204" pitchFamily="34" charset="0"/>
+                <a:cs typeface="Verdana" panose="020B0604030504040204" pitchFamily="34" charset="0"/>
+              </a:rPr>
+              <a:t> et </a:t>
+            </a:r>
+            <a:r>
+              <a:rPr lang="en-US" sz="2800" dirty="0" err="1">
+                <a:latin typeface="Verdana" panose="020B0604030504040204" pitchFamily="34" charset="0"/>
+                <a:ea typeface="Verdana" panose="020B0604030504040204" pitchFamily="34" charset="0"/>
+                <a:cs typeface="Verdana" panose="020B0604030504040204" pitchFamily="34" charset="0"/>
+              </a:rPr>
+              <a:t>etur</a:t>
+            </a:r>
+            <a:r>
+              <a:rPr lang="en-US" sz="2800" dirty="0">
+                <a:latin typeface="Verdana" panose="020B0604030504040204" pitchFamily="34" charset="0"/>
+                <a:ea typeface="Verdana" panose="020B0604030504040204" pitchFamily="34" charset="0"/>
+                <a:cs typeface="Verdana" panose="020B0604030504040204" pitchFamily="34" charset="0"/>
+              </a:rPr>
+              <a:t> </a:t>
+            </a:r>
+            <a:r>
+              <a:rPr lang="en-US" sz="2800" dirty="0" err="1">
+                <a:latin typeface="Verdana" panose="020B0604030504040204" pitchFamily="34" charset="0"/>
+                <a:ea typeface="Verdana" panose="020B0604030504040204" pitchFamily="34" charset="0"/>
+                <a:cs typeface="Verdana" panose="020B0604030504040204" pitchFamily="34" charset="0"/>
+              </a:rPr>
+              <a:t>rempore</a:t>
+            </a:r>
+            <a:r>
+              <a:rPr lang="en-US" sz="2800" dirty="0">
+                <a:latin typeface="Verdana" panose="020B0604030504040204" pitchFamily="34" charset="0"/>
+                <a:ea typeface="Verdana" panose="020B0604030504040204" pitchFamily="34" charset="0"/>
+                <a:cs typeface="Verdana" panose="020B0604030504040204" pitchFamily="34" charset="0"/>
+              </a:rPr>
+              <a:t>. Lam </a:t>
+            </a:r>
+            <a:r>
+              <a:rPr lang="en-US" sz="2800" dirty="0" err="1">
+                <a:latin typeface="Verdana" panose="020B0604030504040204" pitchFamily="34" charset="0"/>
+                <a:ea typeface="Verdana" panose="020B0604030504040204" pitchFamily="34" charset="0"/>
+                <a:cs typeface="Verdana" panose="020B0604030504040204" pitchFamily="34" charset="0"/>
+              </a:rPr>
+              <a:t>ariae</a:t>
+            </a:r>
+            <a:r>
+              <a:rPr lang="en-US" sz="2800" dirty="0">
+                <a:latin typeface="Verdana" panose="020B0604030504040204" pitchFamily="34" charset="0"/>
+                <a:ea typeface="Verdana" panose="020B0604030504040204" pitchFamily="34" charset="0"/>
+                <a:cs typeface="Verdana" panose="020B0604030504040204" pitchFamily="34" charset="0"/>
+              </a:rPr>
+              <a:t> </a:t>
+            </a:r>
+            <a:r>
+              <a:rPr lang="en-US" sz="2800" dirty="0" err="1">
+                <a:latin typeface="Verdana" panose="020B0604030504040204" pitchFamily="34" charset="0"/>
+                <a:ea typeface="Verdana" panose="020B0604030504040204" pitchFamily="34" charset="0"/>
+                <a:cs typeface="Verdana" panose="020B0604030504040204" pitchFamily="34" charset="0"/>
+              </a:rPr>
+              <a:t>aperit</a:t>
+            </a:r>
+            <a:r>
+              <a:rPr lang="en-US" sz="2800" dirty="0">
+                <a:latin typeface="Verdana" panose="020B0604030504040204" pitchFamily="34" charset="0"/>
+                <a:ea typeface="Verdana" panose="020B0604030504040204" pitchFamily="34" charset="0"/>
+                <a:cs typeface="Verdana" panose="020B0604030504040204" pitchFamily="34" charset="0"/>
+              </a:rPr>
+              <a:t>, </a:t>
+            </a:r>
+            <a:r>
+              <a:rPr lang="en-US" sz="2800" dirty="0" err="1">
+                <a:latin typeface="Verdana" panose="020B0604030504040204" pitchFamily="34" charset="0"/>
+                <a:ea typeface="Verdana" panose="020B0604030504040204" pitchFamily="34" charset="0"/>
+                <a:cs typeface="Verdana" panose="020B0604030504040204" pitchFamily="34" charset="0"/>
+              </a:rPr>
+              <a:t>officatio</a:t>
+            </a:r>
+            <a:r>
+              <a:rPr lang="en-US" sz="2800" dirty="0">
+                <a:latin typeface="Verdana" panose="020B0604030504040204" pitchFamily="34" charset="0"/>
+                <a:ea typeface="Verdana" panose="020B0604030504040204" pitchFamily="34" charset="0"/>
+                <a:cs typeface="Verdana" panose="020B0604030504040204" pitchFamily="34" charset="0"/>
+              </a:rPr>
+              <a:t> </a:t>
+            </a:r>
+            <a:r>
+              <a:rPr lang="en-US" sz="2800" dirty="0" err="1">
+                <a:latin typeface="Verdana" panose="020B0604030504040204" pitchFamily="34" charset="0"/>
+                <a:ea typeface="Verdana" panose="020B0604030504040204" pitchFamily="34" charset="0"/>
+                <a:cs typeface="Verdana" panose="020B0604030504040204" pitchFamily="34" charset="0"/>
+              </a:rPr>
+              <a:t>eos</a:t>
+            </a:r>
+            <a:r>
+              <a:rPr lang="en-US" sz="2800" dirty="0">
+                <a:latin typeface="Verdana" panose="020B0604030504040204" pitchFamily="34" charset="0"/>
+                <a:ea typeface="Verdana" panose="020B0604030504040204" pitchFamily="34" charset="0"/>
+                <a:cs typeface="Verdana" panose="020B0604030504040204" pitchFamily="34" charset="0"/>
+              </a:rPr>
+              <a:t> </a:t>
+            </a:r>
+            <a:r>
+              <a:rPr lang="en-US" sz="2800" dirty="0" err="1">
+                <a:latin typeface="Verdana" panose="020B0604030504040204" pitchFamily="34" charset="0"/>
+                <a:ea typeface="Verdana" panose="020B0604030504040204" pitchFamily="34" charset="0"/>
+                <a:cs typeface="Verdana" panose="020B0604030504040204" pitchFamily="34" charset="0"/>
+              </a:rPr>
+              <a:t>quia</a:t>
+            </a:r>
+            <a:r>
+              <a:rPr lang="en-US" sz="2800" dirty="0">
+                <a:latin typeface="Verdana" panose="020B0604030504040204" pitchFamily="34" charset="0"/>
+                <a:ea typeface="Verdana" panose="020B0604030504040204" pitchFamily="34" charset="0"/>
+                <a:cs typeface="Verdana" panose="020B0604030504040204" pitchFamily="34" charset="0"/>
+              </a:rPr>
+              <a:t> </a:t>
+            </a:r>
+            <a:r>
+              <a:rPr lang="en-US" sz="2800" dirty="0" err="1">
+                <a:latin typeface="Verdana" panose="020B0604030504040204" pitchFamily="34" charset="0"/>
+                <a:ea typeface="Verdana" panose="020B0604030504040204" pitchFamily="34" charset="0"/>
+                <a:cs typeface="Verdana" panose="020B0604030504040204" pitchFamily="34" charset="0"/>
+              </a:rPr>
+              <a:t>sandaectae</a:t>
+            </a:r>
+            <a:r>
+              <a:rPr lang="en-US" sz="2800" dirty="0">
+                <a:latin typeface="Verdana" panose="020B0604030504040204" pitchFamily="34" charset="0"/>
+                <a:ea typeface="Verdana" panose="020B0604030504040204" pitchFamily="34" charset="0"/>
+                <a:cs typeface="Verdana" panose="020B0604030504040204" pitchFamily="34" charset="0"/>
+              </a:rPr>
+              <a:t>. Ut </a:t>
+            </a:r>
+            <a:r>
+              <a:rPr lang="en-US" sz="2800" dirty="0" err="1">
+                <a:latin typeface="Verdana" panose="020B0604030504040204" pitchFamily="34" charset="0"/>
+                <a:ea typeface="Verdana" panose="020B0604030504040204" pitchFamily="34" charset="0"/>
+                <a:cs typeface="Verdana" panose="020B0604030504040204" pitchFamily="34" charset="0"/>
+              </a:rPr>
+              <a:t>aribuscimpor</a:t>
+            </a:r>
+            <a:r>
+              <a:rPr lang="en-US" sz="2800" dirty="0">
+                <a:latin typeface="Verdana" panose="020B0604030504040204" pitchFamily="34" charset="0"/>
+                <a:ea typeface="Verdana" panose="020B0604030504040204" pitchFamily="34" charset="0"/>
+                <a:cs typeface="Verdana" panose="020B0604030504040204" pitchFamily="34" charset="0"/>
+              </a:rPr>
+              <a:t> </a:t>
+            </a:r>
+            <a:r>
+              <a:rPr lang="en-US" sz="2800" dirty="0" err="1">
+                <a:latin typeface="Verdana" panose="020B0604030504040204" pitchFamily="34" charset="0"/>
+                <a:ea typeface="Verdana" panose="020B0604030504040204" pitchFamily="34" charset="0"/>
+                <a:cs typeface="Verdana" panose="020B0604030504040204" pitchFamily="34" charset="0"/>
+              </a:rPr>
+              <a:t>moloris</a:t>
+            </a:r>
+            <a:r>
+              <a:rPr lang="en-US" sz="2800" dirty="0">
+                <a:latin typeface="Verdana" panose="020B0604030504040204" pitchFamily="34" charset="0"/>
+                <a:ea typeface="Verdana" panose="020B0604030504040204" pitchFamily="34" charset="0"/>
+                <a:cs typeface="Verdana" panose="020B0604030504040204" pitchFamily="34" charset="0"/>
+              </a:rPr>
+              <a:t> non.. </a:t>
+            </a:r>
+          </a:p>
+          <a:p>
+            <a:pPr>
+              <a:spcAft>
+                <a:spcPts val="2600"/>
+              </a:spcAft>
+            </a:pPr>
+            <a:r>
+              <a:rPr lang="en-US" sz="2800" dirty="0" err="1">
+                <a:latin typeface="Verdana" panose="020B0604030504040204" pitchFamily="34" charset="0"/>
+                <a:ea typeface="Verdana" panose="020B0604030504040204" pitchFamily="34" charset="0"/>
+                <a:cs typeface="Verdana" panose="020B0604030504040204" pitchFamily="34" charset="0"/>
+              </a:rPr>
+              <a:t>odipsae</a:t>
+            </a:r>
+            <a:r>
+              <a:rPr lang="en-US" sz="2800" dirty="0">
+                <a:latin typeface="Verdana" panose="020B0604030504040204" pitchFamily="34" charset="0"/>
+                <a:ea typeface="Verdana" panose="020B0604030504040204" pitchFamily="34" charset="0"/>
+                <a:cs typeface="Verdana" panose="020B0604030504040204" pitchFamily="34" charset="0"/>
+              </a:rPr>
+              <a:t> id </a:t>
+            </a:r>
+            <a:r>
+              <a:rPr lang="en-US" sz="2800" dirty="0" err="1">
+                <a:latin typeface="Verdana" panose="020B0604030504040204" pitchFamily="34" charset="0"/>
+                <a:ea typeface="Verdana" panose="020B0604030504040204" pitchFamily="34" charset="0"/>
+                <a:cs typeface="Verdana" panose="020B0604030504040204" pitchFamily="34" charset="0"/>
+              </a:rPr>
+              <a:t>quaepe</a:t>
+            </a:r>
+            <a:r>
+              <a:rPr lang="en-US" sz="2800" dirty="0">
+                <a:latin typeface="Verdana" panose="020B0604030504040204" pitchFamily="34" charset="0"/>
+                <a:ea typeface="Verdana" panose="020B0604030504040204" pitchFamily="34" charset="0"/>
+                <a:cs typeface="Verdana" panose="020B0604030504040204" pitchFamily="34" charset="0"/>
+              </a:rPr>
+              <a:t> que </a:t>
+            </a:r>
+            <a:r>
+              <a:rPr lang="en-US" sz="2800" dirty="0" err="1">
+                <a:latin typeface="Verdana" panose="020B0604030504040204" pitchFamily="34" charset="0"/>
+                <a:ea typeface="Verdana" panose="020B0604030504040204" pitchFamily="34" charset="0"/>
+                <a:cs typeface="Verdana" panose="020B0604030504040204" pitchFamily="34" charset="0"/>
+              </a:rPr>
+              <a:t>doluptas</a:t>
+            </a:r>
+            <a:r>
+              <a:rPr lang="en-US" sz="2800" dirty="0">
+                <a:latin typeface="Verdana" panose="020B0604030504040204" pitchFamily="34" charset="0"/>
+                <a:ea typeface="Verdana" panose="020B0604030504040204" pitchFamily="34" charset="0"/>
+                <a:cs typeface="Verdana" panose="020B0604030504040204" pitchFamily="34" charset="0"/>
+              </a:rPr>
+              <a:t> et </a:t>
+            </a:r>
+            <a:r>
+              <a:rPr lang="en-US" sz="2800" dirty="0" err="1">
+                <a:latin typeface="Verdana" panose="020B0604030504040204" pitchFamily="34" charset="0"/>
+                <a:ea typeface="Verdana" panose="020B0604030504040204" pitchFamily="34" charset="0"/>
+                <a:cs typeface="Verdana" panose="020B0604030504040204" pitchFamily="34" charset="0"/>
+              </a:rPr>
+              <a:t>placcullias</a:t>
+            </a:r>
+            <a:r>
+              <a:rPr lang="en-US" sz="2800" dirty="0">
+                <a:latin typeface="Verdana" panose="020B0604030504040204" pitchFamily="34" charset="0"/>
+                <a:ea typeface="Verdana" panose="020B0604030504040204" pitchFamily="34" charset="0"/>
+                <a:cs typeface="Verdana" panose="020B0604030504040204" pitchFamily="34" charset="0"/>
+              </a:rPr>
+              <a:t> </a:t>
+            </a:r>
+            <a:r>
+              <a:rPr lang="en-US" sz="2800" dirty="0" err="1">
+                <a:latin typeface="Verdana" panose="020B0604030504040204" pitchFamily="34" charset="0"/>
+                <a:ea typeface="Verdana" panose="020B0604030504040204" pitchFamily="34" charset="0"/>
+                <a:cs typeface="Verdana" panose="020B0604030504040204" pitchFamily="34" charset="0"/>
+              </a:rPr>
+              <a:t>peditaturis</a:t>
+            </a:r>
+            <a:r>
+              <a:rPr lang="en-US" sz="2800" dirty="0">
+                <a:latin typeface="Verdana" panose="020B0604030504040204" pitchFamily="34" charset="0"/>
+                <a:ea typeface="Verdana" panose="020B0604030504040204" pitchFamily="34" charset="0"/>
+                <a:cs typeface="Verdana" panose="020B0604030504040204" pitchFamily="34" charset="0"/>
+              </a:rPr>
+              <a:t> </a:t>
+            </a:r>
+            <a:r>
+              <a:rPr lang="en-US" sz="2800" dirty="0" err="1">
+                <a:latin typeface="Verdana" panose="020B0604030504040204" pitchFamily="34" charset="0"/>
+                <a:ea typeface="Verdana" panose="020B0604030504040204" pitchFamily="34" charset="0"/>
+                <a:cs typeface="Verdana" panose="020B0604030504040204" pitchFamily="34" charset="0"/>
+              </a:rPr>
+              <a:t>dolorem</a:t>
+            </a:r>
+            <a:r>
+              <a:rPr lang="en-US" sz="2800" dirty="0">
+                <a:latin typeface="Verdana" panose="020B0604030504040204" pitchFamily="34" charset="0"/>
+                <a:ea typeface="Verdana" panose="020B0604030504040204" pitchFamily="34" charset="0"/>
+                <a:cs typeface="Verdana" panose="020B0604030504040204" pitchFamily="34" charset="0"/>
+              </a:rPr>
+              <a:t> et </a:t>
+            </a:r>
+            <a:r>
+              <a:rPr lang="en-US" sz="2800" dirty="0" err="1">
+                <a:latin typeface="Verdana" panose="020B0604030504040204" pitchFamily="34" charset="0"/>
+                <a:ea typeface="Verdana" panose="020B0604030504040204" pitchFamily="34" charset="0"/>
+                <a:cs typeface="Verdana" panose="020B0604030504040204" pitchFamily="34" charset="0"/>
+              </a:rPr>
+              <a:t>recusda</a:t>
+            </a:r>
+            <a:r>
+              <a:rPr lang="en-US" sz="2800" dirty="0">
+                <a:latin typeface="Verdana" panose="020B0604030504040204" pitchFamily="34" charset="0"/>
+                <a:ea typeface="Verdana" panose="020B0604030504040204" pitchFamily="34" charset="0"/>
+                <a:cs typeface="Verdana" panose="020B0604030504040204" pitchFamily="34" charset="0"/>
+              </a:rPr>
+              <a:t> </a:t>
+            </a:r>
+            <a:r>
+              <a:rPr lang="en-US" sz="2800" dirty="0" err="1">
+                <a:latin typeface="Verdana" panose="020B0604030504040204" pitchFamily="34" charset="0"/>
+                <a:ea typeface="Verdana" panose="020B0604030504040204" pitchFamily="34" charset="0"/>
+                <a:cs typeface="Verdana" panose="020B0604030504040204" pitchFamily="34" charset="0"/>
+              </a:rPr>
+              <a:t>ntiberum</a:t>
+            </a:r>
+            <a:r>
+              <a:rPr lang="en-US" sz="2800" dirty="0">
+                <a:latin typeface="Verdana" panose="020B0604030504040204" pitchFamily="34" charset="0"/>
+                <a:ea typeface="Verdana" panose="020B0604030504040204" pitchFamily="34" charset="0"/>
+                <a:cs typeface="Verdana" panose="020B0604030504040204" pitchFamily="34" charset="0"/>
+              </a:rPr>
+              <a:t> </a:t>
+            </a:r>
+            <a:r>
+              <a:rPr lang="en-US" sz="2800" dirty="0" err="1">
+                <a:latin typeface="Verdana" panose="020B0604030504040204" pitchFamily="34" charset="0"/>
+                <a:ea typeface="Verdana" panose="020B0604030504040204" pitchFamily="34" charset="0"/>
+                <a:cs typeface="Verdana" panose="020B0604030504040204" pitchFamily="34" charset="0"/>
+              </a:rPr>
+              <a:t>eos</a:t>
+            </a:r>
+            <a:r>
+              <a:rPr lang="en-US" sz="2800" dirty="0">
+                <a:latin typeface="Verdana" panose="020B0604030504040204" pitchFamily="34" charset="0"/>
+                <a:ea typeface="Verdana" panose="020B0604030504040204" pitchFamily="34" charset="0"/>
+                <a:cs typeface="Verdana" panose="020B0604030504040204" pitchFamily="34" charset="0"/>
+              </a:rPr>
+              <a:t> </a:t>
+            </a:r>
+            <a:r>
+              <a:rPr lang="en-US" sz="2800" dirty="0" err="1">
+                <a:latin typeface="Verdana" panose="020B0604030504040204" pitchFamily="34" charset="0"/>
+                <a:ea typeface="Verdana" panose="020B0604030504040204" pitchFamily="34" charset="0"/>
+                <a:cs typeface="Verdana" panose="020B0604030504040204" pitchFamily="34" charset="0"/>
+              </a:rPr>
+              <a:t>imi</a:t>
+            </a:r>
+            <a:r>
+              <a:rPr lang="en-US" sz="2800" dirty="0">
+                <a:latin typeface="Verdana" panose="020B0604030504040204" pitchFamily="34" charset="0"/>
+                <a:ea typeface="Verdana" panose="020B0604030504040204" pitchFamily="34" charset="0"/>
+                <a:cs typeface="Verdana" panose="020B0604030504040204" pitchFamily="34" charset="0"/>
+              </a:rPr>
+              <a:t> </a:t>
+            </a:r>
+            <a:r>
+              <a:rPr lang="en-US" sz="2800" dirty="0" err="1">
+                <a:latin typeface="Verdana" panose="020B0604030504040204" pitchFamily="34" charset="0"/>
+                <a:ea typeface="Verdana" panose="020B0604030504040204" pitchFamily="34" charset="0"/>
+                <a:cs typeface="Verdana" panose="020B0604030504040204" pitchFamily="34" charset="0"/>
+              </a:rPr>
+              <a:t>quaeperro</a:t>
+            </a:r>
+            <a:r>
+              <a:rPr lang="en-US" sz="2800" dirty="0">
+                <a:latin typeface="Verdana" panose="020B0604030504040204" pitchFamily="34" charset="0"/>
+                <a:ea typeface="Verdana" panose="020B0604030504040204" pitchFamily="34" charset="0"/>
+                <a:cs typeface="Verdana" panose="020B0604030504040204" pitchFamily="34" charset="0"/>
+              </a:rPr>
+              <a:t> </a:t>
+            </a:r>
+            <a:r>
+              <a:rPr lang="en-US" sz="2800" dirty="0" err="1">
+                <a:latin typeface="Verdana" panose="020B0604030504040204" pitchFamily="34" charset="0"/>
+                <a:ea typeface="Verdana" panose="020B0604030504040204" pitchFamily="34" charset="0"/>
+                <a:cs typeface="Verdana" panose="020B0604030504040204" pitchFamily="34" charset="0"/>
+              </a:rPr>
+              <a:t>ea</a:t>
+            </a:r>
+            <a:r>
+              <a:rPr lang="en-US" sz="2800" dirty="0">
+                <a:latin typeface="Verdana" panose="020B0604030504040204" pitchFamily="34" charset="0"/>
+                <a:ea typeface="Verdana" panose="020B0604030504040204" pitchFamily="34" charset="0"/>
+                <a:cs typeface="Verdana" panose="020B0604030504040204" pitchFamily="34" charset="0"/>
+              </a:rPr>
+              <a:t> </a:t>
+            </a:r>
+            <a:r>
+              <a:rPr lang="en-US" sz="2800" dirty="0" err="1">
+                <a:latin typeface="Verdana" panose="020B0604030504040204" pitchFamily="34" charset="0"/>
+                <a:ea typeface="Verdana" panose="020B0604030504040204" pitchFamily="34" charset="0"/>
+                <a:cs typeface="Verdana" panose="020B0604030504040204" pitchFamily="34" charset="0"/>
+              </a:rPr>
+              <a:t>ipiet</a:t>
+            </a:r>
+            <a:r>
+              <a:rPr lang="en-US" sz="2800" dirty="0">
+                <a:latin typeface="Verdana" panose="020B0604030504040204" pitchFamily="34" charset="0"/>
+                <a:ea typeface="Verdana" panose="020B0604030504040204" pitchFamily="34" charset="0"/>
+                <a:cs typeface="Verdana" panose="020B0604030504040204" pitchFamily="34" charset="0"/>
+              </a:rPr>
+              <a:t> est.</a:t>
+            </a:r>
+          </a:p>
+          <a:p>
+            <a:endParaRPr lang="en-US" sz="2800" dirty="0">
+              <a:latin typeface="Verdana" panose="020B0604030504040204" pitchFamily="34" charset="0"/>
+              <a:ea typeface="Verdana" panose="020B0604030504040204" pitchFamily="34" charset="0"/>
+              <a:cs typeface="Verdana" panose="020B0604030504040204" pitchFamily="34" charset="0"/>
+            </a:endParaRPr>
+          </a:p>
+        </p:txBody>
+      </p:sp>
+      <p:sp>
+        <p:nvSpPr>
+          <p:cNvPr id="17" name="Text Placeholder 16">
+            <a:extLst>
+              <a:ext uri="{FF2B5EF4-FFF2-40B4-BE49-F238E27FC236}">
+                <a16:creationId xmlns:a16="http://schemas.microsoft.com/office/drawing/2014/main" id="{B0499706-B276-4FE9-9822-CA05A1F89C4F}"/>
+              </a:ext>
+            </a:extLst>
+          </p:cNvPr>
+          <p:cNvSpPr txBox="1">
+            <a:spLocks/>
+          </p:cNvSpPr>
+          <p:nvPr/>
+        </p:nvSpPr>
+        <p:spPr>
+          <a:xfrm>
+            <a:off x="33952921" y="19991313"/>
+            <a:ext cx="8158690" cy="677108"/>
+          </a:xfrm>
+          <a:prstGeom prst="rect">
+            <a:avLst/>
+          </a:prstGeom>
+        </p:spPr>
+        <p:txBody>
+          <a:bodyPr wrap="square" lIns="0" tIns="0" rIns="0" bIns="0">
+            <a:spAutoFit/>
+          </a:bodyPr>
+          <a:lstStyle>
+            <a:lvl1pPr marL="0" indent="0" algn="l" defTabSz="4389120" rtl="0" eaLnBrk="1" latinLnBrk="0" hangingPunct="1">
+              <a:lnSpc>
+                <a:spcPct val="90000"/>
+              </a:lnSpc>
+              <a:spcBef>
+                <a:spcPts val="4800"/>
+              </a:spcBef>
+              <a:buFontTx/>
+              <a:buNone/>
+              <a:defRPr sz="4800" kern="1200" cap="all" baseline="0">
+                <a:solidFill>
+                  <a:schemeClr val="tx1"/>
+                </a:solidFill>
+                <a:latin typeface="KievitPro-Medium" charset="0"/>
+                <a:ea typeface="+mn-ea"/>
+                <a:cs typeface="+mn-cs"/>
+              </a:defRPr>
+            </a:lvl1pPr>
+            <a:lvl2pPr marL="2194560" indent="0" algn="l" defTabSz="4389120" rtl="0" eaLnBrk="1" latinLnBrk="0" hangingPunct="1">
+              <a:lnSpc>
+                <a:spcPct val="90000"/>
+              </a:lnSpc>
+              <a:spcBef>
+                <a:spcPts val="2400"/>
+              </a:spcBef>
+              <a:buFontTx/>
+              <a:buNone/>
+              <a:defRPr sz="4800" kern="1200" cap="all" baseline="0">
+                <a:solidFill>
+                  <a:schemeClr val="tx1"/>
+                </a:solidFill>
+                <a:latin typeface="KievitPro-Medium" charset="0"/>
+                <a:ea typeface="+mn-ea"/>
+                <a:cs typeface="+mn-cs"/>
+              </a:defRPr>
+            </a:lvl2pPr>
+            <a:lvl3pPr marL="4389120" indent="0" algn="l" defTabSz="4389120" rtl="0" eaLnBrk="1" latinLnBrk="0" hangingPunct="1">
+              <a:lnSpc>
+                <a:spcPct val="90000"/>
+              </a:lnSpc>
+              <a:spcBef>
+                <a:spcPts val="2400"/>
+              </a:spcBef>
+              <a:buFontTx/>
+              <a:buNone/>
+              <a:defRPr sz="4800" kern="1200" cap="all" baseline="0">
+                <a:solidFill>
+                  <a:schemeClr val="tx1"/>
+                </a:solidFill>
+                <a:latin typeface="KievitPro-Medium" charset="0"/>
+                <a:ea typeface="+mn-ea"/>
+                <a:cs typeface="+mn-cs"/>
+              </a:defRPr>
+            </a:lvl3pPr>
+            <a:lvl4pPr marL="6583680" indent="0" algn="l" defTabSz="4389120" rtl="0" eaLnBrk="1" latinLnBrk="0" hangingPunct="1">
+              <a:lnSpc>
+                <a:spcPct val="90000"/>
+              </a:lnSpc>
+              <a:spcBef>
+                <a:spcPts val="2400"/>
+              </a:spcBef>
+              <a:buFontTx/>
+              <a:buNone/>
+              <a:defRPr sz="4800" kern="1200" cap="all" baseline="0">
+                <a:solidFill>
+                  <a:schemeClr val="tx1"/>
+                </a:solidFill>
+                <a:latin typeface="KievitPro-Medium" charset="0"/>
+                <a:ea typeface="+mn-ea"/>
+                <a:cs typeface="+mn-cs"/>
+              </a:defRPr>
+            </a:lvl4pPr>
+            <a:lvl5pPr marL="8778240" indent="0" algn="l" defTabSz="4389120" rtl="0" eaLnBrk="1" latinLnBrk="0" hangingPunct="1">
+              <a:lnSpc>
+                <a:spcPct val="90000"/>
+              </a:lnSpc>
+              <a:spcBef>
+                <a:spcPts val="2400"/>
+              </a:spcBef>
+              <a:buFontTx/>
+              <a:buNone/>
+              <a:defRPr sz="4800" kern="1200" cap="all" baseline="0">
+                <a:solidFill>
+                  <a:schemeClr val="tx1"/>
+                </a:solidFill>
+                <a:latin typeface="KievitPro-Medium" charset="0"/>
+                <a:ea typeface="+mn-ea"/>
+                <a:cs typeface="+mn-cs"/>
+              </a:defRPr>
+            </a:lvl5pPr>
+            <a:lvl6pPr marL="12070080" indent="-1097280" algn="l" defTabSz="4389120" rtl="0" eaLnBrk="1" latinLnBrk="0" hangingPunct="1">
+              <a:lnSpc>
+                <a:spcPct val="90000"/>
+              </a:lnSpc>
+              <a:spcBef>
+                <a:spcPts val="2400"/>
+              </a:spcBef>
+              <a:buFont typeface="Arial" panose="020B0604020202020204" pitchFamily="34" charset="0"/>
+              <a:buChar char="•"/>
+              <a:defRPr sz="8640" kern="1200">
+                <a:solidFill>
+                  <a:schemeClr val="tx1"/>
+                </a:solidFill>
+                <a:latin typeface="+mn-lt"/>
+                <a:ea typeface="+mn-ea"/>
+                <a:cs typeface="+mn-cs"/>
+              </a:defRPr>
+            </a:lvl6pPr>
+            <a:lvl7pPr marL="14264640" indent="-1097280" algn="l" defTabSz="4389120" rtl="0" eaLnBrk="1" latinLnBrk="0" hangingPunct="1">
+              <a:lnSpc>
+                <a:spcPct val="90000"/>
+              </a:lnSpc>
+              <a:spcBef>
+                <a:spcPts val="2400"/>
+              </a:spcBef>
+              <a:buFont typeface="Arial" panose="020B0604020202020204" pitchFamily="34" charset="0"/>
+              <a:buChar char="•"/>
+              <a:defRPr sz="8640" kern="1200">
+                <a:solidFill>
+                  <a:schemeClr val="tx1"/>
+                </a:solidFill>
+                <a:latin typeface="+mn-lt"/>
+                <a:ea typeface="+mn-ea"/>
+                <a:cs typeface="+mn-cs"/>
+              </a:defRPr>
+            </a:lvl7pPr>
+            <a:lvl8pPr marL="16459200" indent="-1097280" algn="l" defTabSz="4389120" rtl="0" eaLnBrk="1" latinLnBrk="0" hangingPunct="1">
+              <a:lnSpc>
+                <a:spcPct val="90000"/>
+              </a:lnSpc>
+              <a:spcBef>
+                <a:spcPts val="2400"/>
+              </a:spcBef>
+              <a:buFont typeface="Arial" panose="020B0604020202020204" pitchFamily="34" charset="0"/>
+              <a:buChar char="•"/>
+              <a:defRPr sz="8640" kern="1200">
+                <a:solidFill>
+                  <a:schemeClr val="tx1"/>
+                </a:solidFill>
+                <a:latin typeface="+mn-lt"/>
+                <a:ea typeface="+mn-ea"/>
+                <a:cs typeface="+mn-cs"/>
+              </a:defRPr>
+            </a:lvl8pPr>
+            <a:lvl9pPr marL="18653760" indent="-1097280" algn="l" defTabSz="4389120" rtl="0" eaLnBrk="1" latinLnBrk="0" hangingPunct="1">
+              <a:lnSpc>
+                <a:spcPct val="90000"/>
+              </a:lnSpc>
+              <a:spcBef>
+                <a:spcPts val="2400"/>
+              </a:spcBef>
+              <a:buFont typeface="Arial" panose="020B0604020202020204" pitchFamily="34" charset="0"/>
+              <a:buChar char="•"/>
+              <a:defRPr sz="8640" kern="1200">
+                <a:solidFill>
+                  <a:schemeClr val="tx1"/>
+                </a:solidFill>
+                <a:latin typeface="+mn-lt"/>
+                <a:ea typeface="+mn-ea"/>
+                <a:cs typeface="+mn-cs"/>
+              </a:defRPr>
+            </a:lvl9pPr>
+          </a:lstStyle>
+          <a:p>
+            <a:r>
+              <a:rPr lang="en-US" dirty="0">
+                <a:solidFill>
+                  <a:srgbClr val="FFFFFF"/>
+                </a:solidFill>
+                <a:latin typeface="Verdana Regular" charset="0"/>
+              </a:rPr>
+              <a:t>Conclusion</a:t>
             </a:r>
           </a:p>
         </p:txBody>

</xml_diff>

<commit_message>
Team Pic added-Sent to TA
</commit_message>
<xml_diff>
--- a/Poster/poster_undergrad_expo_48x36_eecs.pptx
+++ b/Poster/poster_undergrad_expo_48x36_eecs.pptx
@@ -243,7 +243,7 @@
             <a:fld id="{9CF59EBC-EC05-6B4D-B166-DDFA6A1EDCB6}" type="datetimeFigureOut">
               <a:rPr lang="en-US" smtClean="0"/>
               <a:pPr/>
-              <a:t>2/9/2018</a:t>
+              <a:t>2/14/2018</a:t>
             </a:fld>
             <a:endParaRPr lang="en-US" dirty="0"/>
           </a:p>
@@ -1835,23 +1835,36 @@
           </a:xfrm>
         </p:spPr>
       </p:sp>
-      <p:sp>
-        <p:nvSpPr>
-          <p:cNvPr id="3" name="Picture Placeholder 2"/>
-          <p:cNvSpPr>
-            <a:spLocks noGrp="1"/>
-          </p:cNvSpPr>
+      <p:pic>
+        <p:nvPicPr>
+          <p:cNvPr id="26" name="Picture Placeholder 25">
+            <a:extLst>
+              <a:ext uri="{FF2B5EF4-FFF2-40B4-BE49-F238E27FC236}">
+                <a16:creationId xmlns:a16="http://schemas.microsoft.com/office/drawing/2014/main" id="{366A2B61-BBB0-4134-9408-2AC462687CCE}"/>
+              </a:ext>
+            </a:extLst>
+          </p:cNvPr>
+          <p:cNvPicPr>
+            <a:picLocks noGrp="1" noChangeAspect="1"/>
+          </p:cNvPicPr>
           <p:nvPr>
             <p:ph type="pic" sz="quarter" idx="11"/>
           </p:nvPr>
-        </p:nvSpPr>
+        </p:nvPicPr>
+        <p:blipFill>
+          <a:blip r:embed="rId2"/>
+          <a:srcRect l="3069" r="3069"/>
+          <a:stretch>
+            <a:fillRect/>
+          </a:stretch>
+        </p:blipFill>
         <p:spPr>
           <a:xfrm>
-            <a:off x="33848817" y="3602245"/>
-            <a:ext cx="7994507" cy="9101138"/>
+            <a:off x="33292784" y="5006591"/>
+            <a:ext cx="9478963" cy="5053012"/>
           </a:xfrm>
         </p:spPr>
-      </p:sp>
+      </p:pic>
       <p:sp>
         <p:nvSpPr>
           <p:cNvPr id="6" name="Text Placeholder 16"/>
@@ -3722,7 +3735,7 @@
         </p:nvSpPr>
         <p:spPr>
           <a:xfrm>
-            <a:off x="33952921" y="13083796"/>
+            <a:off x="33768244" y="10518380"/>
             <a:ext cx="8158690" cy="677108"/>
           </a:xfrm>
           <a:prstGeom prst="rect">
@@ -3920,8 +3933,8 @@
         </p:nvSpPr>
         <p:spPr>
           <a:xfrm>
-            <a:off x="33716912" y="14141317"/>
-            <a:ext cx="8126412" cy="5052665"/>
+            <a:off x="33716912" y="11583736"/>
+            <a:ext cx="8126412" cy="4283224"/>
           </a:xfrm>
           <a:prstGeom prst="rect">
             <a:avLst/>
@@ -4127,7 +4140,7 @@
               <a:rPr lang="en-US" dirty="0">
                 <a:latin typeface="Verdana Regular" charset="0"/>
               </a:rPr>
-              <a:t>Logan Wingard | wingarlo@oregonstate.edu</a:t>
+              <a:t>Daniel Ross | rossda@oregonstate.edu</a:t>
             </a:r>
           </a:p>
           <a:p>
@@ -4141,7 +4154,7 @@
               <a:rPr lang="en-US" dirty="0">
                 <a:latin typeface="Verdana Regular" charset="0"/>
               </a:rPr>
-              <a:t>Daniel Ross | rossda@oregonstate.edu</a:t>
+              <a:t>Logan Wingard | wingarlo@oregonstate.edu</a:t>
             </a:r>
           </a:p>
           <a:p>
@@ -4182,41 +4195,6 @@
               </a:rPr>
               <a:t>Kim Whitehall, Nasa JPL</a:t>
             </a:r>
-          </a:p>
-          <a:p>
-            <a:pPr marL="0" indent="0">
-              <a:spcAft>
-                <a:spcPts val="2600"/>
-              </a:spcAft>
-              <a:buNone/>
-            </a:pPr>
-            <a:r>
-              <a:rPr lang="en-US" dirty="0">
-                <a:latin typeface="Verdana Regular" charset="0"/>
-              </a:rPr>
-              <a:t>? Lewis </a:t>
-            </a:r>
-            <a:r>
-              <a:rPr lang="en-US" dirty="0" err="1">
-                <a:latin typeface="Verdana Regular" charset="0"/>
-              </a:rPr>
-              <a:t>McGibbney</a:t>
-            </a:r>
-            <a:r>
-              <a:rPr lang="en-US" dirty="0">
-                <a:latin typeface="Verdana Regular" charset="0"/>
-              </a:rPr>
-              <a:t>, </a:t>
-            </a:r>
-            <a:r>
-              <a:rPr lang="en-US">
-                <a:latin typeface="Verdana Regular" charset="0"/>
-              </a:rPr>
-              <a:t>Nasa JPL</a:t>
-            </a:r>
-            <a:endParaRPr lang="en-US" dirty="0">
-              <a:latin typeface="Verdana Regular" charset="0"/>
-            </a:endParaRPr>
           </a:p>
         </p:txBody>
       </p:sp>
@@ -4291,7 +4269,7 @@
         </p:nvSpPr>
         <p:spPr>
           <a:xfrm>
-            <a:off x="33952922" y="20785368"/>
+            <a:off x="33952922" y="17391093"/>
             <a:ext cx="8158690" cy="9182001"/>
           </a:xfrm>
           <a:prstGeom prst="rect">
@@ -5549,7 +5527,7 @@
         </p:nvSpPr>
         <p:spPr>
           <a:xfrm>
-            <a:off x="33952921" y="19991313"/>
+            <a:off x="33952922" y="16385148"/>
             <a:ext cx="8158690" cy="677108"/>
           </a:xfrm>
           <a:prstGeom prst="rect">

</xml_diff>